<commit_message>
Brand new strategy used for segmentation, getting rid of the old codes; Much faster and the results are reasonable now; Waiting for LINUX testing;
git-svn-id: https://svn.janelia.org/penglab/projects/vaa3d_tools@1685 f26c06c5-4756-4547-a2b9-0b39063de1b8
</commit_message>
<xml_diff>
--- a/hackathon/xiang/cellSegmentation/scheme.pptx
+++ b/hackathon/xiang/cellSegmentation/scheme.pptx
@@ -208,7 +208,7 @@
           <a:p>
             <a:fld id="{D70E0579-1147-4611-864D-63CAA23B7179}" type="datetimeFigureOut">
               <a:rPr lang="en-US" smtClean="0"/>
-              <a:t>10/17/2014</a:t>
+              <a:t>10/19/2014</a:t>
             </a:fld>
             <a:endParaRPr lang="en-US"/>
           </a:p>
@@ -658,7 +658,7 @@
             <a:fld id="{1D8BD707-D9CF-40AE-B4C6-C98DA3205C09}" type="datetimeFigureOut">
               <a:rPr lang="en-US" smtClean="0"/>
               <a:pPr/>
-              <a:t>10/17/2014</a:t>
+              <a:t>10/19/2014</a:t>
             </a:fld>
             <a:endParaRPr lang="en-US"/>
           </a:p>
@@ -825,7 +825,7 @@
             <a:fld id="{1D8BD707-D9CF-40AE-B4C6-C98DA3205C09}" type="datetimeFigureOut">
               <a:rPr lang="en-US" smtClean="0"/>
               <a:pPr/>
-              <a:t>10/17/2014</a:t>
+              <a:t>10/19/2014</a:t>
             </a:fld>
             <a:endParaRPr lang="en-US"/>
           </a:p>
@@ -1002,7 +1002,7 @@
             <a:fld id="{1D8BD707-D9CF-40AE-B4C6-C98DA3205C09}" type="datetimeFigureOut">
               <a:rPr lang="en-US" smtClean="0"/>
               <a:pPr/>
-              <a:t>10/17/2014</a:t>
+              <a:t>10/19/2014</a:t>
             </a:fld>
             <a:endParaRPr lang="en-US"/>
           </a:p>
@@ -1169,7 +1169,7 @@
             <a:fld id="{1D8BD707-D9CF-40AE-B4C6-C98DA3205C09}" type="datetimeFigureOut">
               <a:rPr lang="en-US" smtClean="0"/>
               <a:pPr/>
-              <a:t>10/17/2014</a:t>
+              <a:t>10/19/2014</a:t>
             </a:fld>
             <a:endParaRPr lang="en-US"/>
           </a:p>
@@ -1412,7 +1412,7 @@
             <a:fld id="{1D8BD707-D9CF-40AE-B4C6-C98DA3205C09}" type="datetimeFigureOut">
               <a:rPr lang="en-US" smtClean="0"/>
               <a:pPr/>
-              <a:t>10/17/2014</a:t>
+              <a:t>10/19/2014</a:t>
             </a:fld>
             <a:endParaRPr lang="en-US"/>
           </a:p>
@@ -1697,7 +1697,7 @@
             <a:fld id="{1D8BD707-D9CF-40AE-B4C6-C98DA3205C09}" type="datetimeFigureOut">
               <a:rPr lang="en-US" smtClean="0"/>
               <a:pPr/>
-              <a:t>10/17/2014</a:t>
+              <a:t>10/19/2014</a:t>
             </a:fld>
             <a:endParaRPr lang="en-US"/>
           </a:p>
@@ -2116,7 +2116,7 @@
             <a:fld id="{1D8BD707-D9CF-40AE-B4C6-C98DA3205C09}" type="datetimeFigureOut">
               <a:rPr lang="en-US" smtClean="0"/>
               <a:pPr/>
-              <a:t>10/17/2014</a:t>
+              <a:t>10/19/2014</a:t>
             </a:fld>
             <a:endParaRPr lang="en-US"/>
           </a:p>
@@ -2231,7 +2231,7 @@
             <a:fld id="{1D8BD707-D9CF-40AE-B4C6-C98DA3205C09}" type="datetimeFigureOut">
               <a:rPr lang="en-US" smtClean="0"/>
               <a:pPr/>
-              <a:t>10/17/2014</a:t>
+              <a:t>10/19/2014</a:t>
             </a:fld>
             <a:endParaRPr lang="en-US"/>
           </a:p>
@@ -2323,7 +2323,7 @@
             <a:fld id="{1D8BD707-D9CF-40AE-B4C6-C98DA3205C09}" type="datetimeFigureOut">
               <a:rPr lang="en-US" smtClean="0"/>
               <a:pPr/>
-              <a:t>10/17/2014</a:t>
+              <a:t>10/19/2014</a:t>
             </a:fld>
             <a:endParaRPr lang="en-US"/>
           </a:p>
@@ -2597,7 +2597,7 @@
             <a:fld id="{1D8BD707-D9CF-40AE-B4C6-C98DA3205C09}" type="datetimeFigureOut">
               <a:rPr lang="en-US" smtClean="0"/>
               <a:pPr/>
-              <a:t>10/17/2014</a:t>
+              <a:t>10/19/2014</a:t>
             </a:fld>
             <a:endParaRPr lang="en-US"/>
           </a:p>
@@ -2847,7 +2847,7 @@
             <a:fld id="{1D8BD707-D9CF-40AE-B4C6-C98DA3205C09}" type="datetimeFigureOut">
               <a:rPr lang="en-US" smtClean="0"/>
               <a:pPr/>
-              <a:t>10/17/2014</a:t>
+              <a:t>10/19/2014</a:t>
             </a:fld>
             <a:endParaRPr lang="en-US"/>
           </a:p>
@@ -3060,7 +3060,7 @@
             <a:fld id="{1D8BD707-D9CF-40AE-B4C6-C98DA3205C09}" type="datetimeFigureOut">
               <a:rPr lang="en-US" smtClean="0"/>
               <a:pPr/>
-              <a:t>10/17/2014</a:t>
+              <a:t>10/19/2014</a:t>
             </a:fld>
             <a:endParaRPr lang="en-US"/>
           </a:p>
@@ -3958,7 +3958,7 @@
         </p:nvSpPr>
         <p:spPr>
           <a:xfrm>
-            <a:off x="4492244" y="2824720"/>
+            <a:off x="4492244" y="2456300"/>
             <a:ext cx="1828800" cy="182880"/>
           </a:xfrm>
           <a:prstGeom prst="rect">
@@ -4014,70 +4014,6 @@
               </a:rPr>
               <a:t>()</a:t>
             </a:r>
-          </a:p>
-        </p:txBody>
-      </p:sp>
-      <p:sp>
-        <p:nvSpPr>
-          <p:cNvPr id="280" name="Rectangle 279"/>
-          <p:cNvSpPr/>
-          <p:nvPr/>
-        </p:nvSpPr>
-        <p:spPr>
-          <a:xfrm>
-            <a:off x="2240280" y="2367520"/>
-            <a:ext cx="1828800" cy="182880"/>
-          </a:xfrm>
-          <a:prstGeom prst="rect">
-            <a:avLst/>
-          </a:prstGeom>
-          <a:solidFill>
-            <a:schemeClr val="bg1"/>
-          </a:solidFill>
-          <a:ln w="12700">
-            <a:solidFill>
-              <a:schemeClr val="tx1"/>
-            </a:solidFill>
-          </a:ln>
-        </p:spPr>
-        <p:style>
-          <a:lnRef idx="2">
-            <a:schemeClr val="accent1">
-              <a:shade val="50000"/>
-            </a:schemeClr>
-          </a:lnRef>
-          <a:fillRef idx="1">
-            <a:schemeClr val="accent1"/>
-          </a:fillRef>
-          <a:effectRef idx="0">
-            <a:schemeClr val="accent1"/>
-          </a:effectRef>
-          <a:fontRef idx="minor">
-            <a:schemeClr val="lt1"/>
-          </a:fontRef>
-        </p:style>
-        <p:txBody>
-          <a:bodyPr lIns="91440" tIns="91440" rIns="91440" bIns="91440" rtlCol="0" anchor="ctr"/>
-          <a:lstStyle/>
-          <a:p>
-            <a:pPr algn="ctr"/>
-            <a:r>
-              <a:rPr lang="en-US" sz="1000" dirty="0" err="1" smtClean="0">
-                <a:solidFill>
-                  <a:schemeClr val="tx1"/>
-                </a:solidFill>
-                <a:latin typeface="Times New Roman" panose="02020603050405020304" pitchFamily="18" charset="0"/>
-                <a:cs typeface="Times New Roman" panose="02020603050405020304" pitchFamily="18" charset="0"/>
-              </a:rPr>
-              <a:t>regonGrowOnExemplar</a:t>
-            </a:r>
-            <a:endParaRPr lang="en-US" sz="1000" dirty="0">
-              <a:solidFill>
-                <a:schemeClr val="tx1"/>
-              </a:solidFill>
-              <a:latin typeface="Times New Roman" panose="02020603050405020304" pitchFamily="18" charset="0"/>
-              <a:cs typeface="Times New Roman" panose="02020603050405020304" pitchFamily="18" charset="0"/>
-            </a:endParaRPr>
           </a:p>
         </p:txBody>
       </p:sp>
@@ -4397,7 +4333,7 @@
         </p:nvSpPr>
         <p:spPr>
           <a:xfrm>
-            <a:off x="2240280" y="5039362"/>
+            <a:off x="2240280" y="5196840"/>
             <a:ext cx="1828800" cy="182880"/>
           </a:xfrm>
           <a:prstGeom prst="rect">
@@ -4464,7 +4400,7 @@
         </p:nvSpPr>
         <p:spPr>
           <a:xfrm>
-            <a:off x="2240280" y="4128695"/>
+            <a:off x="2240280" y="4724400"/>
             <a:ext cx="1828800" cy="182880"/>
           </a:xfrm>
           <a:prstGeom prst="rect">
@@ -4508,7 +4444,17 @@
                 <a:latin typeface="Times New Roman" panose="02020603050405020304" pitchFamily="18" charset="0"/>
                 <a:cs typeface="Times New Roman" panose="02020603050405020304" pitchFamily="18" charset="0"/>
               </a:rPr>
-              <a:t>threshold main region</a:t>
+              <a:t>threshold </a:t>
+            </a:r>
+            <a:r>
+              <a:rPr lang="en-US" sz="1000" dirty="0" smtClean="0">
+                <a:solidFill>
+                  <a:schemeClr val="tx1"/>
+                </a:solidFill>
+                <a:latin typeface="Times New Roman" panose="02020603050405020304" pitchFamily="18" charset="0"/>
+                <a:cs typeface="Times New Roman" panose="02020603050405020304" pitchFamily="18" charset="0"/>
+              </a:rPr>
+              <a:t>current page</a:t>
             </a:r>
             <a:endParaRPr lang="en-US" sz="1000" dirty="0">
               <a:solidFill>
@@ -4528,8 +4474,8 @@
         </p:nvSpPr>
         <p:spPr>
           <a:xfrm>
-            <a:off x="2240280" y="3718560"/>
-            <a:ext cx="1828800" cy="182880"/>
+            <a:off x="2240280" y="4191000"/>
+            <a:ext cx="1828800" cy="365760"/>
           </a:xfrm>
           <a:prstGeom prst="rect">
             <a:avLst/>
@@ -4565,14 +4511,14 @@
           <a:p>
             <a:pPr algn="ctr"/>
             <a:r>
-              <a:rPr lang="en-US" sz="1000" dirty="0" err="1">
+              <a:rPr lang="en-US" sz="1000" dirty="0" smtClean="0">
                 <a:solidFill>
                   <a:schemeClr val="tx1"/>
                 </a:solidFill>
                 <a:latin typeface="Times New Roman" panose="02020603050405020304" pitchFamily="18" charset="0"/>
                 <a:cs typeface="Times New Roman" panose="02020603050405020304" pitchFamily="18" charset="0"/>
               </a:rPr>
-              <a:t>centralizeExemplarRegion</a:t>
+              <a:t>analyze exemplar region volume (min, max, mean)</a:t>
             </a:r>
             <a:endParaRPr lang="en-US" sz="1000" dirty="0">
               <a:solidFill>
@@ -4586,14 +4532,14 @@
       </p:sp>
       <p:sp>
         <p:nvSpPr>
-          <p:cNvPr id="295" name="Rectangle 294"/>
+          <p:cNvPr id="296" name="Rectangle 295"/>
           <p:cNvSpPr/>
           <p:nvPr/>
         </p:nvSpPr>
         <p:spPr>
           <a:xfrm>
-            <a:off x="2240280" y="4592320"/>
-            <a:ext cx="1828800" cy="182880"/>
+            <a:off x="2240280" y="2362200"/>
+            <a:ext cx="1828800" cy="365760"/>
           </a:xfrm>
           <a:prstGeom prst="rect">
             <a:avLst/>
@@ -4629,73 +4575,6 @@
           <a:p>
             <a:pPr algn="ctr"/>
             <a:r>
-              <a:rPr lang="en-US" sz="1000" dirty="0" err="1">
-                <a:solidFill>
-                  <a:schemeClr val="tx1"/>
-                </a:solidFill>
-                <a:latin typeface="Times New Roman" panose="02020603050405020304" pitchFamily="18" charset="0"/>
-                <a:cs typeface="Times New Roman" panose="02020603050405020304" pitchFamily="18" charset="0"/>
-              </a:rPr>
-              <a:t>removeSingleVoxel</a:t>
-            </a:r>
-            <a:r>
-              <a:rPr lang="en-US" sz="1000" dirty="0">
-                <a:solidFill>
-                  <a:schemeClr val="tx1"/>
-                </a:solidFill>
-                <a:latin typeface="Times New Roman" panose="02020603050405020304" pitchFamily="18" charset="0"/>
-                <a:cs typeface="Times New Roman" panose="02020603050405020304" pitchFamily="18" charset="0"/>
-              </a:rPr>
-              <a:t>()</a:t>
-            </a:r>
-          </a:p>
-        </p:txBody>
-      </p:sp>
-      <p:sp>
-        <p:nvSpPr>
-          <p:cNvPr id="296" name="Rectangle 295"/>
-          <p:cNvSpPr/>
-          <p:nvPr/>
-        </p:nvSpPr>
-        <p:spPr>
-          <a:xfrm>
-            <a:off x="2240280" y="2730620"/>
-            <a:ext cx="1828800" cy="365760"/>
-          </a:xfrm>
-          <a:prstGeom prst="rect">
-            <a:avLst/>
-          </a:prstGeom>
-          <a:solidFill>
-            <a:schemeClr val="bg1"/>
-          </a:solidFill>
-          <a:ln w="12700">
-            <a:solidFill>
-              <a:schemeClr val="tx1"/>
-            </a:solidFill>
-          </a:ln>
-        </p:spPr>
-        <p:style>
-          <a:lnRef idx="2">
-            <a:schemeClr val="accent1">
-              <a:shade val="50000"/>
-            </a:schemeClr>
-          </a:lnRef>
-          <a:fillRef idx="1">
-            <a:schemeClr val="accent1"/>
-          </a:fillRef>
-          <a:effectRef idx="0">
-            <a:schemeClr val="accent1"/>
-          </a:effectRef>
-          <a:fontRef idx="minor">
-            <a:schemeClr val="lt1"/>
-          </a:fontRef>
-        </p:style>
-        <p:txBody>
-          <a:bodyPr lIns="91440" tIns="91440" rIns="91440" bIns="91440" rtlCol="0" anchor="ctr"/>
-          <a:lstStyle/>
-          <a:p>
-            <a:pPr algn="ctr"/>
-            <a:r>
               <a:rPr lang="en-US" sz="1000" dirty="0" smtClean="0">
                 <a:solidFill>
                   <a:schemeClr val="tx1"/>
@@ -4726,7 +4605,7 @@
         </p:nvCxnSpPr>
         <p:spPr>
           <a:xfrm flipH="1" flipV="1">
-            <a:off x="4069080" y="2913500"/>
+            <a:off x="4069080" y="2545080"/>
             <a:ext cx="423164" cy="2660"/>
           </a:xfrm>
           <a:prstGeom prst="straightConnector1">
@@ -4762,7 +4641,7 @@
         </p:nvCxnSpPr>
         <p:spPr>
           <a:xfrm>
-            <a:off x="0" y="4451947"/>
+            <a:off x="0" y="5005665"/>
             <a:ext cx="8229600" cy="0"/>
           </a:xfrm>
           <a:prstGeom prst="line">
@@ -4799,7 +4678,7 @@
         </p:nvSpPr>
         <p:spPr>
           <a:xfrm>
-            <a:off x="2240280" y="3307080"/>
+            <a:off x="2240280" y="3860798"/>
             <a:ext cx="1828800" cy="182880"/>
           </a:xfrm>
           <a:prstGeom prst="rect">
@@ -4857,87 +4736,13 @@
       </p:sp>
       <p:sp>
         <p:nvSpPr>
-          <p:cNvPr id="301" name="Rectangle 300"/>
-          <p:cNvSpPr/>
-          <p:nvPr/>
-        </p:nvSpPr>
-        <p:spPr>
-          <a:xfrm>
-            <a:off x="2240280" y="5501640"/>
-            <a:ext cx="1828800" cy="182880"/>
-          </a:xfrm>
-          <a:prstGeom prst="rect">
-            <a:avLst/>
-          </a:prstGeom>
-          <a:solidFill>
-            <a:schemeClr val="bg1"/>
-          </a:solidFill>
-          <a:ln w="12700">
-            <a:solidFill>
-              <a:schemeClr val="tx1"/>
-            </a:solidFill>
-          </a:ln>
-        </p:spPr>
-        <p:style>
-          <a:lnRef idx="2">
-            <a:schemeClr val="accent1">
-              <a:shade val="50000"/>
-            </a:schemeClr>
-          </a:lnRef>
-          <a:fillRef idx="1">
-            <a:schemeClr val="accent1"/>
-          </a:fillRef>
-          <a:effectRef idx="0">
-            <a:schemeClr val="accent1"/>
-          </a:effectRef>
-          <a:fontRef idx="minor">
-            <a:schemeClr val="lt1"/>
-          </a:fontRef>
-        </p:style>
-        <p:txBody>
-          <a:bodyPr lIns="91440" tIns="91440" rIns="91440" bIns="91440" rtlCol="0" anchor="ctr"/>
-          <a:lstStyle/>
-          <a:p>
-            <a:pPr algn="ctr"/>
-            <a:r>
-              <a:rPr lang="en-US" sz="1000" dirty="0" err="1" smtClean="0">
-                <a:solidFill>
-                  <a:schemeClr val="tx1"/>
-                </a:solidFill>
-                <a:latin typeface="Times New Roman" panose="02020603050405020304" pitchFamily="18" charset="0"/>
-                <a:cs typeface="Times New Roman" panose="02020603050405020304" pitchFamily="18" charset="0"/>
-              </a:rPr>
-              <a:t>regionFitting</a:t>
-            </a:r>
-            <a:r>
-              <a:rPr lang="en-US" sz="1000" dirty="0" smtClean="0">
-                <a:solidFill>
-                  <a:schemeClr val="tx1"/>
-                </a:solidFill>
-                <a:latin typeface="Times New Roman" panose="02020603050405020304" pitchFamily="18" charset="0"/>
-                <a:cs typeface="Times New Roman" panose="02020603050405020304" pitchFamily="18" charset="0"/>
-              </a:rPr>
-              <a:t>()</a:t>
-            </a:r>
-            <a:endParaRPr lang="en-US" sz="1000" dirty="0">
-              <a:solidFill>
-                <a:schemeClr val="tx1"/>
-              </a:solidFill>
-              <a:latin typeface="Times New Roman" panose="02020603050405020304" pitchFamily="18" charset="0"/>
-              <a:cs typeface="Times New Roman" panose="02020603050405020304" pitchFamily="18" charset="0"/>
-            </a:endParaRPr>
-          </a:p>
-        </p:txBody>
-      </p:sp>
-      <p:sp>
-        <p:nvSpPr>
           <p:cNvPr id="302" name="Flowchart: Alternate Process 301"/>
           <p:cNvSpPr/>
           <p:nvPr/>
         </p:nvSpPr>
         <p:spPr>
           <a:xfrm>
-            <a:off x="4495800" y="4128695"/>
+            <a:off x="4495800" y="4724400"/>
             <a:ext cx="3657600" cy="182880"/>
           </a:xfrm>
           <a:prstGeom prst="flowChartAlternateProcess">
@@ -4980,25 +4785,8 @@
                 <a:latin typeface="Times New Roman" panose="02020603050405020304" pitchFamily="18" charset="0"/>
                 <a:cs typeface="Times New Roman" panose="02020603050405020304" pitchFamily="18" charset="0"/>
               </a:rPr>
-              <a:t>thresholding current image</a:t>
-            </a:r>
-            <a:r>
-              <a:rPr lang="en-US" sz="1000" dirty="0" smtClean="0">
-                <a:solidFill>
-                  <a:schemeClr val="tx1"/>
-                </a:solidFill>
-                <a:latin typeface="Times New Roman" panose="02020603050405020304" pitchFamily="18" charset="0"/>
-                <a:cs typeface="Times New Roman" panose="02020603050405020304" pitchFamily="18" charset="0"/>
-              </a:rPr>
-              <a:t>;  updating mask accordingly;</a:t>
-            </a:r>
-            <a:endParaRPr lang="en-US" sz="1000" dirty="0" smtClean="0">
-              <a:solidFill>
-                <a:schemeClr val="tx1"/>
-              </a:solidFill>
-              <a:latin typeface="Times New Roman" panose="02020603050405020304" pitchFamily="18" charset="0"/>
-              <a:cs typeface="Times New Roman" panose="02020603050405020304" pitchFamily="18" charset="0"/>
-            </a:endParaRPr>
+              <a:t>thresholding current image;  updating mask accordingly;</a:t>
+            </a:r>
           </a:p>
         </p:txBody>
       </p:sp>
@@ -5010,7 +4798,7 @@
         </p:nvSpPr>
         <p:spPr>
           <a:xfrm>
-            <a:off x="4953000" y="3215640"/>
+            <a:off x="4953000" y="3769358"/>
             <a:ext cx="3200400" cy="365760"/>
           </a:xfrm>
           <a:prstGeom prst="flowChartAlternateProcess">
@@ -5053,8 +4841,11 @@
                 <a:latin typeface="Times New Roman" panose="02020603050405020304" pitchFamily="18" charset="0"/>
                 <a:cs typeface="Times New Roman" panose="02020603050405020304" pitchFamily="18" charset="0"/>
               </a:rPr>
-              <a:t>thresholding voxel </a:t>
-            </a:r>
+              <a:t>thresholding voxel in exemplar region;</a:t>
+            </a:r>
+          </a:p>
+          <a:p>
+            <a:pPr algn="ctr"/>
             <a:r>
               <a:rPr lang="en-US" sz="1000" dirty="0" smtClean="0">
                 <a:solidFill>
@@ -5063,57 +4854,7 @@
                 <a:latin typeface="Times New Roman" panose="02020603050405020304" pitchFamily="18" charset="0"/>
                 <a:cs typeface="Times New Roman" panose="02020603050405020304" pitchFamily="18" charset="0"/>
               </a:rPr>
-              <a:t>in exemplar </a:t>
-            </a:r>
-            <a:r>
-              <a:rPr lang="en-US" sz="1000" dirty="0" smtClean="0">
-                <a:solidFill>
-                  <a:schemeClr val="tx1"/>
-                </a:solidFill>
-                <a:latin typeface="Times New Roman" panose="02020603050405020304" pitchFamily="18" charset="0"/>
-                <a:cs typeface="Times New Roman" panose="02020603050405020304" pitchFamily="18" charset="0"/>
-              </a:rPr>
-              <a:t>region;</a:t>
-            </a:r>
-            <a:endParaRPr lang="en-US" sz="1000" dirty="0" smtClean="0">
-              <a:solidFill>
-                <a:schemeClr val="tx1"/>
-              </a:solidFill>
-              <a:latin typeface="Times New Roman" panose="02020603050405020304" pitchFamily="18" charset="0"/>
-              <a:cs typeface="Times New Roman" panose="02020603050405020304" pitchFamily="18" charset="0"/>
-            </a:endParaRPr>
-          </a:p>
-          <a:p>
-            <a:pPr algn="ctr"/>
-            <a:r>
-              <a:rPr lang="en-US" sz="1000" dirty="0" smtClean="0">
-                <a:solidFill>
-                  <a:schemeClr val="tx1"/>
-                </a:solidFill>
-                <a:latin typeface="Times New Roman" panose="02020603050405020304" pitchFamily="18" charset="0"/>
-                <a:cs typeface="Times New Roman" panose="02020603050405020304" pitchFamily="18" charset="0"/>
-              </a:rPr>
-              <a:t>estimating geometric </a:t>
-            </a:r>
-            <a:r>
-              <a:rPr lang="en-US" sz="1000" dirty="0" smtClean="0">
-                <a:solidFill>
-                  <a:schemeClr val="tx1"/>
-                </a:solidFill>
-                <a:latin typeface="Times New Roman" panose="02020603050405020304" pitchFamily="18" charset="0"/>
-                <a:cs typeface="Times New Roman" panose="02020603050405020304" pitchFamily="18" charset="0"/>
-              </a:rPr>
-              <a:t>property </a:t>
-            </a:r>
-            <a:r>
-              <a:rPr lang="en-US" sz="1000" dirty="0" smtClean="0">
-                <a:solidFill>
-                  <a:schemeClr val="tx1"/>
-                </a:solidFill>
-                <a:latin typeface="Times New Roman" panose="02020603050405020304" pitchFamily="18" charset="0"/>
-                <a:cs typeface="Times New Roman" panose="02020603050405020304" pitchFamily="18" charset="0"/>
-              </a:rPr>
-              <a:t>in </a:t>
+              <a:t>estimating geometric property in </a:t>
             </a:r>
             <a:r>
               <a:rPr lang="en-US" sz="1000" dirty="0">
@@ -5147,13 +4888,13 @@
       </p:sp>
       <p:sp>
         <p:nvSpPr>
-          <p:cNvPr id="311" name="Flowchart: Alternate Process 310"/>
+          <p:cNvPr id="316" name="Flowchart: Alternate Process 315"/>
           <p:cNvSpPr/>
           <p:nvPr/>
         </p:nvSpPr>
         <p:spPr>
           <a:xfrm>
-            <a:off x="4495800" y="3627120"/>
+            <a:off x="4495800" y="5105400"/>
             <a:ext cx="3657600" cy="365760"/>
           </a:xfrm>
           <a:prstGeom prst="flowChartAlternateProcess">
@@ -5196,200 +4937,8 @@
                 <a:latin typeface="Times New Roman" panose="02020603050405020304" pitchFamily="18" charset="0"/>
                 <a:cs typeface="Times New Roman" panose="02020603050405020304" pitchFamily="18" charset="0"/>
               </a:rPr>
-              <a:t>preparing </a:t>
-            </a:r>
-            <a:r>
-              <a:rPr lang="en-US" sz="1000" dirty="0" smtClean="0">
-                <a:solidFill>
-                  <a:schemeClr val="tx1"/>
-                </a:solidFill>
-                <a:latin typeface="Times New Roman" panose="02020603050405020304" pitchFamily="18" charset="0"/>
-                <a:cs typeface="Times New Roman" panose="02020603050405020304" pitchFamily="18" charset="0"/>
-              </a:rPr>
-              <a:t>centralized exemplar regions for later region fitting;</a:t>
-            </a:r>
-          </a:p>
-          <a:p>
-            <a:pPr algn="ctr"/>
-            <a:r>
-              <a:rPr lang="en-US" sz="1000" dirty="0" smtClean="0">
-                <a:solidFill>
-                  <a:schemeClr val="tx1"/>
-                </a:solidFill>
-                <a:latin typeface="Times New Roman" panose="02020603050405020304" pitchFamily="18" charset="0"/>
-                <a:cs typeface="Times New Roman" panose="02020603050405020304" pitchFamily="18" charset="0"/>
-              </a:rPr>
-              <a:t>uses </a:t>
-            </a:r>
-            <a:r>
-              <a:rPr lang="en-US" sz="1000" dirty="0" smtClean="0">
-                <a:solidFill>
-                  <a:schemeClr val="tx1"/>
-                </a:solidFill>
-                <a:latin typeface="Times New Roman" panose="02020603050405020304" pitchFamily="18" charset="0"/>
-                <a:cs typeface="Times New Roman" panose="02020603050405020304" pitchFamily="18" charset="0"/>
-              </a:rPr>
-              <a:t>mass(i.e. voxel intensity value)-weighted center estimation;</a:t>
-            </a:r>
-            <a:endParaRPr lang="en-US" sz="1000" dirty="0">
-              <a:solidFill>
-                <a:schemeClr val="tx1"/>
-              </a:solidFill>
-              <a:latin typeface="Times New Roman" panose="02020603050405020304" pitchFamily="18" charset="0"/>
-              <a:cs typeface="Times New Roman" panose="02020603050405020304" pitchFamily="18" charset="0"/>
-            </a:endParaRPr>
-          </a:p>
-        </p:txBody>
-      </p:sp>
-      <p:sp>
-        <p:nvSpPr>
-          <p:cNvPr id="316" name="Flowchart: Alternate Process 315"/>
-          <p:cNvSpPr/>
-          <p:nvPr/>
-        </p:nvSpPr>
-        <p:spPr>
-          <a:xfrm>
-            <a:off x="4495800" y="4947922"/>
-            <a:ext cx="3657600" cy="365760"/>
-          </a:xfrm>
-          <a:prstGeom prst="flowChartAlternateProcess">
-            <a:avLst/>
-          </a:prstGeom>
-          <a:noFill/>
-          <a:ln w="12700">
-            <a:solidFill>
-              <a:schemeClr val="tx1"/>
-            </a:solidFill>
-            <a:prstDash val="sysDash"/>
-          </a:ln>
-        </p:spPr>
-        <p:style>
-          <a:lnRef idx="2">
-            <a:schemeClr val="accent1">
-              <a:shade val="50000"/>
-            </a:schemeClr>
-          </a:lnRef>
-          <a:fillRef idx="1">
-            <a:schemeClr val="accent1"/>
-          </a:fillRef>
-          <a:effectRef idx="0">
-            <a:schemeClr val="accent1"/>
-          </a:effectRef>
-          <a:fontRef idx="minor">
-            <a:schemeClr val="lt1"/>
-          </a:fontRef>
-        </p:style>
-        <p:txBody>
-          <a:bodyPr lIns="91440" tIns="91440" rIns="91440" bIns="91440" rtlCol="0" anchor="ctr"/>
-          <a:lstStyle/>
-          <a:p>
-            <a:pPr algn="ctr"/>
-            <a:r>
-              <a:rPr lang="en-US" sz="1000" dirty="0" smtClean="0">
-                <a:solidFill>
-                  <a:schemeClr val="tx1"/>
-                </a:solidFill>
-                <a:latin typeface="Times New Roman" panose="02020603050405020304" pitchFamily="18" charset="0"/>
-                <a:cs typeface="Times New Roman" panose="02020603050405020304" pitchFamily="18" charset="0"/>
-              </a:rPr>
-              <a:t>removing fragment regions based on </a:t>
-            </a:r>
-            <a:r>
-              <a:rPr lang="en-US" sz="1000" dirty="0" smtClean="0">
-                <a:solidFill>
-                  <a:schemeClr val="tx1"/>
-                </a:solidFill>
-                <a:latin typeface="Times New Roman" panose="02020603050405020304" pitchFamily="18" charset="0"/>
-                <a:cs typeface="Times New Roman" panose="02020603050405020304" pitchFamily="18" charset="0"/>
-              </a:rPr>
-              <a:t>criteria estimated from exemplar; </a:t>
-            </a:r>
-            <a:r>
-              <a:rPr lang="en-US" sz="1000" dirty="0" smtClean="0">
-                <a:solidFill>
-                  <a:schemeClr val="tx1"/>
-                </a:solidFill>
-                <a:latin typeface="Times New Roman" panose="02020603050405020304" pitchFamily="18" charset="0"/>
-                <a:cs typeface="Times New Roman" panose="02020603050405020304" pitchFamily="18" charset="0"/>
-              </a:rPr>
-              <a:t>obtaining segment labels from region growing;</a:t>
-            </a:r>
-          </a:p>
-        </p:txBody>
-      </p:sp>
-      <p:sp>
-        <p:nvSpPr>
-          <p:cNvPr id="319" name="Flowchart: Alternate Process 318"/>
-          <p:cNvSpPr/>
-          <p:nvPr/>
-        </p:nvSpPr>
-        <p:spPr>
-          <a:xfrm>
-            <a:off x="4495800" y="5410200"/>
-            <a:ext cx="3657600" cy="365760"/>
-          </a:xfrm>
-          <a:prstGeom prst="flowChartAlternateProcess">
-            <a:avLst/>
-          </a:prstGeom>
-          <a:noFill/>
-          <a:ln w="12700">
-            <a:solidFill>
-              <a:schemeClr val="tx1"/>
-            </a:solidFill>
-            <a:prstDash val="sysDash"/>
-          </a:ln>
-        </p:spPr>
-        <p:style>
-          <a:lnRef idx="2">
-            <a:schemeClr val="accent1">
-              <a:shade val="50000"/>
-            </a:schemeClr>
-          </a:lnRef>
-          <a:fillRef idx="1">
-            <a:schemeClr val="accent1"/>
-          </a:fillRef>
-          <a:effectRef idx="0">
-            <a:schemeClr val="accent1"/>
-          </a:effectRef>
-          <a:fontRef idx="minor">
-            <a:schemeClr val="lt1"/>
-          </a:fontRef>
-        </p:style>
-        <p:txBody>
-          <a:bodyPr lIns="91440" tIns="91440" rIns="91440" bIns="91440" rtlCol="0" anchor="ctr"/>
-          <a:lstStyle/>
-          <a:p>
-            <a:pPr algn="ctr"/>
-            <a:r>
-              <a:rPr lang="en-US" sz="1000" dirty="0" smtClean="0">
-                <a:solidFill>
-                  <a:schemeClr val="tx1"/>
-                </a:solidFill>
-                <a:latin typeface="Times New Roman" panose="02020603050405020304" pitchFamily="18" charset="0"/>
-                <a:cs typeface="Times New Roman" panose="02020603050405020304" pitchFamily="18" charset="0"/>
-              </a:rPr>
-              <a:t>further segmenting large regions, </a:t>
-            </a:r>
-          </a:p>
-          <a:p>
-            <a:pPr algn="ctr"/>
-            <a:r>
-              <a:rPr lang="en-US" sz="1000" dirty="0" smtClean="0">
-                <a:solidFill>
-                  <a:schemeClr val="tx1"/>
-                </a:solidFill>
-                <a:latin typeface="Times New Roman" panose="02020603050405020304" pitchFamily="18" charset="0"/>
-                <a:cs typeface="Times New Roman" panose="02020603050405020304" pitchFamily="18" charset="0"/>
-              </a:rPr>
-              <a:t>based on criteria estimated from exemplar;</a:t>
-            </a:r>
-            <a:endParaRPr lang="en-US" sz="1000" dirty="0" smtClean="0">
-              <a:solidFill>
-                <a:schemeClr val="tx1"/>
-              </a:solidFill>
-              <a:latin typeface="Times New Roman" panose="02020603050405020304" pitchFamily="18" charset="0"/>
-              <a:cs typeface="Times New Roman" panose="02020603050405020304" pitchFamily="18" charset="0"/>
-            </a:endParaRPr>
+              <a:t>removing fragment regions based on criteria estimated from exemplar; obtaining segment labels from region growing;</a:t>
+            </a:r>
           </a:p>
         </p:txBody>
       </p:sp>
@@ -5401,7 +4950,7 @@
         </p:nvSpPr>
         <p:spPr>
           <a:xfrm>
-            <a:off x="25400" y="2730620"/>
+            <a:off x="25400" y="2362200"/>
             <a:ext cx="2011680" cy="365760"/>
           </a:xfrm>
           <a:prstGeom prst="rect">
@@ -5460,16 +5009,6 @@
               <a:t>method based on multiple </a:t>
             </a:r>
             <a:r>
-              <a:rPr lang="en-US" sz="1000" dirty="0" err="1" smtClean="0">
-                <a:solidFill>
-                  <a:schemeClr val="bg1"/>
-                </a:solidFill>
-                <a:latin typeface="Times New Roman" panose="02020603050405020304" pitchFamily="18" charset="0"/>
-                <a:cs typeface="Times New Roman" panose="02020603050405020304" pitchFamily="18" charset="0"/>
-              </a:rPr>
-              <a:t>criterias</a:t>
-            </a:r>
-            <a:r>
               <a:rPr lang="en-US" sz="1000" dirty="0" smtClean="0">
                 <a:solidFill>
                   <a:schemeClr val="bg1"/>
@@ -5477,7 +5016,7 @@
                 <a:latin typeface="Times New Roman" panose="02020603050405020304" pitchFamily="18" charset="0"/>
                 <a:cs typeface="Times New Roman" panose="02020603050405020304" pitchFamily="18" charset="0"/>
               </a:rPr>
-              <a:t>;</a:t>
+              <a:t>criteria;</a:t>
             </a:r>
             <a:endParaRPr lang="en-US" sz="1000" dirty="0">
               <a:solidFill>
@@ -5497,7 +5036,7 @@
         </p:nvSpPr>
         <p:spPr>
           <a:xfrm rot="16200000">
-            <a:off x="2036090" y="2776341"/>
+            <a:off x="2036090" y="2407921"/>
             <a:ext cx="182880" cy="274320"/>
           </a:xfrm>
           <a:prstGeom prst="downArrow">
@@ -5537,264 +5076,6 @@
           </a:p>
         </p:txBody>
       </p:sp>
-      <p:sp>
-        <p:nvSpPr>
-          <p:cNvPr id="325" name="Rectangle 324"/>
-          <p:cNvSpPr/>
-          <p:nvPr/>
-        </p:nvSpPr>
-        <p:spPr>
-          <a:xfrm>
-            <a:off x="25400" y="5039362"/>
-            <a:ext cx="2011680" cy="645158"/>
-          </a:xfrm>
-          <a:prstGeom prst="rect">
-            <a:avLst/>
-          </a:prstGeom>
-          <a:solidFill>
-            <a:schemeClr val="accent6">
-              <a:lumMod val="50000"/>
-            </a:schemeClr>
-          </a:solidFill>
-          <a:ln w="12700">
-            <a:solidFill>
-              <a:schemeClr val="tx1"/>
-            </a:solidFill>
-          </a:ln>
-        </p:spPr>
-        <p:style>
-          <a:lnRef idx="2">
-            <a:schemeClr val="accent1">
-              <a:shade val="50000"/>
-            </a:schemeClr>
-          </a:lnRef>
-          <a:fillRef idx="1">
-            <a:schemeClr val="accent1"/>
-          </a:fillRef>
-          <a:effectRef idx="0">
-            <a:schemeClr val="accent1"/>
-          </a:effectRef>
-          <a:fontRef idx="minor">
-            <a:schemeClr val="lt1"/>
-          </a:fontRef>
-        </p:style>
-        <p:txBody>
-          <a:bodyPr lIns="91440" tIns="91440" rIns="91440" bIns="91440" rtlCol="0" anchor="ctr"/>
-          <a:lstStyle/>
-          <a:p>
-            <a:pPr algn="ctr"/>
-            <a:r>
-              <a:rPr lang="en-US" sz="1000" dirty="0" smtClean="0">
-                <a:solidFill>
-                  <a:schemeClr val="bg1"/>
-                </a:solidFill>
-                <a:latin typeface="Times New Roman" panose="02020603050405020304" pitchFamily="18" charset="0"/>
-                <a:cs typeface="Times New Roman" panose="02020603050405020304" pitchFamily="18" charset="0"/>
-              </a:rPr>
-              <a:t>Replace the </a:t>
-            </a:r>
-            <a:r>
-              <a:rPr lang="en-US" sz="1000" dirty="0" smtClean="0">
-                <a:solidFill>
-                  <a:schemeClr val="bg1"/>
-                </a:solidFill>
-                <a:latin typeface="Times New Roman" panose="02020603050405020304" pitchFamily="18" charset="0"/>
-                <a:cs typeface="Times New Roman" panose="02020603050405020304" pitchFamily="18" charset="0"/>
-              </a:rPr>
-              <a:t>current PHC </a:t>
-            </a:r>
-            <a:r>
-              <a:rPr lang="en-US" sz="1000" dirty="0" smtClean="0">
-                <a:solidFill>
-                  <a:schemeClr val="bg1"/>
-                </a:solidFill>
-                <a:latin typeface="Times New Roman" panose="02020603050405020304" pitchFamily="18" charset="0"/>
-                <a:cs typeface="Times New Roman" panose="02020603050405020304" pitchFamily="18" charset="0"/>
-              </a:rPr>
-              <a:t>method with </a:t>
-            </a:r>
-            <a:r>
-              <a:rPr lang="en-US" sz="1000" dirty="0" smtClean="0">
-                <a:solidFill>
-                  <a:schemeClr val="bg1"/>
-                </a:solidFill>
-                <a:latin typeface="Times New Roman" panose="02020603050405020304" pitchFamily="18" charset="0"/>
-                <a:cs typeface="Times New Roman" panose="02020603050405020304" pitchFamily="18" charset="0"/>
-              </a:rPr>
-              <a:t>(region fitting)+(seed-based region growing);</a:t>
-            </a:r>
-            <a:endParaRPr lang="en-US" sz="1000" dirty="0">
-              <a:solidFill>
-                <a:schemeClr val="bg1"/>
-              </a:solidFill>
-              <a:latin typeface="Times New Roman" panose="02020603050405020304" pitchFamily="18" charset="0"/>
-              <a:cs typeface="Times New Roman" panose="02020603050405020304" pitchFamily="18" charset="0"/>
-            </a:endParaRPr>
-          </a:p>
-        </p:txBody>
-      </p:sp>
-      <p:sp>
-        <p:nvSpPr>
-          <p:cNvPr id="326" name="Down Arrow 325"/>
-          <p:cNvSpPr/>
-          <p:nvPr/>
-        </p:nvSpPr>
-        <p:spPr>
-          <a:xfrm rot="16200000">
-            <a:off x="2032497" y="5212039"/>
-            <a:ext cx="182880" cy="274320"/>
-          </a:xfrm>
-          <a:prstGeom prst="downArrow">
-            <a:avLst/>
-          </a:prstGeom>
-          <a:solidFill>
-            <a:srgbClr val="FFFF00"/>
-          </a:solidFill>
-          <a:ln w="12700">
-            <a:solidFill>
-              <a:schemeClr val="tx1"/>
-            </a:solidFill>
-          </a:ln>
-        </p:spPr>
-        <p:style>
-          <a:lnRef idx="2">
-            <a:schemeClr val="accent1">
-              <a:shade val="50000"/>
-            </a:schemeClr>
-          </a:lnRef>
-          <a:fillRef idx="1">
-            <a:schemeClr val="accent1"/>
-          </a:fillRef>
-          <a:effectRef idx="0">
-            <a:schemeClr val="accent1"/>
-          </a:effectRef>
-          <a:fontRef idx="minor">
-            <a:schemeClr val="lt1"/>
-          </a:fontRef>
-        </p:style>
-        <p:txBody>
-          <a:bodyPr rtlCol="0" anchor="ctr"/>
-          <a:lstStyle/>
-          <a:p>
-            <a:pPr algn="ctr"/>
-            <a:endParaRPr lang="en-US"/>
-          </a:p>
-        </p:txBody>
-      </p:sp>
-      <p:sp>
-        <p:nvSpPr>
-          <p:cNvPr id="328" name="Rectangle 327"/>
-          <p:cNvSpPr/>
-          <p:nvPr/>
-        </p:nvSpPr>
-        <p:spPr>
-          <a:xfrm>
-            <a:off x="25400" y="4511040"/>
-            <a:ext cx="2011680" cy="365760"/>
-          </a:xfrm>
-          <a:prstGeom prst="rect">
-            <a:avLst/>
-          </a:prstGeom>
-          <a:solidFill>
-            <a:schemeClr val="accent6">
-              <a:lumMod val="50000"/>
-            </a:schemeClr>
-          </a:solidFill>
-          <a:ln w="12700">
-            <a:solidFill>
-              <a:schemeClr val="tx1"/>
-            </a:solidFill>
-          </a:ln>
-        </p:spPr>
-        <p:style>
-          <a:lnRef idx="2">
-            <a:schemeClr val="accent1">
-              <a:shade val="50000"/>
-            </a:schemeClr>
-          </a:lnRef>
-          <a:fillRef idx="1">
-            <a:schemeClr val="accent1"/>
-          </a:fillRef>
-          <a:effectRef idx="0">
-            <a:schemeClr val="accent1"/>
-          </a:effectRef>
-          <a:fontRef idx="minor">
-            <a:schemeClr val="lt1"/>
-          </a:fontRef>
-        </p:style>
-        <p:txBody>
-          <a:bodyPr lIns="91440" tIns="91440" rIns="91440" bIns="91440" rtlCol="0" anchor="ctr"/>
-          <a:lstStyle/>
-          <a:p>
-            <a:pPr algn="ctr"/>
-            <a:r>
-              <a:rPr lang="en-US" sz="1000" dirty="0" smtClean="0">
-                <a:solidFill>
-                  <a:schemeClr val="bg1"/>
-                </a:solidFill>
-                <a:latin typeface="Times New Roman" panose="02020603050405020304" pitchFamily="18" charset="0"/>
-                <a:cs typeface="Times New Roman" panose="02020603050405020304" pitchFamily="18" charset="0"/>
-              </a:rPr>
-              <a:t>This step is not necessary, if the followed improvement is made;</a:t>
-            </a:r>
-            <a:endParaRPr lang="en-US" sz="1000" dirty="0">
-              <a:solidFill>
-                <a:schemeClr val="bg1"/>
-              </a:solidFill>
-              <a:latin typeface="Times New Roman" panose="02020603050405020304" pitchFamily="18" charset="0"/>
-              <a:cs typeface="Times New Roman" panose="02020603050405020304" pitchFamily="18" charset="0"/>
-            </a:endParaRPr>
-          </a:p>
-        </p:txBody>
-      </p:sp>
-      <p:sp>
-        <p:nvSpPr>
-          <p:cNvPr id="329" name="Down Arrow 328"/>
-          <p:cNvSpPr/>
-          <p:nvPr/>
-        </p:nvSpPr>
-        <p:spPr>
-          <a:xfrm rot="16200000">
-            <a:off x="2037577" y="4546600"/>
-            <a:ext cx="182880" cy="274320"/>
-          </a:xfrm>
-          <a:prstGeom prst="downArrow">
-            <a:avLst/>
-          </a:prstGeom>
-          <a:solidFill>
-            <a:srgbClr val="FFFF00"/>
-          </a:solidFill>
-          <a:ln w="12700">
-            <a:solidFill>
-              <a:schemeClr val="tx1"/>
-            </a:solidFill>
-          </a:ln>
-        </p:spPr>
-        <p:style>
-          <a:lnRef idx="2">
-            <a:schemeClr val="accent1">
-              <a:shade val="50000"/>
-            </a:schemeClr>
-          </a:lnRef>
-          <a:fillRef idx="1">
-            <a:schemeClr val="accent1"/>
-          </a:fillRef>
-          <a:effectRef idx="0">
-            <a:schemeClr val="accent1"/>
-          </a:effectRef>
-          <a:fontRef idx="minor">
-            <a:schemeClr val="lt1"/>
-          </a:fontRef>
-        </p:style>
-        <p:txBody>
-          <a:bodyPr rtlCol="0" anchor="ctr"/>
-          <a:lstStyle/>
-          <a:p>
-            <a:pPr algn="ctr"/>
-            <a:endParaRPr lang="en-US"/>
-          </a:p>
-        </p:txBody>
-      </p:sp>
       <p:cxnSp>
         <p:nvCxnSpPr>
           <p:cNvPr id="60" name="Straight Arrow Connector 59"/>
@@ -5817,110 +5098,6 @@
               <a:schemeClr val="tx1"/>
             </a:solidFill>
             <a:tailEnd type="triangle"/>
-          </a:ln>
-        </p:spPr>
-        <p:style>
-          <a:lnRef idx="1">
-            <a:schemeClr val="accent1"/>
-          </a:lnRef>
-          <a:fillRef idx="0">
-            <a:schemeClr val="accent1"/>
-          </a:fillRef>
-          <a:effectRef idx="0">
-            <a:schemeClr val="accent1"/>
-          </a:effectRef>
-          <a:fontRef idx="minor">
-            <a:schemeClr val="tx1"/>
-          </a:fontRef>
-        </p:style>
-      </p:cxnSp>
-      <p:sp>
-        <p:nvSpPr>
-          <p:cNvPr id="68" name="Flowchart: Alternate Process 67"/>
-          <p:cNvSpPr/>
-          <p:nvPr/>
-        </p:nvSpPr>
-        <p:spPr>
-          <a:xfrm>
-            <a:off x="4861560" y="2364383"/>
-            <a:ext cx="3291840" cy="182880"/>
-          </a:xfrm>
-          <a:prstGeom prst="flowChartAlternateProcess">
-            <a:avLst/>
-          </a:prstGeom>
-          <a:noFill/>
-          <a:ln w="12700">
-            <a:solidFill>
-              <a:schemeClr val="tx1"/>
-            </a:solidFill>
-            <a:prstDash val="sysDash"/>
-          </a:ln>
-        </p:spPr>
-        <p:style>
-          <a:lnRef idx="2">
-            <a:schemeClr val="accent1">
-              <a:shade val="50000"/>
-            </a:schemeClr>
-          </a:lnRef>
-          <a:fillRef idx="1">
-            <a:schemeClr val="accent1"/>
-          </a:fillRef>
-          <a:effectRef idx="0">
-            <a:schemeClr val="accent1"/>
-          </a:effectRef>
-          <a:fontRef idx="minor">
-            <a:schemeClr val="lt1"/>
-          </a:fontRef>
-        </p:style>
-        <p:txBody>
-          <a:bodyPr lIns="91440" tIns="91440" rIns="91440" bIns="91440" rtlCol="0" anchor="ctr"/>
-          <a:lstStyle/>
-          <a:p>
-            <a:pPr algn="ctr"/>
-            <a:r>
-              <a:rPr lang="en-US" sz="1000" dirty="0" smtClean="0">
-                <a:solidFill>
-                  <a:schemeClr val="tx1"/>
-                </a:solidFill>
-                <a:latin typeface="Times New Roman" panose="02020603050405020304" pitchFamily="18" charset="0"/>
-                <a:cs typeface="Times New Roman" panose="02020603050405020304" pitchFamily="18" charset="0"/>
-              </a:rPr>
-              <a:t>Seed-based region growing with self-estimated stop criteria;</a:t>
-            </a:r>
-            <a:endParaRPr lang="en-US" sz="1000" dirty="0">
-              <a:solidFill>
-                <a:schemeClr val="tx1"/>
-              </a:solidFill>
-              <a:latin typeface="Times New Roman" panose="02020603050405020304" pitchFamily="18" charset="0"/>
-              <a:cs typeface="Times New Roman" panose="02020603050405020304" pitchFamily="18" charset="0"/>
-            </a:endParaRPr>
-          </a:p>
-        </p:txBody>
-      </p:sp>
-      <p:cxnSp>
-        <p:nvCxnSpPr>
-          <p:cNvPr id="69" name="Straight Arrow Connector 68"/>
-          <p:cNvCxnSpPr>
-            <a:stCxn id="280" idx="3"/>
-            <a:endCxn id="68" idx="1"/>
-          </p:cNvCxnSpPr>
-          <p:nvPr/>
-        </p:nvCxnSpPr>
-        <p:spPr>
-          <a:xfrm flipV="1">
-            <a:off x="4069080" y="2455823"/>
-            <a:ext cx="792480" cy="3137"/>
-          </a:xfrm>
-          <a:prstGeom prst="straightConnector1">
-            <a:avLst/>
-          </a:prstGeom>
-          <a:ln w="12700">
-            <a:solidFill>
-              <a:schemeClr val="tx1"/>
-            </a:solidFill>
-            <a:prstDash val="sysDash"/>
-            <a:headEnd type="none" w="med" len="med"/>
-            <a:tailEnd type="none" w="med" len="med"/>
           </a:ln>
         </p:spPr>
         <p:style>
@@ -5949,49 +5126,8 @@
         </p:nvCxnSpPr>
         <p:spPr>
           <a:xfrm>
-            <a:off x="4069080" y="3398520"/>
+            <a:off x="4069080" y="3952238"/>
             <a:ext cx="883920" cy="0"/>
-          </a:xfrm>
-          <a:prstGeom prst="straightConnector1">
-            <a:avLst/>
-          </a:prstGeom>
-          <a:ln w="12700">
-            <a:solidFill>
-              <a:schemeClr val="tx1"/>
-            </a:solidFill>
-            <a:prstDash val="sysDash"/>
-            <a:headEnd type="none" w="med" len="med"/>
-            <a:tailEnd type="none" w="med" len="med"/>
-          </a:ln>
-        </p:spPr>
-        <p:style>
-          <a:lnRef idx="1">
-            <a:schemeClr val="accent1"/>
-          </a:lnRef>
-          <a:fillRef idx="0">
-            <a:schemeClr val="accent1"/>
-          </a:fillRef>
-          <a:effectRef idx="0">
-            <a:schemeClr val="accent1"/>
-          </a:effectRef>
-          <a:fontRef idx="minor">
-            <a:schemeClr val="tx1"/>
-          </a:fontRef>
-        </p:style>
-      </p:cxnSp>
-      <p:cxnSp>
-        <p:nvCxnSpPr>
-          <p:cNvPr id="78" name="Straight Arrow Connector 77"/>
-          <p:cNvCxnSpPr>
-            <a:stCxn id="294" idx="3"/>
-            <a:endCxn id="311" idx="1"/>
-          </p:cNvCxnSpPr>
-          <p:nvPr/>
-        </p:nvCxnSpPr>
-        <p:spPr>
-          <a:xfrm>
-            <a:off x="4069080" y="3810000"/>
-            <a:ext cx="426720" cy="0"/>
           </a:xfrm>
           <a:prstGeom prst="straightConnector1">
             <a:avLst/>
@@ -6031,7 +5167,7 @@
         </p:nvCxnSpPr>
         <p:spPr>
           <a:xfrm>
-            <a:off x="4069080" y="4220135"/>
+            <a:off x="4069080" y="4815840"/>
             <a:ext cx="426720" cy="0"/>
           </a:xfrm>
           <a:prstGeom prst="straightConnector1">
@@ -6072,7 +5208,7 @@
         </p:nvCxnSpPr>
         <p:spPr>
           <a:xfrm>
-            <a:off x="4069080" y="5130802"/>
+            <a:off x="4069080" y="5288280"/>
             <a:ext cx="426720" cy="0"/>
           </a:xfrm>
           <a:prstGeom prst="straightConnector1">
@@ -6104,97 +5240,17 @@
       </p:cxnSp>
       <p:cxnSp>
         <p:nvCxnSpPr>
-          <p:cNvPr id="88" name="Straight Arrow Connector 87"/>
-          <p:cNvCxnSpPr>
-            <a:stCxn id="301" idx="3"/>
-            <a:endCxn id="319" idx="1"/>
-          </p:cNvCxnSpPr>
-          <p:nvPr/>
-        </p:nvCxnSpPr>
-        <p:spPr>
-          <a:xfrm>
-            <a:off x="4069080" y="5593080"/>
-            <a:ext cx="426720" cy="0"/>
-          </a:xfrm>
-          <a:prstGeom prst="straightConnector1">
-            <a:avLst/>
-          </a:prstGeom>
-          <a:ln w="12700">
-            <a:solidFill>
-              <a:schemeClr val="tx1"/>
-            </a:solidFill>
-            <a:prstDash val="sysDash"/>
-            <a:headEnd type="none" w="med" len="med"/>
-            <a:tailEnd type="none" w="med" len="med"/>
-          </a:ln>
-        </p:spPr>
-        <p:style>
-          <a:lnRef idx="1">
-            <a:schemeClr val="accent1"/>
-          </a:lnRef>
-          <a:fillRef idx="0">
-            <a:schemeClr val="accent1"/>
-          </a:fillRef>
-          <a:effectRef idx="0">
-            <a:schemeClr val="accent1"/>
-          </a:effectRef>
-          <a:fontRef idx="minor">
-            <a:schemeClr val="tx1"/>
-          </a:fontRef>
-        </p:style>
-      </p:cxnSp>
-      <p:cxnSp>
-        <p:nvCxnSpPr>
           <p:cNvPr id="91" name="Straight Arrow Connector 90"/>
           <p:cNvCxnSpPr>
-            <a:stCxn id="280" idx="2"/>
-            <a:endCxn id="296" idx="0"/>
-          </p:cNvCxnSpPr>
-          <p:nvPr/>
-        </p:nvCxnSpPr>
-        <p:spPr>
-          <a:xfrm>
-            <a:off x="3154680" y="2550400"/>
-            <a:ext cx="0" cy="180220"/>
-          </a:xfrm>
-          <a:prstGeom prst="straightConnector1">
-            <a:avLst/>
-          </a:prstGeom>
-          <a:ln w="12700">
-            <a:solidFill>
-              <a:schemeClr val="tx1"/>
-            </a:solidFill>
-            <a:tailEnd type="triangle"/>
-          </a:ln>
-        </p:spPr>
-        <p:style>
-          <a:lnRef idx="1">
-            <a:schemeClr val="accent1"/>
-          </a:lnRef>
-          <a:fillRef idx="0">
-            <a:schemeClr val="accent1"/>
-          </a:fillRef>
-          <a:effectRef idx="0">
-            <a:schemeClr val="accent1"/>
-          </a:effectRef>
-          <a:fontRef idx="minor">
-            <a:schemeClr val="tx1"/>
-          </a:fontRef>
-        </p:style>
-      </p:cxnSp>
-      <p:cxnSp>
-        <p:nvCxnSpPr>
-          <p:cNvPr id="94" name="Straight Arrow Connector 93"/>
-          <p:cNvCxnSpPr>
-            <a:stCxn id="296" idx="2"/>
+            <a:stCxn id="66" idx="2"/>
             <a:endCxn id="300" idx="0"/>
           </p:cNvCxnSpPr>
           <p:nvPr/>
         </p:nvCxnSpPr>
         <p:spPr>
           <a:xfrm>
-            <a:off x="3154680" y="3096380"/>
-            <a:ext cx="0" cy="210700"/>
+            <a:off x="3154680" y="3636373"/>
+            <a:ext cx="0" cy="224425"/>
           </a:xfrm>
           <a:prstGeom prst="straightConnector1">
             <a:avLst/>
@@ -6232,8 +5288,8 @@
         </p:nvCxnSpPr>
         <p:spPr>
           <a:xfrm>
-            <a:off x="3154680" y="3489960"/>
-            <a:ext cx="0" cy="228600"/>
+            <a:off x="3154680" y="4043678"/>
+            <a:ext cx="0" cy="147322"/>
           </a:xfrm>
           <a:prstGeom prst="straightConnector1">
             <a:avLst/>
@@ -6271,47 +5327,8 @@
         </p:nvCxnSpPr>
         <p:spPr>
           <a:xfrm>
-            <a:off x="3154680" y="3901440"/>
-            <a:ext cx="0" cy="227255"/>
-          </a:xfrm>
-          <a:prstGeom prst="straightConnector1">
-            <a:avLst/>
-          </a:prstGeom>
-          <a:ln w="12700">
-            <a:solidFill>
-              <a:schemeClr val="tx1"/>
-            </a:solidFill>
-            <a:tailEnd type="triangle"/>
-          </a:ln>
-        </p:spPr>
-        <p:style>
-          <a:lnRef idx="1">
-            <a:schemeClr val="accent1"/>
-          </a:lnRef>
-          <a:fillRef idx="0">
-            <a:schemeClr val="accent1"/>
-          </a:fillRef>
-          <a:effectRef idx="0">
-            <a:schemeClr val="accent1"/>
-          </a:effectRef>
-          <a:fontRef idx="minor">
-            <a:schemeClr val="tx1"/>
-          </a:fontRef>
-        </p:style>
-      </p:cxnSp>
-      <p:cxnSp>
-        <p:nvCxnSpPr>
-          <p:cNvPr id="104" name="Straight Arrow Connector 103"/>
-          <p:cNvCxnSpPr>
-            <a:stCxn id="293" idx="2"/>
-            <a:endCxn id="295" idx="0"/>
-          </p:cNvCxnSpPr>
-          <p:nvPr/>
-        </p:nvCxnSpPr>
-        <p:spPr>
-          <a:xfrm>
-            <a:off x="3154680" y="4311575"/>
-            <a:ext cx="0" cy="280745"/>
+            <a:off x="3154680" y="4556760"/>
+            <a:ext cx="0" cy="167640"/>
           </a:xfrm>
           <a:prstGeom prst="straightConnector1">
             <a:avLst/>
@@ -6342,15 +5359,15 @@
         <p:nvCxnSpPr>
           <p:cNvPr id="107" name="Straight Arrow Connector 106"/>
           <p:cNvCxnSpPr>
-            <a:stCxn id="295" idx="2"/>
+            <a:stCxn id="293" idx="2"/>
             <a:endCxn id="292" idx="0"/>
           </p:cNvCxnSpPr>
           <p:nvPr/>
         </p:nvCxnSpPr>
         <p:spPr>
           <a:xfrm>
-            <a:off x="3154680" y="4775200"/>
-            <a:ext cx="0" cy="264162"/>
+            <a:off x="3154680" y="4907280"/>
+            <a:ext cx="0" cy="289560"/>
           </a:xfrm>
           <a:prstGeom prst="straightConnector1">
             <a:avLst/>
@@ -6377,45 +5394,6 @@
           </a:fontRef>
         </p:style>
       </p:cxnSp>
-      <p:cxnSp>
-        <p:nvCxnSpPr>
-          <p:cNvPr id="110" name="Straight Arrow Connector 109"/>
-          <p:cNvCxnSpPr>
-            <a:stCxn id="292" idx="2"/>
-            <a:endCxn id="301" idx="0"/>
-          </p:cNvCxnSpPr>
-          <p:nvPr/>
-        </p:nvCxnSpPr>
-        <p:spPr>
-          <a:xfrm>
-            <a:off x="3154680" y="5222242"/>
-            <a:ext cx="0" cy="279398"/>
-          </a:xfrm>
-          <a:prstGeom prst="straightConnector1">
-            <a:avLst/>
-          </a:prstGeom>
-          <a:ln w="12700">
-            <a:solidFill>
-              <a:schemeClr val="tx1"/>
-            </a:solidFill>
-            <a:tailEnd type="triangle"/>
-          </a:ln>
-        </p:spPr>
-        <p:style>
-          <a:lnRef idx="1">
-            <a:schemeClr val="accent1"/>
-          </a:lnRef>
-          <a:fillRef idx="0">
-            <a:schemeClr val="accent1"/>
-          </a:fillRef>
-          <a:effectRef idx="0">
-            <a:schemeClr val="accent1"/>
-          </a:effectRef>
-          <a:fontRef idx="minor">
-            <a:schemeClr val="tx1"/>
-          </a:fontRef>
-        </p:style>
-      </p:cxnSp>
       <p:sp>
         <p:nvSpPr>
           <p:cNvPr id="114" name="Rectangle 113"/>
@@ -6424,7 +5402,7 @@
         </p:nvSpPr>
         <p:spPr>
           <a:xfrm>
-            <a:off x="25400" y="3307080"/>
+            <a:off x="25400" y="3860798"/>
             <a:ext cx="2011680" cy="182880"/>
           </a:xfrm>
           <a:prstGeom prst="rect">
@@ -6490,7 +5468,7 @@
         </p:nvSpPr>
         <p:spPr>
           <a:xfrm rot="16200000">
-            <a:off x="2036090" y="3261360"/>
+            <a:off x="2036090" y="3815078"/>
             <a:ext cx="182880" cy="274320"/>
           </a:xfrm>
           <a:prstGeom prst="downArrow">
@@ -6647,14 +5625,14 @@
           <p:cNvPr id="121" name="Straight Arrow Connector 120"/>
           <p:cNvCxnSpPr>
             <a:stCxn id="277" idx="2"/>
-            <a:endCxn id="280" idx="0"/>
+            <a:endCxn id="296" idx="0"/>
           </p:cNvCxnSpPr>
           <p:nvPr/>
         </p:nvCxnSpPr>
         <p:spPr>
           <a:xfrm>
             <a:off x="3154680" y="2164080"/>
-            <a:ext cx="0" cy="203440"/>
+            <a:ext cx="0" cy="198120"/>
           </a:xfrm>
           <a:prstGeom prst="straightConnector1">
             <a:avLst/>
@@ -6689,7 +5667,7 @@
         </p:nvCxnSpPr>
         <p:spPr>
           <a:xfrm>
-            <a:off x="0" y="2209800"/>
+            <a:off x="0" y="2217964"/>
             <a:ext cx="8229600" cy="0"/>
           </a:xfrm>
           <a:prstGeom prst="line">
@@ -6840,7 +5818,7 @@
         </p:nvCxnSpPr>
         <p:spPr>
           <a:xfrm>
-            <a:off x="0" y="5867400"/>
+            <a:off x="0" y="5562600"/>
             <a:ext cx="8229600" cy="0"/>
           </a:xfrm>
           <a:prstGeom prst="line">
@@ -6877,8 +5855,8 @@
         </p:nvSpPr>
         <p:spPr>
           <a:xfrm>
-            <a:off x="3352800" y="5958840"/>
-            <a:ext cx="1828800" cy="365760"/>
+            <a:off x="3352800" y="5654040"/>
+            <a:ext cx="1828800" cy="457200"/>
           </a:xfrm>
           <a:prstGeom prst="rect">
             <a:avLst/>
@@ -6943,8 +5921,8 @@
         </p:nvSpPr>
         <p:spPr>
           <a:xfrm>
-            <a:off x="762000" y="5958840"/>
-            <a:ext cx="1828800" cy="365760"/>
+            <a:off x="762000" y="5654040"/>
+            <a:ext cx="1828800" cy="457200"/>
           </a:xfrm>
           <a:prstGeom prst="rect">
             <a:avLst/>
@@ -7001,14 +5979,324 @@
       </p:sp>
       <p:sp>
         <p:nvSpPr>
-          <p:cNvPr id="130" name="Rectangle 129"/>
+          <p:cNvPr id="66" name="Rectangle 65"/>
           <p:cNvSpPr/>
           <p:nvPr/>
         </p:nvSpPr>
         <p:spPr>
           <a:xfrm>
-            <a:off x="5943600" y="5958840"/>
-            <a:ext cx="1828800" cy="365760"/>
+            <a:off x="2240280" y="3453493"/>
+            <a:ext cx="1828800" cy="182880"/>
+          </a:xfrm>
+          <a:prstGeom prst="rect">
+            <a:avLst/>
+          </a:prstGeom>
+          <a:solidFill>
+            <a:schemeClr val="bg1"/>
+          </a:solidFill>
+          <a:ln w="12700">
+            <a:solidFill>
+              <a:schemeClr val="tx1"/>
+            </a:solidFill>
+          </a:ln>
+        </p:spPr>
+        <p:style>
+          <a:lnRef idx="2">
+            <a:schemeClr val="accent1">
+              <a:shade val="50000"/>
+            </a:schemeClr>
+          </a:lnRef>
+          <a:fillRef idx="1">
+            <a:schemeClr val="accent1"/>
+          </a:fillRef>
+          <a:effectRef idx="0">
+            <a:schemeClr val="accent1"/>
+          </a:effectRef>
+          <a:fontRef idx="minor">
+            <a:schemeClr val="lt1"/>
+          </a:fontRef>
+        </p:style>
+        <p:txBody>
+          <a:bodyPr lIns="91440" tIns="91440" rIns="91440" bIns="91440" rtlCol="0" anchor="ctr"/>
+          <a:lstStyle/>
+          <a:p>
+            <a:pPr algn="ctr"/>
+            <a:r>
+              <a:rPr lang="en-US" sz="1000" dirty="0" err="1" smtClean="0">
+                <a:solidFill>
+                  <a:schemeClr val="tx1"/>
+                </a:solidFill>
+                <a:latin typeface="Times New Roman" panose="02020603050405020304" pitchFamily="18" charset="0"/>
+                <a:cs typeface="Times New Roman" panose="02020603050405020304" pitchFamily="18" charset="0"/>
+              </a:rPr>
+              <a:t>regonGrowOnExemplar</a:t>
+            </a:r>
+            <a:endParaRPr lang="en-US" sz="1000" dirty="0">
+              <a:solidFill>
+                <a:schemeClr val="tx1"/>
+              </a:solidFill>
+              <a:latin typeface="Times New Roman" panose="02020603050405020304" pitchFamily="18" charset="0"/>
+              <a:cs typeface="Times New Roman" panose="02020603050405020304" pitchFamily="18" charset="0"/>
+            </a:endParaRPr>
+          </a:p>
+        </p:txBody>
+      </p:sp>
+      <p:sp>
+        <p:nvSpPr>
+          <p:cNvPr id="67" name="Flowchart: Alternate Process 66"/>
+          <p:cNvSpPr/>
+          <p:nvPr/>
+        </p:nvSpPr>
+        <p:spPr>
+          <a:xfrm>
+            <a:off x="4861560" y="3449318"/>
+            <a:ext cx="3291840" cy="182880"/>
+          </a:xfrm>
+          <a:prstGeom prst="flowChartAlternateProcess">
+            <a:avLst/>
+          </a:prstGeom>
+          <a:noFill/>
+          <a:ln w="12700">
+            <a:solidFill>
+              <a:schemeClr val="tx1"/>
+            </a:solidFill>
+            <a:prstDash val="sysDash"/>
+          </a:ln>
+        </p:spPr>
+        <p:style>
+          <a:lnRef idx="2">
+            <a:schemeClr val="accent1">
+              <a:shade val="50000"/>
+            </a:schemeClr>
+          </a:lnRef>
+          <a:fillRef idx="1">
+            <a:schemeClr val="accent1"/>
+          </a:fillRef>
+          <a:effectRef idx="0">
+            <a:schemeClr val="accent1"/>
+          </a:effectRef>
+          <a:fontRef idx="minor">
+            <a:schemeClr val="lt1"/>
+          </a:fontRef>
+        </p:style>
+        <p:txBody>
+          <a:bodyPr lIns="91440" tIns="91440" rIns="91440" bIns="91440" rtlCol="0" anchor="ctr"/>
+          <a:lstStyle/>
+          <a:p>
+            <a:pPr algn="ctr"/>
+            <a:r>
+              <a:rPr lang="en-US" sz="1000" dirty="0" smtClean="0">
+                <a:solidFill>
+                  <a:schemeClr val="tx1"/>
+                </a:solidFill>
+                <a:latin typeface="Times New Roman" panose="02020603050405020304" pitchFamily="18" charset="0"/>
+                <a:cs typeface="Times New Roman" panose="02020603050405020304" pitchFamily="18" charset="0"/>
+              </a:rPr>
+              <a:t>Seed-based region growing with self-estimated stop criteria;</a:t>
+            </a:r>
+            <a:endParaRPr lang="en-US" sz="1000" dirty="0">
+              <a:solidFill>
+                <a:schemeClr val="tx1"/>
+              </a:solidFill>
+              <a:latin typeface="Times New Roman" panose="02020603050405020304" pitchFamily="18" charset="0"/>
+              <a:cs typeface="Times New Roman" panose="02020603050405020304" pitchFamily="18" charset="0"/>
+            </a:endParaRPr>
+          </a:p>
+        </p:txBody>
+      </p:sp>
+      <p:cxnSp>
+        <p:nvCxnSpPr>
+          <p:cNvPr id="70" name="Straight Arrow Connector 69"/>
+          <p:cNvCxnSpPr>
+            <a:stCxn id="66" idx="3"/>
+            <a:endCxn id="67" idx="1"/>
+          </p:cNvCxnSpPr>
+          <p:nvPr/>
+        </p:nvCxnSpPr>
+        <p:spPr>
+          <a:xfrm flipV="1">
+            <a:off x="4069080" y="3540758"/>
+            <a:ext cx="792480" cy="4175"/>
+          </a:xfrm>
+          <a:prstGeom prst="straightConnector1">
+            <a:avLst/>
+          </a:prstGeom>
+          <a:ln w="12700">
+            <a:solidFill>
+              <a:schemeClr val="tx1"/>
+            </a:solidFill>
+            <a:prstDash val="sysDash"/>
+            <a:headEnd type="none" w="med" len="med"/>
+            <a:tailEnd type="none" w="med" len="med"/>
+          </a:ln>
+        </p:spPr>
+        <p:style>
+          <a:lnRef idx="1">
+            <a:schemeClr val="accent1"/>
+          </a:lnRef>
+          <a:fillRef idx="0">
+            <a:schemeClr val="accent1"/>
+          </a:fillRef>
+          <a:effectRef idx="0">
+            <a:schemeClr val="accent1"/>
+          </a:effectRef>
+          <a:fontRef idx="minor">
+            <a:schemeClr val="tx1"/>
+          </a:fontRef>
+        </p:style>
+      </p:cxnSp>
+      <p:cxnSp>
+        <p:nvCxnSpPr>
+          <p:cNvPr id="71" name="Straight Arrow Connector 70"/>
+          <p:cNvCxnSpPr>
+            <a:stCxn id="77" idx="2"/>
+            <a:endCxn id="66" idx="0"/>
+          </p:cNvCxnSpPr>
+          <p:nvPr/>
+        </p:nvCxnSpPr>
+        <p:spPr>
+          <a:xfrm>
+            <a:off x="3154680" y="3200400"/>
+            <a:ext cx="0" cy="253093"/>
+          </a:xfrm>
+          <a:prstGeom prst="straightConnector1">
+            <a:avLst/>
+          </a:prstGeom>
+          <a:ln w="12700">
+            <a:solidFill>
+              <a:schemeClr val="tx1"/>
+            </a:solidFill>
+            <a:tailEnd type="triangle"/>
+          </a:ln>
+        </p:spPr>
+        <p:style>
+          <a:lnRef idx="1">
+            <a:schemeClr val="accent1"/>
+          </a:lnRef>
+          <a:fillRef idx="0">
+            <a:schemeClr val="accent1"/>
+          </a:fillRef>
+          <a:effectRef idx="0">
+            <a:schemeClr val="accent1"/>
+          </a:effectRef>
+          <a:fontRef idx="minor">
+            <a:schemeClr val="tx1"/>
+          </a:fontRef>
+        </p:style>
+      </p:cxnSp>
+      <p:sp>
+        <p:nvSpPr>
+          <p:cNvPr id="77" name="Rectangle 76"/>
+          <p:cNvSpPr/>
+          <p:nvPr/>
+        </p:nvSpPr>
+        <p:spPr>
+          <a:xfrm>
+            <a:off x="2240280" y="3017520"/>
+            <a:ext cx="1828800" cy="182880"/>
+          </a:xfrm>
+          <a:prstGeom prst="rect">
+            <a:avLst/>
+          </a:prstGeom>
+          <a:solidFill>
+            <a:schemeClr val="bg1"/>
+          </a:solidFill>
+          <a:ln w="12700">
+            <a:solidFill>
+              <a:schemeClr val="tx1"/>
+            </a:solidFill>
+          </a:ln>
+        </p:spPr>
+        <p:style>
+          <a:lnRef idx="2">
+            <a:schemeClr val="accent1">
+              <a:shade val="50000"/>
+            </a:schemeClr>
+          </a:lnRef>
+          <a:fillRef idx="1">
+            <a:schemeClr val="accent1"/>
+          </a:fillRef>
+          <a:effectRef idx="0">
+            <a:schemeClr val="accent1"/>
+          </a:effectRef>
+          <a:fontRef idx="minor">
+            <a:schemeClr val="lt1"/>
+          </a:fontRef>
+        </p:style>
+        <p:txBody>
+          <a:bodyPr lIns="91440" tIns="91440" rIns="91440" bIns="91440" rtlCol="0" anchor="ctr"/>
+          <a:lstStyle/>
+          <a:p>
+            <a:pPr algn="ctr"/>
+            <a:r>
+              <a:rPr lang="en-US" sz="1000" dirty="0" smtClean="0">
+                <a:solidFill>
+                  <a:schemeClr val="tx1"/>
+                </a:solidFill>
+                <a:latin typeface="Times New Roman" panose="02020603050405020304" pitchFamily="18" charset="0"/>
+                <a:cs typeface="Times New Roman" panose="02020603050405020304" pitchFamily="18" charset="0"/>
+              </a:rPr>
+              <a:t>categorize voxels by value</a:t>
+            </a:r>
+            <a:endParaRPr lang="en-US" sz="1000" dirty="0">
+              <a:solidFill>
+                <a:schemeClr val="tx1"/>
+              </a:solidFill>
+              <a:latin typeface="Times New Roman" panose="02020603050405020304" pitchFamily="18" charset="0"/>
+              <a:cs typeface="Times New Roman" panose="02020603050405020304" pitchFamily="18" charset="0"/>
+            </a:endParaRPr>
+          </a:p>
+        </p:txBody>
+      </p:sp>
+      <p:cxnSp>
+        <p:nvCxnSpPr>
+          <p:cNvPr id="79" name="Straight Arrow Connector 78"/>
+          <p:cNvCxnSpPr>
+            <a:stCxn id="296" idx="2"/>
+            <a:endCxn id="77" idx="0"/>
+          </p:cNvCxnSpPr>
+          <p:nvPr/>
+        </p:nvCxnSpPr>
+        <p:spPr>
+          <a:xfrm>
+            <a:off x="3154680" y="2727960"/>
+            <a:ext cx="0" cy="289560"/>
+          </a:xfrm>
+          <a:prstGeom prst="straightConnector1">
+            <a:avLst/>
+          </a:prstGeom>
+          <a:ln w="12700">
+            <a:solidFill>
+              <a:schemeClr val="tx1"/>
+            </a:solidFill>
+            <a:tailEnd type="triangle"/>
+          </a:ln>
+        </p:spPr>
+        <p:style>
+          <a:lnRef idx="1">
+            <a:schemeClr val="accent1"/>
+          </a:lnRef>
+          <a:fillRef idx="0">
+            <a:schemeClr val="accent1"/>
+          </a:fillRef>
+          <a:effectRef idx="0">
+            <a:schemeClr val="accent1"/>
+          </a:effectRef>
+          <a:fontRef idx="minor">
+            <a:schemeClr val="tx1"/>
+          </a:fontRef>
+        </p:style>
+      </p:cxnSp>
+      <p:sp>
+        <p:nvSpPr>
+          <p:cNvPr id="87" name="Rectangle 86"/>
+          <p:cNvSpPr/>
+          <p:nvPr/>
+        </p:nvSpPr>
+        <p:spPr>
+          <a:xfrm>
+            <a:off x="24492" y="5196840"/>
+            <a:ext cx="2011680" cy="182880"/>
           </a:xfrm>
           <a:prstGeom prst="rect">
             <a:avLst/>
@@ -7046,6 +6334,120 @@
           <a:p>
             <a:pPr algn="ctr"/>
             <a:r>
+              <a:rPr lang="en-US" sz="1000" dirty="0" smtClean="0">
+                <a:solidFill>
+                  <a:schemeClr val="bg1"/>
+                </a:solidFill>
+                <a:latin typeface="Times New Roman" panose="02020603050405020304" pitchFamily="18" charset="0"/>
+                <a:cs typeface="Times New Roman" panose="02020603050405020304" pitchFamily="18" charset="0"/>
+              </a:rPr>
+              <a:t>Fast growing;</a:t>
+            </a:r>
+            <a:endParaRPr lang="en-US" sz="1000" dirty="0">
+              <a:solidFill>
+                <a:schemeClr val="bg1"/>
+              </a:solidFill>
+              <a:latin typeface="Times New Roman" panose="02020603050405020304" pitchFamily="18" charset="0"/>
+              <a:cs typeface="Times New Roman" panose="02020603050405020304" pitchFamily="18" charset="0"/>
+            </a:endParaRPr>
+          </a:p>
+        </p:txBody>
+      </p:sp>
+      <p:sp>
+        <p:nvSpPr>
+          <p:cNvPr id="89" name="Down Arrow 88"/>
+          <p:cNvSpPr/>
+          <p:nvPr/>
+        </p:nvSpPr>
+        <p:spPr>
+          <a:xfrm rot="16200000">
+            <a:off x="2035182" y="5151120"/>
+            <a:ext cx="182880" cy="274320"/>
+          </a:xfrm>
+          <a:prstGeom prst="downArrow">
+            <a:avLst/>
+          </a:prstGeom>
+          <a:solidFill>
+            <a:srgbClr val="FFFF00"/>
+          </a:solidFill>
+          <a:ln w="12700">
+            <a:solidFill>
+              <a:schemeClr val="tx1"/>
+            </a:solidFill>
+          </a:ln>
+        </p:spPr>
+        <p:style>
+          <a:lnRef idx="2">
+            <a:schemeClr val="accent1">
+              <a:shade val="50000"/>
+            </a:schemeClr>
+          </a:lnRef>
+          <a:fillRef idx="1">
+            <a:schemeClr val="accent1"/>
+          </a:fillRef>
+          <a:effectRef idx="0">
+            <a:schemeClr val="accent1"/>
+          </a:effectRef>
+          <a:fontRef idx="minor">
+            <a:schemeClr val="lt1"/>
+          </a:fontRef>
+        </p:style>
+        <p:txBody>
+          <a:bodyPr rtlCol="0" anchor="ctr"/>
+          <a:lstStyle/>
+          <a:p>
+            <a:pPr algn="ctr"/>
+            <a:endParaRPr lang="en-US"/>
+          </a:p>
+        </p:txBody>
+      </p:sp>
+      <p:sp>
+        <p:nvSpPr>
+          <p:cNvPr id="90" name="Rectangle 89"/>
+          <p:cNvSpPr/>
+          <p:nvPr/>
+        </p:nvSpPr>
+        <p:spPr>
+          <a:xfrm>
+            <a:off x="5943600" y="5644241"/>
+            <a:ext cx="1828800" cy="457200"/>
+          </a:xfrm>
+          <a:prstGeom prst="rect">
+            <a:avLst/>
+          </a:prstGeom>
+          <a:solidFill>
+            <a:schemeClr val="accent6">
+              <a:lumMod val="50000"/>
+            </a:schemeClr>
+          </a:solidFill>
+          <a:ln w="12700">
+            <a:solidFill>
+              <a:schemeClr val="tx1"/>
+            </a:solidFill>
+          </a:ln>
+        </p:spPr>
+        <p:style>
+          <a:lnRef idx="2">
+            <a:schemeClr val="accent1">
+              <a:shade val="50000"/>
+            </a:schemeClr>
+          </a:lnRef>
+          <a:fillRef idx="1">
+            <a:schemeClr val="accent1"/>
+          </a:fillRef>
+          <a:effectRef idx="0">
+            <a:schemeClr val="accent1"/>
+          </a:effectRef>
+          <a:fontRef idx="minor">
+            <a:schemeClr val="lt1"/>
+          </a:fontRef>
+        </p:style>
+        <p:txBody>
+          <a:bodyPr lIns="91440" tIns="91440" rIns="91440" bIns="91440" rtlCol="0" anchor="ctr"/>
+          <a:lstStyle/>
+          <a:p>
+            <a:pPr algn="ctr"/>
+            <a:r>
               <a:rPr lang="en-US" sz="1400" b="1" dirty="0" smtClean="0">
                 <a:solidFill>
                   <a:schemeClr val="bg1"/>
@@ -7053,7 +6455,7 @@
                 <a:latin typeface="Times New Roman" panose="02020603050405020304" pitchFamily="18" charset="0"/>
                 <a:cs typeface="Times New Roman" panose="02020603050405020304" pitchFamily="18" charset="0"/>
               </a:rPr>
-              <a:t>Code Cleaning</a:t>
+              <a:t>Performance Improvement</a:t>
             </a:r>
             <a:endParaRPr lang="en-US" sz="1400" b="1" dirty="0">
               <a:solidFill>
@@ -7062,6 +6464,232 @@
               <a:latin typeface="Times New Roman" panose="02020603050405020304" pitchFamily="18" charset="0"/>
               <a:cs typeface="Times New Roman" panose="02020603050405020304" pitchFamily="18" charset="0"/>
             </a:endParaRPr>
+          </a:p>
+        </p:txBody>
+      </p:sp>
+      <p:sp>
+        <p:nvSpPr>
+          <p:cNvPr id="92" name="Rectangle 91"/>
+          <p:cNvSpPr/>
+          <p:nvPr/>
+        </p:nvSpPr>
+        <p:spPr>
+          <a:xfrm>
+            <a:off x="25400" y="4191000"/>
+            <a:ext cx="2011680" cy="365760"/>
+          </a:xfrm>
+          <a:prstGeom prst="rect">
+            <a:avLst/>
+          </a:prstGeom>
+          <a:solidFill>
+            <a:srgbClr val="FF0000"/>
+          </a:solidFill>
+          <a:ln w="12700">
+            <a:solidFill>
+              <a:schemeClr val="tx1"/>
+            </a:solidFill>
+          </a:ln>
+        </p:spPr>
+        <p:style>
+          <a:lnRef idx="2">
+            <a:schemeClr val="accent1">
+              <a:shade val="50000"/>
+            </a:schemeClr>
+          </a:lnRef>
+          <a:fillRef idx="1">
+            <a:schemeClr val="accent1"/>
+          </a:fillRef>
+          <a:effectRef idx="0">
+            <a:schemeClr val="accent1"/>
+          </a:effectRef>
+          <a:fontRef idx="minor">
+            <a:schemeClr val="lt1"/>
+          </a:fontRef>
+        </p:style>
+        <p:txBody>
+          <a:bodyPr lIns="91440" tIns="91440" rIns="91440" bIns="91440" rtlCol="0" anchor="ctr"/>
+          <a:lstStyle/>
+          <a:p>
+            <a:pPr algn="ctr"/>
+            <a:r>
+              <a:rPr lang="en-US" sz="1000" dirty="0" smtClean="0">
+                <a:solidFill>
+                  <a:schemeClr val="bg1"/>
+                </a:solidFill>
+                <a:latin typeface="Times New Roman" panose="02020603050405020304" pitchFamily="18" charset="0"/>
+                <a:cs typeface="Times New Roman" panose="02020603050405020304" pitchFamily="18" charset="0"/>
+              </a:rPr>
+              <a:t>More geometry properties;</a:t>
+            </a:r>
+            <a:endParaRPr lang="en-US" sz="1000" dirty="0">
+              <a:solidFill>
+                <a:schemeClr val="bg1"/>
+              </a:solidFill>
+              <a:latin typeface="Times New Roman" panose="02020603050405020304" pitchFamily="18" charset="0"/>
+              <a:cs typeface="Times New Roman" panose="02020603050405020304" pitchFamily="18" charset="0"/>
+            </a:endParaRPr>
+          </a:p>
+        </p:txBody>
+      </p:sp>
+      <p:sp>
+        <p:nvSpPr>
+          <p:cNvPr id="93" name="Down Arrow 92"/>
+          <p:cNvSpPr/>
+          <p:nvPr/>
+        </p:nvSpPr>
+        <p:spPr>
+          <a:xfrm rot="16200000">
+            <a:off x="2043346" y="4236720"/>
+            <a:ext cx="182880" cy="274320"/>
+          </a:xfrm>
+          <a:prstGeom prst="downArrow">
+            <a:avLst/>
+          </a:prstGeom>
+          <a:solidFill>
+            <a:srgbClr val="FFFF00"/>
+          </a:solidFill>
+          <a:ln w="12700">
+            <a:solidFill>
+              <a:schemeClr val="tx1"/>
+            </a:solidFill>
+          </a:ln>
+        </p:spPr>
+        <p:style>
+          <a:lnRef idx="2">
+            <a:schemeClr val="accent1">
+              <a:shade val="50000"/>
+            </a:schemeClr>
+          </a:lnRef>
+          <a:fillRef idx="1">
+            <a:schemeClr val="accent1"/>
+          </a:fillRef>
+          <a:effectRef idx="0">
+            <a:schemeClr val="accent1"/>
+          </a:effectRef>
+          <a:fontRef idx="minor">
+            <a:schemeClr val="lt1"/>
+          </a:fontRef>
+        </p:style>
+        <p:txBody>
+          <a:bodyPr rtlCol="0" anchor="ctr"/>
+          <a:lstStyle/>
+          <a:p>
+            <a:pPr algn="ctr"/>
+            <a:endParaRPr lang="en-US"/>
+          </a:p>
+        </p:txBody>
+      </p:sp>
+      <p:sp>
+        <p:nvSpPr>
+          <p:cNvPr id="95" name="Rectangle 94"/>
+          <p:cNvSpPr/>
+          <p:nvPr/>
+        </p:nvSpPr>
+        <p:spPr>
+          <a:xfrm>
+            <a:off x="16328" y="3453493"/>
+            <a:ext cx="2011680" cy="182880"/>
+          </a:xfrm>
+          <a:prstGeom prst="rect">
+            <a:avLst/>
+          </a:prstGeom>
+          <a:solidFill>
+            <a:schemeClr val="accent6">
+              <a:lumMod val="50000"/>
+            </a:schemeClr>
+          </a:solidFill>
+          <a:ln w="12700">
+            <a:solidFill>
+              <a:schemeClr val="tx1"/>
+            </a:solidFill>
+          </a:ln>
+        </p:spPr>
+        <p:style>
+          <a:lnRef idx="2">
+            <a:schemeClr val="accent1">
+              <a:shade val="50000"/>
+            </a:schemeClr>
+          </a:lnRef>
+          <a:fillRef idx="1">
+            <a:schemeClr val="accent1"/>
+          </a:fillRef>
+          <a:effectRef idx="0">
+            <a:schemeClr val="accent1"/>
+          </a:effectRef>
+          <a:fontRef idx="minor">
+            <a:schemeClr val="lt1"/>
+          </a:fontRef>
+        </p:style>
+        <p:txBody>
+          <a:bodyPr lIns="91440" tIns="91440" rIns="91440" bIns="91440" rtlCol="0" anchor="ctr"/>
+          <a:lstStyle/>
+          <a:p>
+            <a:pPr algn="ctr"/>
+            <a:r>
+              <a:rPr lang="en-US" sz="1000" dirty="0" smtClean="0">
+                <a:solidFill>
+                  <a:schemeClr val="bg1"/>
+                </a:solidFill>
+                <a:latin typeface="Times New Roman" panose="02020603050405020304" pitchFamily="18" charset="0"/>
+                <a:cs typeface="Times New Roman" panose="02020603050405020304" pitchFamily="18" charset="0"/>
+              </a:rPr>
+              <a:t>Fast growing;</a:t>
+            </a:r>
+            <a:endParaRPr lang="en-US" sz="1000" dirty="0">
+              <a:solidFill>
+                <a:schemeClr val="bg1"/>
+              </a:solidFill>
+              <a:latin typeface="Times New Roman" panose="02020603050405020304" pitchFamily="18" charset="0"/>
+              <a:cs typeface="Times New Roman" panose="02020603050405020304" pitchFamily="18" charset="0"/>
+            </a:endParaRPr>
+          </a:p>
+        </p:txBody>
+      </p:sp>
+      <p:sp>
+        <p:nvSpPr>
+          <p:cNvPr id="96" name="Down Arrow 95"/>
+          <p:cNvSpPr/>
+          <p:nvPr/>
+        </p:nvSpPr>
+        <p:spPr>
+          <a:xfrm rot="16200000">
+            <a:off x="2027018" y="3407773"/>
+            <a:ext cx="182880" cy="274320"/>
+          </a:xfrm>
+          <a:prstGeom prst="downArrow">
+            <a:avLst/>
+          </a:prstGeom>
+          <a:solidFill>
+            <a:srgbClr val="FFFF00"/>
+          </a:solidFill>
+          <a:ln w="12700">
+            <a:solidFill>
+              <a:schemeClr val="tx1"/>
+            </a:solidFill>
+          </a:ln>
+        </p:spPr>
+        <p:style>
+          <a:lnRef idx="2">
+            <a:schemeClr val="accent1">
+              <a:shade val="50000"/>
+            </a:schemeClr>
+          </a:lnRef>
+          <a:fillRef idx="1">
+            <a:schemeClr val="accent1"/>
+          </a:fillRef>
+          <a:effectRef idx="0">
+            <a:schemeClr val="accent1"/>
+          </a:effectRef>
+          <a:fontRef idx="minor">
+            <a:schemeClr val="lt1"/>
+          </a:fontRef>
+        </p:style>
+        <p:txBody>
+          <a:bodyPr rtlCol="0" anchor="ctr"/>
+          <a:lstStyle/>
+          <a:p>
+            <a:pPr algn="ctr"/>
+            <a:endParaRPr lang="en-US"/>
           </a:p>
         </p:txBody>
       </p:sp>

</xml_diff>

<commit_message>
LINUX testing passed; Added boundary region characterization (from exemplar) and constraint (to regionGrowing);
git-svn-id: https://svn.janelia.org/penglab/projects/vaa3d_tools@1686 f26c06c5-4756-4547-a2b9-0b39063de1b8
</commit_message>
<xml_diff>
--- a/hackathon/xiang/cellSegmentation/scheme.pptx
+++ b/hackathon/xiang/cellSegmentation/scheme.pptx
@@ -10,7 +10,7 @@
   <p:sldIdLst>
     <p:sldId id="270" r:id="rId2"/>
   </p:sldIdLst>
-  <p:sldSz cx="8229600" cy="6400800"/>
+  <p:sldSz cx="8229600" cy="7315200"/>
   <p:notesSz cx="6858000" cy="9144000"/>
   <p:defaultTextStyle>
     <a:defPPr>
@@ -110,7 +110,7 @@
   <p:extLst>
     <p:ext uri="{EFAFB233-063F-42B5-8137-9DF3F51BA10A}">
       <p15:sldGuideLst xmlns:p15="http://schemas.microsoft.com/office/powerpoint/2012/main">
-        <p15:guide id="1" orient="horz" pos="2017" userDrawn="1">
+        <p15:guide id="1" orient="horz" pos="2305" userDrawn="1">
           <p15:clr>
             <a:srgbClr val="A4A3A4"/>
           </p15:clr>
@@ -226,8 +226,8 @@
         </p:nvSpPr>
         <p:spPr>
           <a:xfrm>
-            <a:off x="1225550" y="685800"/>
-            <a:ext cx="4406900" cy="3429000"/>
+            <a:off x="1500188" y="685800"/>
+            <a:ext cx="3857625" cy="3429000"/>
           </a:xfrm>
           <a:prstGeom prst="rect">
             <a:avLst/>
@@ -505,8 +505,8 @@
         </p:nvSpPr>
         <p:spPr>
           <a:xfrm>
-            <a:off x="617223" y="1988402"/>
-            <a:ext cx="6995160" cy="1372024"/>
+            <a:off x="617223" y="2272460"/>
+            <a:ext cx="6995160" cy="1568027"/>
           </a:xfrm>
         </p:spPr>
         <p:txBody>
@@ -533,8 +533,8 @@
         </p:nvSpPr>
         <p:spPr>
           <a:xfrm>
-            <a:off x="1234441" y="3627129"/>
-            <a:ext cx="5760720" cy="1635761"/>
+            <a:off x="1234441" y="4145291"/>
+            <a:ext cx="5760720" cy="1869441"/>
           </a:xfrm>
         </p:spPr>
         <p:txBody>
@@ -550,7 +550,7 @@
                 </a:solidFill>
               </a:defRPr>
             </a:lvl1pPr>
-            <a:lvl2pPr marL="861510" indent="0" algn="ctr">
+            <a:lvl2pPr marL="984620" indent="0" algn="ctr">
               <a:buNone/>
               <a:defRPr>
                 <a:solidFill>
@@ -560,7 +560,7 @@
                 </a:solidFill>
               </a:defRPr>
             </a:lvl2pPr>
-            <a:lvl3pPr marL="1723014" indent="0" algn="ctr">
+            <a:lvl3pPr marL="1969233" indent="0" algn="ctr">
               <a:buNone/>
               <a:defRPr>
                 <a:solidFill>
@@ -570,7 +570,7 @@
                 </a:solidFill>
               </a:defRPr>
             </a:lvl3pPr>
-            <a:lvl4pPr marL="2584525" indent="0" algn="ctr">
+            <a:lvl4pPr marL="2953854" indent="0" algn="ctr">
               <a:buNone/>
               <a:defRPr>
                 <a:solidFill>
@@ -580,7 +580,7 @@
                 </a:solidFill>
               </a:defRPr>
             </a:lvl4pPr>
-            <a:lvl5pPr marL="3446033" indent="0" algn="ctr">
+            <a:lvl5pPr marL="3938471" indent="0" algn="ctr">
               <a:buNone/>
               <a:defRPr>
                 <a:solidFill>
@@ -590,7 +590,7 @@
                 </a:solidFill>
               </a:defRPr>
             </a:lvl5pPr>
-            <a:lvl6pPr marL="4307536" indent="0" algn="ctr">
+            <a:lvl6pPr marL="4923083" indent="0" algn="ctr">
               <a:buNone/>
               <a:defRPr>
                 <a:solidFill>
@@ -600,7 +600,7 @@
                 </a:solidFill>
               </a:defRPr>
             </a:lvl6pPr>
-            <a:lvl7pPr marL="5169044" indent="0" algn="ctr">
+            <a:lvl7pPr marL="5907700" indent="0" algn="ctr">
               <a:buNone/>
               <a:defRPr>
                 <a:solidFill>
@@ -610,7 +610,7 @@
                 </a:solidFill>
               </a:defRPr>
             </a:lvl7pPr>
-            <a:lvl8pPr marL="6030553" indent="0" algn="ctr">
+            <a:lvl8pPr marL="6892319" indent="0" algn="ctr">
               <a:buNone/>
               <a:defRPr>
                 <a:solidFill>
@@ -620,7 +620,7 @@
                 </a:solidFill>
               </a:defRPr>
             </a:lvl8pPr>
-            <a:lvl9pPr marL="6892061" indent="0" algn="ctr">
+            <a:lvl9pPr marL="7876937" indent="0" algn="ctr">
               <a:buNone/>
               <a:defRPr>
                 <a:solidFill>
@@ -911,8 +911,8 @@
         </p:nvSpPr>
         <p:spPr>
           <a:xfrm>
-            <a:off x="5966463" y="256333"/>
-            <a:ext cx="1851660" cy="5461424"/>
+            <a:off x="5966463" y="292952"/>
+            <a:ext cx="1851660" cy="6241627"/>
           </a:xfrm>
         </p:spPr>
         <p:txBody>
@@ -939,8 +939,8 @@
         </p:nvSpPr>
         <p:spPr>
           <a:xfrm>
-            <a:off x="411480" y="256333"/>
-            <a:ext cx="5417820" cy="5461424"/>
+            <a:off x="411480" y="292952"/>
+            <a:ext cx="5417820" cy="6241627"/>
           </a:xfrm>
         </p:spPr>
         <p:txBody>
@@ -1255,15 +1255,15 @@
         </p:nvSpPr>
         <p:spPr>
           <a:xfrm>
-            <a:off x="650085" y="4113116"/>
-            <a:ext cx="6995160" cy="1271269"/>
+            <a:off x="650085" y="4700705"/>
+            <a:ext cx="6995160" cy="1452879"/>
           </a:xfrm>
         </p:spPr>
         <p:txBody>
           <a:bodyPr anchor="t"/>
           <a:lstStyle>
             <a:lvl1pPr algn="l">
-              <a:defRPr sz="7621" b="1" cap="all"/>
+              <a:defRPr sz="8710" b="1" cap="all"/>
             </a:lvl1pPr>
           </a:lstStyle>
           <a:p>
@@ -1287,8 +1287,8 @@
         </p:nvSpPr>
         <p:spPr>
           <a:xfrm>
-            <a:off x="650085" y="2712937"/>
-            <a:ext cx="6995160" cy="1400175"/>
+            <a:off x="650085" y="3100500"/>
+            <a:ext cx="6995160" cy="1600200"/>
           </a:xfrm>
         </p:spPr>
         <p:txBody>
@@ -1296,7 +1296,7 @@
           <a:lstStyle>
             <a:lvl1pPr marL="0" indent="0">
               <a:buNone/>
-              <a:defRPr sz="3701">
+              <a:defRPr sz="4230">
                 <a:solidFill>
                   <a:schemeClr val="tx1">
                     <a:tint val="75000"/>
@@ -1304,9 +1304,9 @@
                 </a:solidFill>
               </a:defRPr>
             </a:lvl1pPr>
-            <a:lvl2pPr marL="861510" indent="0">
+            <a:lvl2pPr marL="984620" indent="0">
               <a:buNone/>
-              <a:defRPr sz="3481">
+              <a:defRPr sz="3978">
                 <a:solidFill>
                   <a:schemeClr val="tx1">
                     <a:tint val="75000"/>
@@ -1314,9 +1314,9 @@
                 </a:solidFill>
               </a:defRPr>
             </a:lvl2pPr>
-            <a:lvl3pPr marL="1723014" indent="0">
+            <a:lvl3pPr marL="1969233" indent="0">
               <a:buNone/>
-              <a:defRPr sz="3049">
+              <a:defRPr sz="3485">
                 <a:solidFill>
                   <a:schemeClr val="tx1">
                     <a:tint val="75000"/>
@@ -1324,9 +1324,9 @@
                 </a:solidFill>
               </a:defRPr>
             </a:lvl3pPr>
-            <a:lvl4pPr marL="2584525" indent="0">
+            <a:lvl4pPr marL="2953854" indent="0">
               <a:buNone/>
-              <a:defRPr sz="2612">
+              <a:defRPr sz="2985">
                 <a:solidFill>
                   <a:schemeClr val="tx1">
                     <a:tint val="75000"/>
@@ -1334,9 +1334,9 @@
                 </a:solidFill>
               </a:defRPr>
             </a:lvl4pPr>
-            <a:lvl5pPr marL="3446033" indent="0">
+            <a:lvl5pPr marL="3938471" indent="0">
               <a:buNone/>
-              <a:defRPr sz="2612">
+              <a:defRPr sz="2985">
                 <a:solidFill>
                   <a:schemeClr val="tx1">
                     <a:tint val="75000"/>
@@ -1344,9 +1344,9 @@
                 </a:solidFill>
               </a:defRPr>
             </a:lvl5pPr>
-            <a:lvl6pPr marL="4307536" indent="0">
+            <a:lvl6pPr marL="4923083" indent="0">
               <a:buNone/>
-              <a:defRPr sz="2612">
+              <a:defRPr sz="2985">
                 <a:solidFill>
                   <a:schemeClr val="tx1">
                     <a:tint val="75000"/>
@@ -1354,9 +1354,9 @@
                 </a:solidFill>
               </a:defRPr>
             </a:lvl6pPr>
-            <a:lvl7pPr marL="5169044" indent="0">
+            <a:lvl7pPr marL="5907700" indent="0">
               <a:buNone/>
-              <a:defRPr sz="2612">
+              <a:defRPr sz="2985">
                 <a:solidFill>
                   <a:schemeClr val="tx1">
                     <a:tint val="75000"/>
@@ -1364,9 +1364,9 @@
                 </a:solidFill>
               </a:defRPr>
             </a:lvl7pPr>
-            <a:lvl8pPr marL="6030553" indent="0">
+            <a:lvl8pPr marL="6892319" indent="0">
               <a:buNone/>
-              <a:defRPr sz="2612">
+              <a:defRPr sz="2985">
                 <a:solidFill>
                   <a:schemeClr val="tx1">
                     <a:tint val="75000"/>
@@ -1374,9 +1374,9 @@
                 </a:solidFill>
               </a:defRPr>
             </a:lvl8pPr>
-            <a:lvl9pPr marL="6892061" indent="0">
+            <a:lvl9pPr marL="7876937" indent="0">
               <a:buNone/>
-              <a:defRPr sz="2612">
+              <a:defRPr sz="2985">
                 <a:solidFill>
                   <a:schemeClr val="tx1">
                     <a:tint val="75000"/>
@@ -1521,39 +1521,39 @@
         </p:nvSpPr>
         <p:spPr>
           <a:xfrm>
-            <a:off x="411481" y="1493526"/>
-            <a:ext cx="3634740" cy="4224232"/>
+            <a:off x="411481" y="1706887"/>
+            <a:ext cx="3634740" cy="4827694"/>
           </a:xfrm>
         </p:spPr>
         <p:txBody>
           <a:bodyPr/>
           <a:lstStyle>
             <a:lvl1pPr>
-              <a:defRPr sz="5227"/>
+              <a:defRPr sz="5974"/>
             </a:lvl1pPr>
             <a:lvl2pPr>
-              <a:defRPr sz="4573"/>
+              <a:defRPr sz="5226"/>
             </a:lvl2pPr>
             <a:lvl3pPr>
-              <a:defRPr sz="3701"/>
+              <a:defRPr sz="4230"/>
             </a:lvl3pPr>
             <a:lvl4pPr>
-              <a:defRPr sz="3481"/>
+              <a:defRPr sz="3978"/>
             </a:lvl4pPr>
             <a:lvl5pPr>
-              <a:defRPr sz="3481"/>
+              <a:defRPr sz="3978"/>
             </a:lvl5pPr>
             <a:lvl6pPr>
-              <a:defRPr sz="3481"/>
+              <a:defRPr sz="3978"/>
             </a:lvl6pPr>
             <a:lvl7pPr>
-              <a:defRPr sz="3481"/>
+              <a:defRPr sz="3978"/>
             </a:lvl7pPr>
             <a:lvl8pPr>
-              <a:defRPr sz="3481"/>
+              <a:defRPr sz="3978"/>
             </a:lvl8pPr>
             <a:lvl9pPr>
-              <a:defRPr sz="3481"/>
+              <a:defRPr sz="3978"/>
             </a:lvl9pPr>
           </a:lstStyle>
           <a:p>
@@ -1606,39 +1606,39 @@
         </p:nvSpPr>
         <p:spPr>
           <a:xfrm>
-            <a:off x="4183383" y="1493526"/>
-            <a:ext cx="3634740" cy="4224232"/>
+            <a:off x="4183383" y="1706887"/>
+            <a:ext cx="3634740" cy="4827694"/>
           </a:xfrm>
         </p:spPr>
         <p:txBody>
           <a:bodyPr/>
           <a:lstStyle>
             <a:lvl1pPr>
-              <a:defRPr sz="5227"/>
+              <a:defRPr sz="5974"/>
             </a:lvl1pPr>
             <a:lvl2pPr>
-              <a:defRPr sz="4573"/>
+              <a:defRPr sz="5226"/>
             </a:lvl2pPr>
             <a:lvl3pPr>
-              <a:defRPr sz="3701"/>
+              <a:defRPr sz="4230"/>
             </a:lvl3pPr>
             <a:lvl4pPr>
-              <a:defRPr sz="3481"/>
+              <a:defRPr sz="3978"/>
             </a:lvl4pPr>
             <a:lvl5pPr>
-              <a:defRPr sz="3481"/>
+              <a:defRPr sz="3978"/>
             </a:lvl5pPr>
             <a:lvl6pPr>
-              <a:defRPr sz="3481"/>
+              <a:defRPr sz="3978"/>
             </a:lvl6pPr>
             <a:lvl7pPr>
-              <a:defRPr sz="3481"/>
+              <a:defRPr sz="3978"/>
             </a:lvl7pPr>
             <a:lvl8pPr>
-              <a:defRPr sz="3481"/>
+              <a:defRPr sz="3978"/>
             </a:lvl8pPr>
             <a:lvl9pPr>
-              <a:defRPr sz="3481"/>
+              <a:defRPr sz="3978"/>
             </a:lvl9pPr>
           </a:lstStyle>
           <a:p>
@@ -1810,8 +1810,8 @@
         </p:nvSpPr>
         <p:spPr>
           <a:xfrm>
-            <a:off x="411497" y="1432776"/>
-            <a:ext cx="3636170" cy="597111"/>
+            <a:off x="411497" y="1637459"/>
+            <a:ext cx="3636170" cy="682413"/>
           </a:xfrm>
         </p:spPr>
         <p:txBody>
@@ -1819,39 +1819,39 @@
           <a:lstStyle>
             <a:lvl1pPr marL="0" indent="0">
               <a:buNone/>
-              <a:defRPr sz="4573" b="1"/>
+              <a:defRPr sz="5226" b="1"/>
             </a:lvl1pPr>
-            <a:lvl2pPr marL="861510" indent="0">
+            <a:lvl2pPr marL="984620" indent="0">
               <a:buNone/>
-              <a:defRPr sz="3701" b="1"/>
+              <a:defRPr sz="4230" b="1"/>
             </a:lvl2pPr>
-            <a:lvl3pPr marL="1723014" indent="0">
+            <a:lvl3pPr marL="1969233" indent="0">
               <a:buNone/>
-              <a:defRPr sz="3481" b="1"/>
+              <a:defRPr sz="3978" b="1"/>
             </a:lvl3pPr>
-            <a:lvl4pPr marL="2584525" indent="0">
+            <a:lvl4pPr marL="2953854" indent="0">
               <a:buNone/>
-              <a:defRPr sz="3049" b="1"/>
+              <a:defRPr sz="3485" b="1"/>
             </a:lvl4pPr>
-            <a:lvl5pPr marL="3446033" indent="0">
+            <a:lvl5pPr marL="3938471" indent="0">
               <a:buNone/>
-              <a:defRPr sz="3049" b="1"/>
+              <a:defRPr sz="3485" b="1"/>
             </a:lvl5pPr>
-            <a:lvl6pPr marL="4307536" indent="0">
+            <a:lvl6pPr marL="4923083" indent="0">
               <a:buNone/>
-              <a:defRPr sz="3049" b="1"/>
+              <a:defRPr sz="3485" b="1"/>
             </a:lvl6pPr>
-            <a:lvl7pPr marL="5169044" indent="0">
+            <a:lvl7pPr marL="5907700" indent="0">
               <a:buNone/>
-              <a:defRPr sz="3049" b="1"/>
+              <a:defRPr sz="3485" b="1"/>
             </a:lvl7pPr>
-            <a:lvl8pPr marL="6030553" indent="0">
+            <a:lvl8pPr marL="6892319" indent="0">
               <a:buNone/>
-              <a:defRPr sz="3049" b="1"/>
+              <a:defRPr sz="3485" b="1"/>
             </a:lvl8pPr>
-            <a:lvl9pPr marL="6892061" indent="0">
+            <a:lvl9pPr marL="7876937" indent="0">
               <a:buNone/>
-              <a:defRPr sz="3049" b="1"/>
+              <a:defRPr sz="3485" b="1"/>
             </a:lvl9pPr>
           </a:lstStyle>
           <a:p>
@@ -1875,39 +1875,39 @@
         </p:nvSpPr>
         <p:spPr>
           <a:xfrm>
-            <a:off x="411497" y="2029887"/>
-            <a:ext cx="3636170" cy="3687869"/>
+            <a:off x="411497" y="2319872"/>
+            <a:ext cx="3636170" cy="4214707"/>
           </a:xfrm>
         </p:spPr>
         <p:txBody>
           <a:bodyPr/>
           <a:lstStyle>
             <a:lvl1pPr>
-              <a:defRPr sz="4573"/>
+              <a:defRPr sz="5226"/>
             </a:lvl1pPr>
             <a:lvl2pPr>
-              <a:defRPr sz="3701"/>
+              <a:defRPr sz="4230"/>
             </a:lvl2pPr>
             <a:lvl3pPr>
-              <a:defRPr sz="3481"/>
+              <a:defRPr sz="3978"/>
             </a:lvl3pPr>
             <a:lvl4pPr>
-              <a:defRPr sz="3049"/>
+              <a:defRPr sz="3485"/>
             </a:lvl4pPr>
             <a:lvl5pPr>
-              <a:defRPr sz="3049"/>
+              <a:defRPr sz="3485"/>
             </a:lvl5pPr>
             <a:lvl6pPr>
-              <a:defRPr sz="3049"/>
+              <a:defRPr sz="3485"/>
             </a:lvl6pPr>
             <a:lvl7pPr>
-              <a:defRPr sz="3049"/>
+              <a:defRPr sz="3485"/>
             </a:lvl7pPr>
             <a:lvl8pPr>
-              <a:defRPr sz="3049"/>
+              <a:defRPr sz="3485"/>
             </a:lvl8pPr>
             <a:lvl9pPr>
-              <a:defRPr sz="3049"/>
+              <a:defRPr sz="3485"/>
             </a:lvl9pPr>
           </a:lstStyle>
           <a:p>
@@ -1960,8 +1960,8 @@
         </p:nvSpPr>
         <p:spPr>
           <a:xfrm>
-            <a:off x="4180539" y="1432776"/>
-            <a:ext cx="3637599" cy="597111"/>
+            <a:off x="4180540" y="1637459"/>
+            <a:ext cx="3637599" cy="682413"/>
           </a:xfrm>
         </p:spPr>
         <p:txBody>
@@ -1969,39 +1969,39 @@
           <a:lstStyle>
             <a:lvl1pPr marL="0" indent="0">
               <a:buNone/>
-              <a:defRPr sz="4573" b="1"/>
+              <a:defRPr sz="5226" b="1"/>
             </a:lvl1pPr>
-            <a:lvl2pPr marL="861510" indent="0">
+            <a:lvl2pPr marL="984620" indent="0">
               <a:buNone/>
-              <a:defRPr sz="3701" b="1"/>
+              <a:defRPr sz="4230" b="1"/>
             </a:lvl2pPr>
-            <a:lvl3pPr marL="1723014" indent="0">
+            <a:lvl3pPr marL="1969233" indent="0">
               <a:buNone/>
-              <a:defRPr sz="3481" b="1"/>
+              <a:defRPr sz="3978" b="1"/>
             </a:lvl3pPr>
-            <a:lvl4pPr marL="2584525" indent="0">
+            <a:lvl4pPr marL="2953854" indent="0">
               <a:buNone/>
-              <a:defRPr sz="3049" b="1"/>
+              <a:defRPr sz="3485" b="1"/>
             </a:lvl4pPr>
-            <a:lvl5pPr marL="3446033" indent="0">
+            <a:lvl5pPr marL="3938471" indent="0">
               <a:buNone/>
-              <a:defRPr sz="3049" b="1"/>
+              <a:defRPr sz="3485" b="1"/>
             </a:lvl5pPr>
-            <a:lvl6pPr marL="4307536" indent="0">
+            <a:lvl6pPr marL="4923083" indent="0">
               <a:buNone/>
-              <a:defRPr sz="3049" b="1"/>
+              <a:defRPr sz="3485" b="1"/>
             </a:lvl6pPr>
-            <a:lvl7pPr marL="5169044" indent="0">
+            <a:lvl7pPr marL="5907700" indent="0">
               <a:buNone/>
-              <a:defRPr sz="3049" b="1"/>
+              <a:defRPr sz="3485" b="1"/>
             </a:lvl7pPr>
-            <a:lvl8pPr marL="6030553" indent="0">
+            <a:lvl8pPr marL="6892319" indent="0">
               <a:buNone/>
-              <a:defRPr sz="3049" b="1"/>
+              <a:defRPr sz="3485" b="1"/>
             </a:lvl8pPr>
-            <a:lvl9pPr marL="6892061" indent="0">
+            <a:lvl9pPr marL="7876937" indent="0">
               <a:buNone/>
-              <a:defRPr sz="3049" b="1"/>
+              <a:defRPr sz="3485" b="1"/>
             </a:lvl9pPr>
           </a:lstStyle>
           <a:p>
@@ -2025,39 +2025,39 @@
         </p:nvSpPr>
         <p:spPr>
           <a:xfrm>
-            <a:off x="4180539" y="2029887"/>
-            <a:ext cx="3637599" cy="3687869"/>
+            <a:off x="4180540" y="2319872"/>
+            <a:ext cx="3637599" cy="4214707"/>
           </a:xfrm>
         </p:spPr>
         <p:txBody>
           <a:bodyPr/>
           <a:lstStyle>
             <a:lvl1pPr>
-              <a:defRPr sz="4573"/>
+              <a:defRPr sz="5226"/>
             </a:lvl1pPr>
             <a:lvl2pPr>
-              <a:defRPr sz="3701"/>
+              <a:defRPr sz="4230"/>
             </a:lvl2pPr>
             <a:lvl3pPr>
-              <a:defRPr sz="3481"/>
+              <a:defRPr sz="3978"/>
             </a:lvl3pPr>
             <a:lvl4pPr>
-              <a:defRPr sz="3049"/>
+              <a:defRPr sz="3485"/>
             </a:lvl4pPr>
             <a:lvl5pPr>
-              <a:defRPr sz="3049"/>
+              <a:defRPr sz="3485"/>
             </a:lvl5pPr>
             <a:lvl6pPr>
-              <a:defRPr sz="3049"/>
+              <a:defRPr sz="3485"/>
             </a:lvl6pPr>
             <a:lvl7pPr>
-              <a:defRPr sz="3049"/>
+              <a:defRPr sz="3485"/>
             </a:lvl7pPr>
             <a:lvl8pPr>
-              <a:defRPr sz="3049"/>
+              <a:defRPr sz="3485"/>
             </a:lvl8pPr>
             <a:lvl9pPr>
-              <a:defRPr sz="3049"/>
+              <a:defRPr sz="3485"/>
             </a:lvl9pPr>
           </a:lstStyle>
           <a:p>
@@ -2409,15 +2409,15 @@
         </p:nvSpPr>
         <p:spPr>
           <a:xfrm>
-            <a:off x="411484" y="254850"/>
-            <a:ext cx="2707482" cy="1084580"/>
+            <a:off x="411484" y="291257"/>
+            <a:ext cx="2707482" cy="1239520"/>
           </a:xfrm>
         </p:spPr>
         <p:txBody>
           <a:bodyPr anchor="b"/>
           <a:lstStyle>
             <a:lvl1pPr algn="l">
-              <a:defRPr sz="3701" b="1"/>
+              <a:defRPr sz="4230" b="1"/>
             </a:lvl1pPr>
           </a:lstStyle>
           <a:p>
@@ -2441,39 +2441,39 @@
         </p:nvSpPr>
         <p:spPr>
           <a:xfrm>
-            <a:off x="3217549" y="254854"/>
-            <a:ext cx="4600575" cy="5462905"/>
+            <a:off x="3217550" y="291262"/>
+            <a:ext cx="4600575" cy="6243320"/>
           </a:xfrm>
         </p:spPr>
         <p:txBody>
           <a:bodyPr/>
           <a:lstStyle>
             <a:lvl1pPr>
-              <a:defRPr sz="6099"/>
+              <a:defRPr sz="6971"/>
             </a:lvl1pPr>
             <a:lvl2pPr>
-              <a:defRPr sz="5227"/>
+              <a:defRPr sz="5974"/>
             </a:lvl2pPr>
             <a:lvl3pPr>
-              <a:defRPr sz="4573"/>
+              <a:defRPr sz="5226"/>
             </a:lvl3pPr>
             <a:lvl4pPr>
-              <a:defRPr sz="3701"/>
+              <a:defRPr sz="4230"/>
             </a:lvl4pPr>
             <a:lvl5pPr>
-              <a:defRPr sz="3701"/>
+              <a:defRPr sz="4230"/>
             </a:lvl5pPr>
             <a:lvl6pPr>
-              <a:defRPr sz="3701"/>
+              <a:defRPr sz="4230"/>
             </a:lvl6pPr>
             <a:lvl7pPr>
-              <a:defRPr sz="3701"/>
+              <a:defRPr sz="4230"/>
             </a:lvl7pPr>
             <a:lvl8pPr>
-              <a:defRPr sz="3701"/>
+              <a:defRPr sz="4230"/>
             </a:lvl8pPr>
             <a:lvl9pPr>
-              <a:defRPr sz="3701"/>
+              <a:defRPr sz="4230"/>
             </a:lvl9pPr>
           </a:lstStyle>
           <a:p>
@@ -2526,8 +2526,8 @@
         </p:nvSpPr>
         <p:spPr>
           <a:xfrm>
-            <a:off x="411484" y="1339432"/>
-            <a:ext cx="2707482" cy="4378325"/>
+            <a:off x="411484" y="1530780"/>
+            <a:ext cx="2707482" cy="5003800"/>
           </a:xfrm>
         </p:spPr>
         <p:txBody>
@@ -2535,39 +2535,39 @@
           <a:lstStyle>
             <a:lvl1pPr marL="0" indent="0">
               <a:buNone/>
-              <a:defRPr sz="2612"/>
+              <a:defRPr sz="2985"/>
             </a:lvl1pPr>
-            <a:lvl2pPr marL="861510" indent="0">
+            <a:lvl2pPr marL="984620" indent="0">
               <a:buNone/>
-              <a:defRPr sz="2177"/>
+              <a:defRPr sz="2488"/>
             </a:lvl2pPr>
-            <a:lvl3pPr marL="1723014" indent="0">
+            <a:lvl3pPr marL="1969233" indent="0">
               <a:buNone/>
-              <a:defRPr sz="1959"/>
+              <a:defRPr sz="2239"/>
             </a:lvl3pPr>
-            <a:lvl4pPr marL="2584525" indent="0">
+            <a:lvl4pPr marL="2953854" indent="0">
               <a:buNone/>
-              <a:defRPr sz="1743"/>
+              <a:defRPr sz="1992"/>
             </a:lvl4pPr>
-            <a:lvl5pPr marL="3446033" indent="0">
+            <a:lvl5pPr marL="3938471" indent="0">
               <a:buNone/>
-              <a:defRPr sz="1743"/>
+              <a:defRPr sz="1992"/>
             </a:lvl5pPr>
-            <a:lvl6pPr marL="4307536" indent="0">
+            <a:lvl6pPr marL="4923083" indent="0">
               <a:buNone/>
-              <a:defRPr sz="1743"/>
+              <a:defRPr sz="1992"/>
             </a:lvl6pPr>
-            <a:lvl7pPr marL="5169044" indent="0">
+            <a:lvl7pPr marL="5907700" indent="0">
               <a:buNone/>
-              <a:defRPr sz="1743"/>
+              <a:defRPr sz="1992"/>
             </a:lvl7pPr>
-            <a:lvl8pPr marL="6030553" indent="0">
+            <a:lvl8pPr marL="6892319" indent="0">
               <a:buNone/>
-              <a:defRPr sz="1743"/>
+              <a:defRPr sz="1992"/>
             </a:lvl8pPr>
-            <a:lvl9pPr marL="6892061" indent="0">
+            <a:lvl9pPr marL="7876937" indent="0">
               <a:buNone/>
-              <a:defRPr sz="1743"/>
+              <a:defRPr sz="1992"/>
             </a:lvl9pPr>
           </a:lstStyle>
           <a:p>
@@ -2683,15 +2683,15 @@
         </p:nvSpPr>
         <p:spPr>
           <a:xfrm>
-            <a:off x="1613061" y="4480568"/>
-            <a:ext cx="4937760" cy="528955"/>
+            <a:off x="1613061" y="5120650"/>
+            <a:ext cx="4937760" cy="604520"/>
           </a:xfrm>
         </p:spPr>
         <p:txBody>
           <a:bodyPr anchor="b"/>
           <a:lstStyle>
             <a:lvl1pPr algn="l">
-              <a:defRPr sz="3701" b="1"/>
+              <a:defRPr sz="4230" b="1"/>
             </a:lvl1pPr>
           </a:lstStyle>
           <a:p>
@@ -2715,8 +2715,8 @@
         </p:nvSpPr>
         <p:spPr>
           <a:xfrm>
-            <a:off x="1613061" y="571928"/>
-            <a:ext cx="4937760" cy="3840480"/>
+            <a:off x="1613061" y="653632"/>
+            <a:ext cx="4937760" cy="4389120"/>
           </a:xfrm>
         </p:spPr>
         <p:txBody>
@@ -2724,39 +2724,39 @@
           <a:lstStyle>
             <a:lvl1pPr marL="0" indent="0">
               <a:buNone/>
-              <a:defRPr sz="6099"/>
+              <a:defRPr sz="6971"/>
             </a:lvl1pPr>
-            <a:lvl2pPr marL="861510" indent="0">
+            <a:lvl2pPr marL="984620" indent="0">
               <a:buNone/>
-              <a:defRPr sz="5227"/>
+              <a:defRPr sz="5974"/>
             </a:lvl2pPr>
-            <a:lvl3pPr marL="1723014" indent="0">
+            <a:lvl3pPr marL="1969233" indent="0">
               <a:buNone/>
-              <a:defRPr sz="4573"/>
+              <a:defRPr sz="5226"/>
             </a:lvl3pPr>
-            <a:lvl4pPr marL="2584525" indent="0">
+            <a:lvl4pPr marL="2953854" indent="0">
               <a:buNone/>
-              <a:defRPr sz="3701"/>
+              <a:defRPr sz="4230"/>
             </a:lvl4pPr>
-            <a:lvl5pPr marL="3446033" indent="0">
+            <a:lvl5pPr marL="3938471" indent="0">
               <a:buNone/>
-              <a:defRPr sz="3701"/>
+              <a:defRPr sz="4230"/>
             </a:lvl5pPr>
-            <a:lvl6pPr marL="4307536" indent="0">
+            <a:lvl6pPr marL="4923083" indent="0">
               <a:buNone/>
-              <a:defRPr sz="3701"/>
+              <a:defRPr sz="4230"/>
             </a:lvl6pPr>
-            <a:lvl7pPr marL="5169044" indent="0">
+            <a:lvl7pPr marL="5907700" indent="0">
               <a:buNone/>
-              <a:defRPr sz="3701"/>
+              <a:defRPr sz="4230"/>
             </a:lvl7pPr>
-            <a:lvl8pPr marL="6030553" indent="0">
+            <a:lvl8pPr marL="6892319" indent="0">
               <a:buNone/>
-              <a:defRPr sz="3701"/>
+              <a:defRPr sz="4230"/>
             </a:lvl8pPr>
-            <a:lvl9pPr marL="6892061" indent="0">
+            <a:lvl9pPr marL="7876937" indent="0">
               <a:buNone/>
-              <a:defRPr sz="3701"/>
+              <a:defRPr sz="4230"/>
             </a:lvl9pPr>
           </a:lstStyle>
           <a:p>
@@ -2776,8 +2776,8 @@
         </p:nvSpPr>
         <p:spPr>
           <a:xfrm>
-            <a:off x="1613061" y="5009525"/>
-            <a:ext cx="4937760" cy="751205"/>
+            <a:off x="1613061" y="5725172"/>
+            <a:ext cx="4937760" cy="858520"/>
           </a:xfrm>
         </p:spPr>
         <p:txBody>
@@ -2785,39 +2785,39 @@
           <a:lstStyle>
             <a:lvl1pPr marL="0" indent="0">
               <a:buNone/>
-              <a:defRPr sz="2612"/>
+              <a:defRPr sz="2985"/>
             </a:lvl1pPr>
-            <a:lvl2pPr marL="861510" indent="0">
+            <a:lvl2pPr marL="984620" indent="0">
               <a:buNone/>
-              <a:defRPr sz="2177"/>
+              <a:defRPr sz="2488"/>
             </a:lvl2pPr>
-            <a:lvl3pPr marL="1723014" indent="0">
+            <a:lvl3pPr marL="1969233" indent="0">
               <a:buNone/>
-              <a:defRPr sz="1959"/>
+              <a:defRPr sz="2239"/>
             </a:lvl3pPr>
-            <a:lvl4pPr marL="2584525" indent="0">
+            <a:lvl4pPr marL="2953854" indent="0">
               <a:buNone/>
-              <a:defRPr sz="1743"/>
+              <a:defRPr sz="1992"/>
             </a:lvl4pPr>
-            <a:lvl5pPr marL="3446033" indent="0">
+            <a:lvl5pPr marL="3938471" indent="0">
               <a:buNone/>
-              <a:defRPr sz="1743"/>
+              <a:defRPr sz="1992"/>
             </a:lvl5pPr>
-            <a:lvl6pPr marL="4307536" indent="0">
+            <a:lvl6pPr marL="4923083" indent="0">
               <a:buNone/>
-              <a:defRPr sz="1743"/>
+              <a:defRPr sz="1992"/>
             </a:lvl6pPr>
-            <a:lvl7pPr marL="5169044" indent="0">
+            <a:lvl7pPr marL="5907700" indent="0">
               <a:buNone/>
-              <a:defRPr sz="1743"/>
+              <a:defRPr sz="1992"/>
             </a:lvl7pPr>
-            <a:lvl8pPr marL="6030553" indent="0">
+            <a:lvl8pPr marL="6892319" indent="0">
               <a:buNone/>
-              <a:defRPr sz="1743"/>
+              <a:defRPr sz="1992"/>
             </a:lvl8pPr>
-            <a:lvl9pPr marL="6892061" indent="0">
+            <a:lvl9pPr marL="7876937" indent="0">
               <a:buNone/>
-              <a:defRPr sz="1743"/>
+              <a:defRPr sz="1992"/>
             </a:lvl9pPr>
           </a:lstStyle>
           <a:p>
@@ -2941,8 +2941,8 @@
         </p:nvSpPr>
         <p:spPr>
           <a:xfrm>
-            <a:off x="411481" y="256332"/>
-            <a:ext cx="7406640" cy="1066800"/>
+            <a:off x="411481" y="292951"/>
+            <a:ext cx="7406640" cy="1219200"/>
           </a:xfrm>
           <a:prstGeom prst="rect">
             <a:avLst/>
@@ -2974,8 +2974,8 @@
         </p:nvSpPr>
         <p:spPr>
           <a:xfrm>
-            <a:off x="411481" y="1493526"/>
-            <a:ext cx="7406640" cy="4224232"/>
+            <a:off x="411481" y="1706887"/>
+            <a:ext cx="7406640" cy="4827694"/>
           </a:xfrm>
           <a:prstGeom prst="rect">
             <a:avLst/>
@@ -3036,8 +3036,8 @@
         </p:nvSpPr>
         <p:spPr>
           <a:xfrm>
-            <a:off x="411480" y="5932608"/>
-            <a:ext cx="1920240" cy="340783"/>
+            <a:off x="411480" y="6780124"/>
+            <a:ext cx="1920240" cy="389466"/>
           </a:xfrm>
           <a:prstGeom prst="rect">
             <a:avLst/>
@@ -3047,7 +3047,7 @@
           <a:bodyPr vert="horz" lIns="79141" tIns="39571" rIns="79141" bIns="39571" rtlCol="0" anchor="ctr"/>
           <a:lstStyle>
             <a:lvl1pPr algn="l">
-              <a:defRPr sz="2177">
+              <a:defRPr sz="2488">
                 <a:solidFill>
                   <a:schemeClr val="tx1">
                     <a:tint val="75000"/>
@@ -3078,8 +3078,8 @@
         </p:nvSpPr>
         <p:spPr>
           <a:xfrm>
-            <a:off x="2811783" y="5932608"/>
-            <a:ext cx="2606040" cy="340783"/>
+            <a:off x="2811783" y="6780124"/>
+            <a:ext cx="2606040" cy="389466"/>
           </a:xfrm>
           <a:prstGeom prst="rect">
             <a:avLst/>
@@ -3089,7 +3089,7 @@
           <a:bodyPr vert="horz" lIns="79141" tIns="39571" rIns="79141" bIns="39571" rtlCol="0" anchor="ctr"/>
           <a:lstStyle>
             <a:lvl1pPr algn="ctr">
-              <a:defRPr sz="2177">
+              <a:defRPr sz="2488">
                 <a:solidFill>
                   <a:schemeClr val="tx1">
                     <a:tint val="75000"/>
@@ -3115,8 +3115,8 @@
         </p:nvSpPr>
         <p:spPr>
           <a:xfrm>
-            <a:off x="5897881" y="5932608"/>
-            <a:ext cx="1920240" cy="340783"/>
+            <a:off x="5897881" y="6780124"/>
+            <a:ext cx="1920240" cy="389466"/>
           </a:xfrm>
           <a:prstGeom prst="rect">
             <a:avLst/>
@@ -3126,7 +3126,7 @@
           <a:bodyPr vert="horz" lIns="79141" tIns="39571" rIns="79141" bIns="39571" rtlCol="0" anchor="ctr"/>
           <a:lstStyle>
             <a:lvl1pPr algn="r">
-              <a:defRPr sz="2177">
+              <a:defRPr sz="2488">
                 <a:solidFill>
                   <a:schemeClr val="tx1">
                     <a:tint val="75000"/>
@@ -3163,12 +3163,12 @@
   </p:sldLayoutIdLst>
   <p:txStyles>
     <p:titleStyle>
-      <a:lvl1pPr algn="ctr" defTabSz="1723014" rtl="0" eaLnBrk="1" latinLnBrk="0" hangingPunct="1">
+      <a:lvl1pPr algn="ctr" defTabSz="1969233" rtl="0" eaLnBrk="1" latinLnBrk="0" hangingPunct="1">
         <a:spcBef>
           <a:spcPct val="0"/>
         </a:spcBef>
         <a:buNone/>
-        <a:defRPr sz="8274" kern="1200">
+        <a:defRPr sz="9456" kern="1200">
           <a:solidFill>
             <a:schemeClr val="tx1"/>
           </a:solidFill>
@@ -3179,13 +3179,13 @@
       </a:lvl1pPr>
     </p:titleStyle>
     <p:bodyStyle>
-      <a:lvl1pPr marL="646131" indent="-646131" algn="l" defTabSz="1723014" rtl="0" eaLnBrk="1" latinLnBrk="0" hangingPunct="1">
+      <a:lvl1pPr marL="738463" indent="-738463" algn="l" defTabSz="1969233" rtl="0" eaLnBrk="1" latinLnBrk="0" hangingPunct="1">
         <a:spcBef>
           <a:spcPct val="20000"/>
         </a:spcBef>
         <a:buFont typeface="Arial" pitchFamily="34" charset="0"/>
         <a:buChar char="•"/>
-        <a:defRPr sz="6099" kern="1200">
+        <a:defRPr sz="6971" kern="1200">
           <a:solidFill>
             <a:schemeClr val="tx1"/>
           </a:solidFill>
@@ -3194,13 +3194,13 @@
           <a:cs typeface="+mn-cs"/>
         </a:defRPr>
       </a:lvl1pPr>
-      <a:lvl2pPr marL="1399952" indent="-538440" algn="l" defTabSz="1723014" rtl="0" eaLnBrk="1" latinLnBrk="0" hangingPunct="1">
+      <a:lvl2pPr marL="1600005" indent="-615383" algn="l" defTabSz="1969233" rtl="0" eaLnBrk="1" latinLnBrk="0" hangingPunct="1">
         <a:spcBef>
           <a:spcPct val="20000"/>
         </a:spcBef>
         <a:buFont typeface="Arial" pitchFamily="34" charset="0"/>
         <a:buChar char="–"/>
-        <a:defRPr sz="5227" kern="1200">
+        <a:defRPr sz="5974" kern="1200">
           <a:solidFill>
             <a:schemeClr val="tx1"/>
           </a:solidFill>
@@ -3209,13 +3209,13 @@
           <a:cs typeface="+mn-cs"/>
         </a:defRPr>
       </a:lvl2pPr>
-      <a:lvl3pPr marL="2153771" indent="-430756" algn="l" defTabSz="1723014" rtl="0" eaLnBrk="1" latinLnBrk="0" hangingPunct="1">
+      <a:lvl3pPr marL="2461545" indent="-492311" algn="l" defTabSz="1969233" rtl="0" eaLnBrk="1" latinLnBrk="0" hangingPunct="1">
         <a:spcBef>
           <a:spcPct val="20000"/>
         </a:spcBef>
         <a:buFont typeface="Arial" pitchFamily="34" charset="0"/>
         <a:buChar char="•"/>
-        <a:defRPr sz="4573" kern="1200">
+        <a:defRPr sz="5226" kern="1200">
           <a:solidFill>
             <a:schemeClr val="tx1"/>
           </a:solidFill>
@@ -3224,13 +3224,13 @@
           <a:cs typeface="+mn-cs"/>
         </a:defRPr>
       </a:lvl3pPr>
-      <a:lvl4pPr marL="3015277" indent="-430756" algn="l" defTabSz="1723014" rtl="0" eaLnBrk="1" latinLnBrk="0" hangingPunct="1">
+      <a:lvl4pPr marL="3446160" indent="-492311" algn="l" defTabSz="1969233" rtl="0" eaLnBrk="1" latinLnBrk="0" hangingPunct="1">
         <a:spcBef>
           <a:spcPct val="20000"/>
         </a:spcBef>
         <a:buFont typeface="Arial" pitchFamily="34" charset="0"/>
         <a:buChar char="–"/>
-        <a:defRPr sz="3701" kern="1200">
+        <a:defRPr sz="4230" kern="1200">
           <a:solidFill>
             <a:schemeClr val="tx1"/>
           </a:solidFill>
@@ -3239,13 +3239,13 @@
           <a:cs typeface="+mn-cs"/>
         </a:defRPr>
       </a:lvl4pPr>
-      <a:lvl5pPr marL="3876784" indent="-430756" algn="l" defTabSz="1723014" rtl="0" eaLnBrk="1" latinLnBrk="0" hangingPunct="1">
+      <a:lvl5pPr marL="4430776" indent="-492311" algn="l" defTabSz="1969233" rtl="0" eaLnBrk="1" latinLnBrk="0" hangingPunct="1">
         <a:spcBef>
           <a:spcPct val="20000"/>
         </a:spcBef>
         <a:buFont typeface="Arial" pitchFamily="34" charset="0"/>
         <a:buChar char="»"/>
-        <a:defRPr sz="3701" kern="1200">
+        <a:defRPr sz="4230" kern="1200">
           <a:solidFill>
             <a:schemeClr val="tx1"/>
           </a:solidFill>
@@ -3254,13 +3254,13 @@
           <a:cs typeface="+mn-cs"/>
         </a:defRPr>
       </a:lvl5pPr>
-      <a:lvl6pPr marL="4738292" indent="-430756" algn="l" defTabSz="1723014" rtl="0" eaLnBrk="1" latinLnBrk="0" hangingPunct="1">
+      <a:lvl6pPr marL="5415394" indent="-492311" algn="l" defTabSz="1969233" rtl="0" eaLnBrk="1" latinLnBrk="0" hangingPunct="1">
         <a:spcBef>
           <a:spcPct val="20000"/>
         </a:spcBef>
         <a:buFont typeface="Arial" pitchFamily="34" charset="0"/>
         <a:buChar char="•"/>
-        <a:defRPr sz="3701" kern="1200">
+        <a:defRPr sz="4230" kern="1200">
           <a:solidFill>
             <a:schemeClr val="tx1"/>
           </a:solidFill>
@@ -3269,13 +3269,13 @@
           <a:cs typeface="+mn-cs"/>
         </a:defRPr>
       </a:lvl6pPr>
-      <a:lvl7pPr marL="5599799" indent="-430756" algn="l" defTabSz="1723014" rtl="0" eaLnBrk="1" latinLnBrk="0" hangingPunct="1">
+      <a:lvl7pPr marL="6400010" indent="-492311" algn="l" defTabSz="1969233" rtl="0" eaLnBrk="1" latinLnBrk="0" hangingPunct="1">
         <a:spcBef>
           <a:spcPct val="20000"/>
         </a:spcBef>
         <a:buFont typeface="Arial" pitchFamily="34" charset="0"/>
         <a:buChar char="•"/>
-        <a:defRPr sz="3701" kern="1200">
+        <a:defRPr sz="4230" kern="1200">
           <a:solidFill>
             <a:schemeClr val="tx1"/>
           </a:solidFill>
@@ -3284,13 +3284,13 @@
           <a:cs typeface="+mn-cs"/>
         </a:defRPr>
       </a:lvl7pPr>
-      <a:lvl8pPr marL="6461312" indent="-430756" algn="l" defTabSz="1723014" rtl="0" eaLnBrk="1" latinLnBrk="0" hangingPunct="1">
+      <a:lvl8pPr marL="7384633" indent="-492311" algn="l" defTabSz="1969233" rtl="0" eaLnBrk="1" latinLnBrk="0" hangingPunct="1">
         <a:spcBef>
           <a:spcPct val="20000"/>
         </a:spcBef>
         <a:buFont typeface="Arial" pitchFamily="34" charset="0"/>
         <a:buChar char="•"/>
-        <a:defRPr sz="3701" kern="1200">
+        <a:defRPr sz="4230" kern="1200">
           <a:solidFill>
             <a:schemeClr val="tx1"/>
           </a:solidFill>
@@ -3299,13 +3299,13 @@
           <a:cs typeface="+mn-cs"/>
         </a:defRPr>
       </a:lvl8pPr>
-      <a:lvl9pPr marL="7322818" indent="-430756" algn="l" defTabSz="1723014" rtl="0" eaLnBrk="1" latinLnBrk="0" hangingPunct="1">
+      <a:lvl9pPr marL="8369249" indent="-492311" algn="l" defTabSz="1969233" rtl="0" eaLnBrk="1" latinLnBrk="0" hangingPunct="1">
         <a:spcBef>
           <a:spcPct val="20000"/>
         </a:spcBef>
         <a:buFont typeface="Arial" pitchFamily="34" charset="0"/>
         <a:buChar char="•"/>
-        <a:defRPr sz="3701" kern="1200">
+        <a:defRPr sz="4230" kern="1200">
           <a:solidFill>
             <a:schemeClr val="tx1"/>
           </a:solidFill>
@@ -3319,8 +3319,8 @@
       <a:defPPr>
         <a:defRPr lang="en-US"/>
       </a:defPPr>
-      <a:lvl1pPr marL="0" algn="l" defTabSz="1723014" rtl="0" eaLnBrk="1" latinLnBrk="0" hangingPunct="1">
-        <a:defRPr sz="3481" kern="1200">
+      <a:lvl1pPr marL="0" algn="l" defTabSz="1969233" rtl="0" eaLnBrk="1" latinLnBrk="0" hangingPunct="1">
+        <a:defRPr sz="3978" kern="1200">
           <a:solidFill>
             <a:schemeClr val="tx1"/>
           </a:solidFill>
@@ -3329,8 +3329,8 @@
           <a:cs typeface="+mn-cs"/>
         </a:defRPr>
       </a:lvl1pPr>
-      <a:lvl2pPr marL="861510" algn="l" defTabSz="1723014" rtl="0" eaLnBrk="1" latinLnBrk="0" hangingPunct="1">
-        <a:defRPr sz="3481" kern="1200">
+      <a:lvl2pPr marL="984620" algn="l" defTabSz="1969233" rtl="0" eaLnBrk="1" latinLnBrk="0" hangingPunct="1">
+        <a:defRPr sz="3978" kern="1200">
           <a:solidFill>
             <a:schemeClr val="tx1"/>
           </a:solidFill>
@@ -3339,8 +3339,8 @@
           <a:cs typeface="+mn-cs"/>
         </a:defRPr>
       </a:lvl2pPr>
-      <a:lvl3pPr marL="1723014" algn="l" defTabSz="1723014" rtl="0" eaLnBrk="1" latinLnBrk="0" hangingPunct="1">
-        <a:defRPr sz="3481" kern="1200">
+      <a:lvl3pPr marL="1969233" algn="l" defTabSz="1969233" rtl="0" eaLnBrk="1" latinLnBrk="0" hangingPunct="1">
+        <a:defRPr sz="3978" kern="1200">
           <a:solidFill>
             <a:schemeClr val="tx1"/>
           </a:solidFill>
@@ -3349,8 +3349,8 @@
           <a:cs typeface="+mn-cs"/>
         </a:defRPr>
       </a:lvl3pPr>
-      <a:lvl4pPr marL="2584525" algn="l" defTabSz="1723014" rtl="0" eaLnBrk="1" latinLnBrk="0" hangingPunct="1">
-        <a:defRPr sz="3481" kern="1200">
+      <a:lvl4pPr marL="2953854" algn="l" defTabSz="1969233" rtl="0" eaLnBrk="1" latinLnBrk="0" hangingPunct="1">
+        <a:defRPr sz="3978" kern="1200">
           <a:solidFill>
             <a:schemeClr val="tx1"/>
           </a:solidFill>
@@ -3359,8 +3359,8 @@
           <a:cs typeface="+mn-cs"/>
         </a:defRPr>
       </a:lvl4pPr>
-      <a:lvl5pPr marL="3446033" algn="l" defTabSz="1723014" rtl="0" eaLnBrk="1" latinLnBrk="0" hangingPunct="1">
-        <a:defRPr sz="3481" kern="1200">
+      <a:lvl5pPr marL="3938471" algn="l" defTabSz="1969233" rtl="0" eaLnBrk="1" latinLnBrk="0" hangingPunct="1">
+        <a:defRPr sz="3978" kern="1200">
           <a:solidFill>
             <a:schemeClr val="tx1"/>
           </a:solidFill>
@@ -3369,8 +3369,8 @@
           <a:cs typeface="+mn-cs"/>
         </a:defRPr>
       </a:lvl5pPr>
-      <a:lvl6pPr marL="4307536" algn="l" defTabSz="1723014" rtl="0" eaLnBrk="1" latinLnBrk="0" hangingPunct="1">
-        <a:defRPr sz="3481" kern="1200">
+      <a:lvl6pPr marL="4923083" algn="l" defTabSz="1969233" rtl="0" eaLnBrk="1" latinLnBrk="0" hangingPunct="1">
+        <a:defRPr sz="3978" kern="1200">
           <a:solidFill>
             <a:schemeClr val="tx1"/>
           </a:solidFill>
@@ -3379,8 +3379,8 @@
           <a:cs typeface="+mn-cs"/>
         </a:defRPr>
       </a:lvl6pPr>
-      <a:lvl7pPr marL="5169044" algn="l" defTabSz="1723014" rtl="0" eaLnBrk="1" latinLnBrk="0" hangingPunct="1">
-        <a:defRPr sz="3481" kern="1200">
+      <a:lvl7pPr marL="5907700" algn="l" defTabSz="1969233" rtl="0" eaLnBrk="1" latinLnBrk="0" hangingPunct="1">
+        <a:defRPr sz="3978" kern="1200">
           <a:solidFill>
             <a:schemeClr val="tx1"/>
           </a:solidFill>
@@ -3389,8 +3389,8 @@
           <a:cs typeface="+mn-cs"/>
         </a:defRPr>
       </a:lvl7pPr>
-      <a:lvl8pPr marL="6030553" algn="l" defTabSz="1723014" rtl="0" eaLnBrk="1" latinLnBrk="0" hangingPunct="1">
-        <a:defRPr sz="3481" kern="1200">
+      <a:lvl8pPr marL="6892319" algn="l" defTabSz="1969233" rtl="0" eaLnBrk="1" latinLnBrk="0" hangingPunct="1">
+        <a:defRPr sz="3978" kern="1200">
           <a:solidFill>
             <a:schemeClr val="tx1"/>
           </a:solidFill>
@@ -3399,8 +3399,8 @@
           <a:cs typeface="+mn-cs"/>
         </a:defRPr>
       </a:lvl8pPr>
-      <a:lvl9pPr marL="6892061" algn="l" defTabSz="1723014" rtl="0" eaLnBrk="1" latinLnBrk="0" hangingPunct="1">
-        <a:defRPr sz="3481" kern="1200">
+      <a:lvl9pPr marL="7876937" algn="l" defTabSz="1969233" rtl="0" eaLnBrk="1" latinLnBrk="0" hangingPunct="1">
+        <a:defRPr sz="3978" kern="1200">
           <a:solidFill>
             <a:schemeClr val="tx1"/>
           </a:solidFill>
@@ -3441,13 +3441,13 @@
       </p:grpSpPr>
       <p:sp>
         <p:nvSpPr>
-          <p:cNvPr id="271" name="Rectangle 270"/>
+          <p:cNvPr id="69" name="Rectangle 68"/>
           <p:cNvSpPr/>
           <p:nvPr/>
         </p:nvSpPr>
         <p:spPr>
           <a:xfrm>
-            <a:off x="76199" y="487839"/>
+            <a:off x="76199" y="351898"/>
             <a:ext cx="1828800" cy="182880"/>
           </a:xfrm>
           <a:prstGeom prst="rect">
@@ -3508,13 +3508,13 @@
       </p:sp>
       <p:cxnSp>
         <p:nvCxnSpPr>
-          <p:cNvPr id="272" name="Straight Connector 271"/>
+          <p:cNvPr id="72" name="Straight Connector 71"/>
           <p:cNvCxnSpPr/>
           <p:nvPr/>
         </p:nvCxnSpPr>
         <p:spPr>
           <a:xfrm>
-            <a:off x="0" y="365919"/>
+            <a:off x="0" y="304800"/>
             <a:ext cx="8229600" cy="0"/>
           </a:xfrm>
           <a:prstGeom prst="line">
@@ -3545,7 +3545,7 @@
       </p:cxnSp>
       <p:sp>
         <p:nvSpPr>
-          <p:cNvPr id="273" name="Rectangle 272"/>
+          <p:cNvPr id="73" name="Rectangle 72"/>
           <p:cNvSpPr/>
           <p:nvPr/>
         </p:nvSpPr>
@@ -3632,13 +3632,13 @@
       </p:sp>
       <p:sp>
         <p:nvSpPr>
-          <p:cNvPr id="274" name="Rectangle 273"/>
+          <p:cNvPr id="74" name="Rectangle 73"/>
           <p:cNvSpPr/>
           <p:nvPr/>
         </p:nvSpPr>
         <p:spPr>
           <a:xfrm>
-            <a:off x="2234292" y="1645920"/>
+            <a:off x="2234292" y="1509979"/>
             <a:ext cx="1828800" cy="182880"/>
           </a:xfrm>
           <a:prstGeom prst="rect">
@@ -3696,13 +3696,13 @@
       </p:sp>
       <p:sp>
         <p:nvSpPr>
-          <p:cNvPr id="275" name="Rectangle 274"/>
+          <p:cNvPr id="76" name="Rectangle 75"/>
           <p:cNvSpPr/>
           <p:nvPr/>
         </p:nvSpPr>
         <p:spPr>
           <a:xfrm>
-            <a:off x="2234292" y="487839"/>
+            <a:off x="2234292" y="351898"/>
             <a:ext cx="1828800" cy="182880"/>
           </a:xfrm>
           <a:prstGeom prst="rect">
@@ -3760,13 +3760,13 @@
       </p:sp>
       <p:sp>
         <p:nvSpPr>
-          <p:cNvPr id="276" name="Rectangle 275"/>
+          <p:cNvPr id="78" name="Rectangle 77"/>
           <p:cNvSpPr/>
           <p:nvPr/>
         </p:nvSpPr>
         <p:spPr>
           <a:xfrm>
-            <a:off x="2234292" y="1356399"/>
+            <a:off x="2234292" y="1220458"/>
             <a:ext cx="1828800" cy="182880"/>
           </a:xfrm>
           <a:prstGeom prst="rect">
@@ -3824,13 +3824,13 @@
       </p:sp>
       <p:sp>
         <p:nvSpPr>
-          <p:cNvPr id="277" name="Rectangle 276"/>
+          <p:cNvPr id="80" name="Rectangle 79"/>
           <p:cNvSpPr/>
           <p:nvPr/>
         </p:nvSpPr>
         <p:spPr>
           <a:xfrm>
-            <a:off x="2240280" y="1981200"/>
+            <a:off x="2240280" y="1845259"/>
             <a:ext cx="1828800" cy="182880"/>
           </a:xfrm>
           <a:prstGeom prst="rect">
@@ -3888,13 +3888,13 @@
       </p:sp>
       <p:sp>
         <p:nvSpPr>
-          <p:cNvPr id="278" name="Rectangle 277"/>
+          <p:cNvPr id="81" name="Rectangle 80"/>
           <p:cNvSpPr/>
           <p:nvPr/>
         </p:nvSpPr>
         <p:spPr>
           <a:xfrm>
-            <a:off x="2234292" y="777359"/>
+            <a:off x="2234292" y="641418"/>
             <a:ext cx="1828800" cy="182880"/>
           </a:xfrm>
           <a:prstGeom prst="rect">
@@ -3952,13 +3952,13 @@
       </p:sp>
       <p:sp>
         <p:nvSpPr>
-          <p:cNvPr id="279" name="Rectangle 278"/>
+          <p:cNvPr id="83" name="Rectangle 82"/>
           <p:cNvSpPr/>
           <p:nvPr/>
         </p:nvSpPr>
         <p:spPr>
           <a:xfrm>
-            <a:off x="4492244" y="2456300"/>
+            <a:off x="4492244" y="2320359"/>
             <a:ext cx="1828800" cy="182880"/>
           </a:xfrm>
           <a:prstGeom prst="rect">
@@ -4019,13 +4019,13 @@
       </p:sp>
       <p:sp>
         <p:nvSpPr>
-          <p:cNvPr id="281" name="Rectangle 280"/>
+          <p:cNvPr id="84" name="Rectangle 83"/>
           <p:cNvSpPr/>
           <p:nvPr/>
         </p:nvSpPr>
         <p:spPr>
           <a:xfrm>
-            <a:off x="2234292" y="1066880"/>
+            <a:off x="2234292" y="930939"/>
             <a:ext cx="1828800" cy="182880"/>
           </a:xfrm>
           <a:prstGeom prst="rect">
@@ -4083,16 +4083,16 @@
       </p:sp>
       <p:cxnSp>
         <p:nvCxnSpPr>
-          <p:cNvPr id="282" name="Straight Arrow Connector 281"/>
+          <p:cNvPr id="86" name="Straight Arrow Connector 85"/>
           <p:cNvCxnSpPr>
-            <a:stCxn id="271" idx="3"/>
-            <a:endCxn id="275" idx="1"/>
+            <a:stCxn id="69" idx="3"/>
+            <a:endCxn id="76" idx="1"/>
           </p:cNvCxnSpPr>
           <p:nvPr/>
         </p:nvCxnSpPr>
         <p:spPr>
           <a:xfrm>
-            <a:off x="1904999" y="579279"/>
+            <a:off x="1904999" y="443338"/>
             <a:ext cx="329293" cy="0"/>
           </a:xfrm>
           <a:prstGeom prst="straightConnector1">
@@ -4122,16 +4122,16 @@
       </p:cxnSp>
       <p:cxnSp>
         <p:nvCxnSpPr>
-          <p:cNvPr id="287" name="Elbow Connector 286"/>
+          <p:cNvPr id="88" name="Elbow Connector 87"/>
           <p:cNvCxnSpPr>
-            <a:stCxn id="275" idx="3"/>
-            <a:endCxn id="277" idx="3"/>
+            <a:stCxn id="76" idx="3"/>
+            <a:endCxn id="80" idx="3"/>
           </p:cNvCxnSpPr>
           <p:nvPr/>
         </p:nvCxnSpPr>
         <p:spPr>
           <a:xfrm>
-            <a:off x="4063092" y="579279"/>
+            <a:off x="4063092" y="443338"/>
             <a:ext cx="5988" cy="1493361"/>
           </a:xfrm>
           <a:prstGeom prst="bentConnector3">
@@ -4163,16 +4163,16 @@
       </p:cxnSp>
       <p:cxnSp>
         <p:nvCxnSpPr>
-          <p:cNvPr id="288" name="Elbow Connector 287"/>
+          <p:cNvPr id="94" name="Elbow Connector 93"/>
           <p:cNvCxnSpPr>
-            <a:stCxn id="278" idx="3"/>
-            <a:endCxn id="277" idx="3"/>
+            <a:stCxn id="81" idx="3"/>
+            <a:endCxn id="80" idx="3"/>
           </p:cNvCxnSpPr>
           <p:nvPr/>
         </p:nvCxnSpPr>
         <p:spPr>
           <a:xfrm>
-            <a:off x="4063092" y="868799"/>
+            <a:off x="4063092" y="732858"/>
             <a:ext cx="5988" cy="1203841"/>
           </a:xfrm>
           <a:prstGeom prst="bentConnector3">
@@ -4204,16 +4204,16 @@
       </p:cxnSp>
       <p:cxnSp>
         <p:nvCxnSpPr>
-          <p:cNvPr id="289" name="Elbow Connector 288"/>
+          <p:cNvPr id="97" name="Elbow Connector 96"/>
           <p:cNvCxnSpPr>
-            <a:stCxn id="281" idx="3"/>
-            <a:endCxn id="277" idx="3"/>
+            <a:stCxn id="84" idx="3"/>
+            <a:endCxn id="80" idx="3"/>
           </p:cNvCxnSpPr>
           <p:nvPr/>
         </p:nvCxnSpPr>
         <p:spPr>
           <a:xfrm>
-            <a:off x="4063092" y="1158320"/>
+            <a:off x="4063092" y="1022379"/>
             <a:ext cx="5988" cy="914320"/>
           </a:xfrm>
           <a:prstGeom prst="bentConnector3">
@@ -4245,16 +4245,16 @@
       </p:cxnSp>
       <p:cxnSp>
         <p:nvCxnSpPr>
-          <p:cNvPr id="290" name="Elbow Connector 289"/>
+          <p:cNvPr id="99" name="Elbow Connector 98"/>
           <p:cNvCxnSpPr>
-            <a:stCxn id="276" idx="3"/>
-            <a:endCxn id="277" idx="3"/>
+            <a:stCxn id="78" idx="3"/>
+            <a:endCxn id="80" idx="3"/>
           </p:cNvCxnSpPr>
           <p:nvPr/>
         </p:nvCxnSpPr>
         <p:spPr>
           <a:xfrm>
-            <a:off x="4063092" y="1447839"/>
+            <a:off x="4063092" y="1311898"/>
             <a:ext cx="5988" cy="624801"/>
           </a:xfrm>
           <a:prstGeom prst="bentConnector3">
@@ -4286,16 +4286,16 @@
       </p:cxnSp>
       <p:cxnSp>
         <p:nvCxnSpPr>
-          <p:cNvPr id="291" name="Elbow Connector 290"/>
+          <p:cNvPr id="100" name="Elbow Connector 99"/>
           <p:cNvCxnSpPr>
-            <a:stCxn id="274" idx="3"/>
-            <a:endCxn id="277" idx="3"/>
+            <a:stCxn id="74" idx="3"/>
+            <a:endCxn id="80" idx="3"/>
           </p:cNvCxnSpPr>
           <p:nvPr/>
         </p:nvCxnSpPr>
         <p:spPr>
           <a:xfrm>
-            <a:off x="4063092" y="1737360"/>
+            <a:off x="4063092" y="1601419"/>
             <a:ext cx="5988" cy="335280"/>
           </a:xfrm>
           <a:prstGeom prst="bentConnector3">
@@ -4327,13 +4327,13 @@
       </p:cxnSp>
       <p:sp>
         <p:nvSpPr>
-          <p:cNvPr id="292" name="Rectangle 291"/>
+          <p:cNvPr id="102" name="Rectangle 101"/>
           <p:cNvSpPr/>
           <p:nvPr/>
         </p:nvSpPr>
         <p:spPr>
           <a:xfrm>
-            <a:off x="2240280" y="5196840"/>
+            <a:off x="2240280" y="5060899"/>
             <a:ext cx="1828800" cy="182880"/>
           </a:xfrm>
           <a:prstGeom prst="rect">
@@ -4394,13 +4394,13 @@
       </p:sp>
       <p:sp>
         <p:nvSpPr>
-          <p:cNvPr id="293" name="Rectangle 292"/>
+          <p:cNvPr id="103" name="Rectangle 102"/>
           <p:cNvSpPr/>
           <p:nvPr/>
         </p:nvSpPr>
         <p:spPr>
           <a:xfrm>
-            <a:off x="2240280" y="4724400"/>
+            <a:off x="2240280" y="4588459"/>
             <a:ext cx="1828800" cy="182880"/>
           </a:xfrm>
           <a:prstGeom prst="rect">
@@ -4444,17 +4444,7 @@
                 <a:latin typeface="Times New Roman" panose="02020603050405020304" pitchFamily="18" charset="0"/>
                 <a:cs typeface="Times New Roman" panose="02020603050405020304" pitchFamily="18" charset="0"/>
               </a:rPr>
-              <a:t>threshold </a:t>
-            </a:r>
-            <a:r>
-              <a:rPr lang="en-US" sz="1000" dirty="0" smtClean="0">
-                <a:solidFill>
-                  <a:schemeClr val="tx1"/>
-                </a:solidFill>
-                <a:latin typeface="Times New Roman" panose="02020603050405020304" pitchFamily="18" charset="0"/>
-                <a:cs typeface="Times New Roman" panose="02020603050405020304" pitchFamily="18" charset="0"/>
-              </a:rPr>
-              <a:t>current page</a:t>
+              <a:t>threshold current page</a:t>
             </a:r>
             <a:endParaRPr lang="en-US" sz="1000" dirty="0">
               <a:solidFill>
@@ -4468,13 +4458,13 @@
       </p:sp>
       <p:sp>
         <p:nvSpPr>
-          <p:cNvPr id="294" name="Rectangle 293"/>
+          <p:cNvPr id="104" name="Rectangle 103"/>
           <p:cNvSpPr/>
           <p:nvPr/>
         </p:nvSpPr>
         <p:spPr>
           <a:xfrm>
-            <a:off x="2240280" y="4191000"/>
+            <a:off x="2240280" y="4084320"/>
             <a:ext cx="1828800" cy="365760"/>
           </a:xfrm>
           <a:prstGeom prst="rect">
@@ -4532,13 +4522,13 @@
       </p:sp>
       <p:sp>
         <p:nvSpPr>
-          <p:cNvPr id="296" name="Rectangle 295"/>
+          <p:cNvPr id="105" name="Rectangle 104"/>
           <p:cNvSpPr/>
           <p:nvPr/>
         </p:nvSpPr>
         <p:spPr>
           <a:xfrm>
-            <a:off x="2240280" y="2362200"/>
+            <a:off x="2240280" y="2226259"/>
             <a:ext cx="1828800" cy="365760"/>
           </a:xfrm>
           <a:prstGeom prst="rect">
@@ -4596,16 +4586,16 @@
       </p:sp>
       <p:cxnSp>
         <p:nvCxnSpPr>
-          <p:cNvPr id="298" name="Straight Arrow Connector 297"/>
+          <p:cNvPr id="106" name="Straight Arrow Connector 105"/>
           <p:cNvCxnSpPr>
-            <a:stCxn id="279" idx="1"/>
-            <a:endCxn id="296" idx="3"/>
+            <a:stCxn id="83" idx="1"/>
+            <a:endCxn id="105" idx="3"/>
           </p:cNvCxnSpPr>
           <p:nvPr/>
         </p:nvCxnSpPr>
         <p:spPr>
           <a:xfrm flipH="1" flipV="1">
-            <a:off x="4069080" y="2545080"/>
+            <a:off x="4069080" y="2409139"/>
             <a:ext cx="423164" cy="2660"/>
           </a:xfrm>
           <a:prstGeom prst="straightConnector1">
@@ -4635,13 +4625,13 @@
       </p:cxnSp>
       <p:cxnSp>
         <p:nvCxnSpPr>
-          <p:cNvPr id="299" name="Straight Connector 298"/>
+          <p:cNvPr id="108" name="Straight Connector 107"/>
           <p:cNvCxnSpPr/>
           <p:nvPr/>
         </p:nvCxnSpPr>
         <p:spPr>
           <a:xfrm>
-            <a:off x="0" y="5005665"/>
+            <a:off x="0" y="4869724"/>
             <a:ext cx="8229600" cy="0"/>
           </a:xfrm>
           <a:prstGeom prst="line">
@@ -4672,13 +4662,13 @@
       </p:cxnSp>
       <p:sp>
         <p:nvSpPr>
-          <p:cNvPr id="300" name="Rectangle 299"/>
+          <p:cNvPr id="109" name="Rectangle 108"/>
           <p:cNvSpPr/>
           <p:nvPr/>
         </p:nvSpPr>
         <p:spPr>
           <a:xfrm>
-            <a:off x="2240280" y="3860798"/>
+            <a:off x="2240280" y="3764280"/>
             <a:ext cx="1828800" cy="182880"/>
           </a:xfrm>
           <a:prstGeom prst="rect">
@@ -4736,13 +4726,13 @@
       </p:sp>
       <p:sp>
         <p:nvSpPr>
-          <p:cNvPr id="302" name="Flowchart: Alternate Process 301"/>
+          <p:cNvPr id="110" name="Flowchart: Alternate Process 109"/>
           <p:cNvSpPr/>
           <p:nvPr/>
         </p:nvSpPr>
         <p:spPr>
           <a:xfrm>
-            <a:off x="4495800" y="4724400"/>
+            <a:off x="4495800" y="4588459"/>
             <a:ext cx="3657600" cy="182880"/>
           </a:xfrm>
           <a:prstGeom prst="flowChartAlternateProcess">
@@ -4792,13 +4782,13 @@
       </p:sp>
       <p:sp>
         <p:nvSpPr>
-          <p:cNvPr id="308" name="Flowchart: Alternate Process 307"/>
+          <p:cNvPr id="111" name="Flowchart: Alternate Process 110"/>
           <p:cNvSpPr/>
           <p:nvPr/>
         </p:nvSpPr>
         <p:spPr>
           <a:xfrm>
-            <a:off x="4953000" y="3769358"/>
+            <a:off x="4953000" y="3672840"/>
             <a:ext cx="3200400" cy="365760"/>
           </a:xfrm>
           <a:prstGeom prst="flowChartAlternateProcess">
@@ -4888,13 +4878,13 @@
       </p:sp>
       <p:sp>
         <p:nvSpPr>
-          <p:cNvPr id="316" name="Flowchart: Alternate Process 315"/>
+          <p:cNvPr id="112" name="Flowchart: Alternate Process 111"/>
           <p:cNvSpPr/>
           <p:nvPr/>
         </p:nvSpPr>
         <p:spPr>
           <a:xfrm>
-            <a:off x="4495800" y="5105400"/>
+            <a:off x="4495800" y="4969459"/>
             <a:ext cx="3657600" cy="365760"/>
           </a:xfrm>
           <a:prstGeom prst="flowChartAlternateProcess">
@@ -4944,13 +4934,13 @@
       </p:sp>
       <p:sp>
         <p:nvSpPr>
-          <p:cNvPr id="322" name="Rectangle 321"/>
+          <p:cNvPr id="113" name="Rectangle 112"/>
           <p:cNvSpPr/>
           <p:nvPr/>
         </p:nvSpPr>
         <p:spPr>
           <a:xfrm>
-            <a:off x="25400" y="2362200"/>
+            <a:off x="25400" y="2226259"/>
             <a:ext cx="2011680" cy="365760"/>
           </a:xfrm>
           <a:prstGeom prst="rect">
@@ -5030,13 +5020,13 @@
       </p:sp>
       <p:sp>
         <p:nvSpPr>
-          <p:cNvPr id="323" name="Down Arrow 322"/>
+          <p:cNvPr id="116" name="Down Arrow 115"/>
           <p:cNvSpPr/>
           <p:nvPr/>
         </p:nvSpPr>
         <p:spPr>
           <a:xfrm rot="16200000">
-            <a:off x="2036090" y="2407921"/>
+            <a:off x="2027018" y="2271980"/>
             <a:ext cx="182880" cy="274320"/>
           </a:xfrm>
           <a:prstGeom prst="downArrow">
@@ -5078,17 +5068,17 @@
       </p:sp>
       <p:cxnSp>
         <p:nvCxnSpPr>
-          <p:cNvPr id="60" name="Straight Arrow Connector 59"/>
+          <p:cNvPr id="117" name="Straight Arrow Connector 116"/>
           <p:cNvCxnSpPr>
-            <a:stCxn id="273" idx="2"/>
-            <a:endCxn id="271" idx="0"/>
+            <a:stCxn id="73" idx="2"/>
+            <a:endCxn id="69" idx="0"/>
           </p:cNvCxnSpPr>
           <p:nvPr/>
         </p:nvCxnSpPr>
         <p:spPr>
           <a:xfrm flipH="1">
             <a:off x="990599" y="233839"/>
-            <a:ext cx="1" cy="254000"/>
+            <a:ext cx="1" cy="118059"/>
           </a:xfrm>
           <a:prstGeom prst="straightConnector1">
             <a:avLst/>
@@ -5117,16 +5107,16 @@
       </p:cxnSp>
       <p:cxnSp>
         <p:nvCxnSpPr>
-          <p:cNvPr id="75" name="Straight Arrow Connector 74"/>
+          <p:cNvPr id="118" name="Straight Arrow Connector 117"/>
           <p:cNvCxnSpPr>
-            <a:stCxn id="300" idx="3"/>
-            <a:endCxn id="308" idx="1"/>
+            <a:stCxn id="109" idx="3"/>
+            <a:endCxn id="111" idx="1"/>
           </p:cNvCxnSpPr>
           <p:nvPr/>
         </p:nvCxnSpPr>
         <p:spPr>
           <a:xfrm>
-            <a:off x="4069080" y="3952238"/>
+            <a:off x="4069080" y="3855720"/>
             <a:ext cx="883920" cy="0"/>
           </a:xfrm>
           <a:prstGeom prst="straightConnector1">
@@ -5158,16 +5148,16 @@
       </p:cxnSp>
       <p:cxnSp>
         <p:nvCxnSpPr>
-          <p:cNvPr id="82" name="Straight Arrow Connector 81"/>
+          <p:cNvPr id="122" name="Straight Arrow Connector 121"/>
           <p:cNvCxnSpPr>
-            <a:stCxn id="293" idx="3"/>
-            <a:endCxn id="302" idx="1"/>
+            <a:stCxn id="103" idx="3"/>
+            <a:endCxn id="110" idx="1"/>
           </p:cNvCxnSpPr>
           <p:nvPr/>
         </p:nvCxnSpPr>
         <p:spPr>
           <a:xfrm>
-            <a:off x="4069080" y="4815840"/>
+            <a:off x="4069080" y="4679899"/>
             <a:ext cx="426720" cy="0"/>
           </a:xfrm>
           <a:prstGeom prst="straightConnector1">
@@ -5199,16 +5189,16 @@
       </p:cxnSp>
       <p:cxnSp>
         <p:nvCxnSpPr>
-          <p:cNvPr id="85" name="Straight Arrow Connector 84"/>
+          <p:cNvPr id="123" name="Straight Arrow Connector 122"/>
           <p:cNvCxnSpPr>
-            <a:stCxn id="292" idx="3"/>
-            <a:endCxn id="316" idx="1"/>
+            <a:stCxn id="102" idx="3"/>
+            <a:endCxn id="112" idx="1"/>
           </p:cNvCxnSpPr>
           <p:nvPr/>
         </p:nvCxnSpPr>
         <p:spPr>
           <a:xfrm>
-            <a:off x="4069080" y="5288280"/>
+            <a:off x="4069080" y="5152339"/>
             <a:ext cx="426720" cy="0"/>
           </a:xfrm>
           <a:prstGeom prst="straightConnector1">
@@ -5240,17 +5230,17 @@
       </p:cxnSp>
       <p:cxnSp>
         <p:nvCxnSpPr>
-          <p:cNvPr id="91" name="Straight Arrow Connector 90"/>
+          <p:cNvPr id="130" name="Straight Arrow Connector 129"/>
           <p:cNvCxnSpPr>
-            <a:stCxn id="66" idx="2"/>
-            <a:endCxn id="300" idx="0"/>
+            <a:stCxn id="145" idx="2"/>
+            <a:endCxn id="109" idx="0"/>
           </p:cNvCxnSpPr>
           <p:nvPr/>
         </p:nvCxnSpPr>
         <p:spPr>
           <a:xfrm>
-            <a:off x="3154680" y="3636373"/>
-            <a:ext cx="0" cy="224425"/>
+            <a:off x="3154680" y="3576632"/>
+            <a:ext cx="0" cy="187648"/>
           </a:xfrm>
           <a:prstGeom prst="straightConnector1">
             <a:avLst/>
@@ -5279,17 +5269,17 @@
       </p:cxnSp>
       <p:cxnSp>
         <p:nvCxnSpPr>
-          <p:cNvPr id="98" name="Straight Arrow Connector 97"/>
+          <p:cNvPr id="131" name="Straight Arrow Connector 130"/>
           <p:cNvCxnSpPr>
-            <a:stCxn id="300" idx="2"/>
-            <a:endCxn id="294" idx="0"/>
+            <a:stCxn id="109" idx="2"/>
+            <a:endCxn id="104" idx="0"/>
           </p:cNvCxnSpPr>
           <p:nvPr/>
         </p:nvCxnSpPr>
         <p:spPr>
           <a:xfrm>
-            <a:off x="3154680" y="4043678"/>
-            <a:ext cx="0" cy="147322"/>
+            <a:off x="3154680" y="3947160"/>
+            <a:ext cx="0" cy="137160"/>
           </a:xfrm>
           <a:prstGeom prst="straightConnector1">
             <a:avLst/>
@@ -5318,17 +5308,17 @@
       </p:cxnSp>
       <p:cxnSp>
         <p:nvCxnSpPr>
-          <p:cNvPr id="101" name="Straight Arrow Connector 100"/>
+          <p:cNvPr id="132" name="Straight Arrow Connector 131"/>
           <p:cNvCxnSpPr>
-            <a:stCxn id="294" idx="2"/>
-            <a:endCxn id="293" idx="0"/>
+            <a:stCxn id="104" idx="2"/>
+            <a:endCxn id="103" idx="0"/>
           </p:cNvCxnSpPr>
           <p:nvPr/>
         </p:nvCxnSpPr>
         <p:spPr>
           <a:xfrm>
-            <a:off x="3154680" y="4556760"/>
-            <a:ext cx="0" cy="167640"/>
+            <a:off x="3154680" y="4450080"/>
+            <a:ext cx="0" cy="138379"/>
           </a:xfrm>
           <a:prstGeom prst="straightConnector1">
             <a:avLst/>
@@ -5357,16 +5347,16 @@
       </p:cxnSp>
       <p:cxnSp>
         <p:nvCxnSpPr>
-          <p:cNvPr id="107" name="Straight Arrow Connector 106"/>
+          <p:cNvPr id="133" name="Straight Arrow Connector 132"/>
           <p:cNvCxnSpPr>
-            <a:stCxn id="293" idx="2"/>
-            <a:endCxn id="292" idx="0"/>
+            <a:stCxn id="103" idx="2"/>
+            <a:endCxn id="102" idx="0"/>
           </p:cNvCxnSpPr>
           <p:nvPr/>
         </p:nvCxnSpPr>
         <p:spPr>
           <a:xfrm>
-            <a:off x="3154680" y="4907280"/>
+            <a:off x="3154680" y="4771339"/>
             <a:ext cx="0" cy="289560"/>
           </a:xfrm>
           <a:prstGeom prst="straightConnector1">
@@ -5396,13 +5386,13 @@
       </p:cxnSp>
       <p:sp>
         <p:nvSpPr>
-          <p:cNvPr id="114" name="Rectangle 113"/>
+          <p:cNvPr id="134" name="Rectangle 133"/>
           <p:cNvSpPr/>
           <p:nvPr/>
         </p:nvSpPr>
         <p:spPr>
           <a:xfrm>
-            <a:off x="25400" y="3860798"/>
+            <a:off x="25400" y="3764280"/>
             <a:ext cx="2011680" cy="182880"/>
           </a:xfrm>
           <a:prstGeom prst="rect">
@@ -5462,13 +5452,13 @@
       </p:sp>
       <p:sp>
         <p:nvSpPr>
-          <p:cNvPr id="115" name="Down Arrow 114"/>
+          <p:cNvPr id="135" name="Down Arrow 134"/>
           <p:cNvSpPr/>
           <p:nvPr/>
         </p:nvSpPr>
         <p:spPr>
           <a:xfrm rot="16200000">
-            <a:off x="2036090" y="3815078"/>
+            <a:off x="2027018" y="3718560"/>
             <a:ext cx="182880" cy="274320"/>
           </a:xfrm>
           <a:prstGeom prst="downArrow">
@@ -5510,13 +5500,13 @@
       </p:sp>
       <p:sp>
         <p:nvSpPr>
-          <p:cNvPr id="119" name="Rectangle 118"/>
+          <p:cNvPr id="136" name="Rectangle 135"/>
           <p:cNvSpPr/>
           <p:nvPr/>
         </p:nvSpPr>
         <p:spPr>
           <a:xfrm>
-            <a:off x="25400" y="884000"/>
+            <a:off x="25400" y="748059"/>
             <a:ext cx="2011680" cy="365760"/>
           </a:xfrm>
           <a:prstGeom prst="rect">
@@ -5574,13 +5564,13 @@
       </p:sp>
       <p:sp>
         <p:nvSpPr>
-          <p:cNvPr id="120" name="Down Arrow 119"/>
+          <p:cNvPr id="137" name="Down Arrow 136"/>
           <p:cNvSpPr/>
           <p:nvPr/>
         </p:nvSpPr>
         <p:spPr>
           <a:xfrm rot="16200000">
-            <a:off x="2036090" y="1021160"/>
+            <a:off x="2027018" y="885219"/>
             <a:ext cx="182880" cy="274320"/>
           </a:xfrm>
           <a:prstGeom prst="downArrow">
@@ -5622,16 +5612,16 @@
       </p:sp>
       <p:cxnSp>
         <p:nvCxnSpPr>
-          <p:cNvPr id="121" name="Straight Arrow Connector 120"/>
+          <p:cNvPr id="138" name="Straight Arrow Connector 137"/>
           <p:cNvCxnSpPr>
-            <a:stCxn id="277" idx="2"/>
-            <a:endCxn id="296" idx="0"/>
+            <a:stCxn id="80" idx="2"/>
+            <a:endCxn id="105" idx="0"/>
           </p:cNvCxnSpPr>
           <p:nvPr/>
         </p:nvCxnSpPr>
         <p:spPr>
           <a:xfrm>
-            <a:off x="3154680" y="2164080"/>
+            <a:off x="3154680" y="2028139"/>
             <a:ext cx="0" cy="198120"/>
           </a:xfrm>
           <a:prstGeom prst="straightConnector1">
@@ -5661,13 +5651,13 @@
       </p:cxnSp>
       <p:cxnSp>
         <p:nvCxnSpPr>
-          <p:cNvPr id="124" name="Straight Connector 123"/>
+          <p:cNvPr id="139" name="Straight Connector 138"/>
           <p:cNvCxnSpPr/>
           <p:nvPr/>
         </p:nvCxnSpPr>
         <p:spPr>
           <a:xfrm>
-            <a:off x="0" y="2217964"/>
+            <a:off x="0" y="2082023"/>
             <a:ext cx="8229600" cy="0"/>
           </a:xfrm>
           <a:prstGeom prst="line">
@@ -5698,13 +5688,13 @@
       </p:cxnSp>
       <p:sp>
         <p:nvSpPr>
-          <p:cNvPr id="125" name="Rectangle 124"/>
+          <p:cNvPr id="140" name="Rectangle 139"/>
           <p:cNvSpPr/>
           <p:nvPr/>
         </p:nvSpPr>
         <p:spPr>
           <a:xfrm>
-            <a:off x="25400" y="1356399"/>
+            <a:off x="25400" y="1220458"/>
             <a:ext cx="2011680" cy="182880"/>
           </a:xfrm>
           <a:prstGeom prst="rect">
@@ -5764,13 +5754,13 @@
       </p:sp>
       <p:sp>
         <p:nvSpPr>
-          <p:cNvPr id="126" name="Down Arrow 125"/>
+          <p:cNvPr id="141" name="Down Arrow 140"/>
           <p:cNvSpPr/>
           <p:nvPr/>
         </p:nvSpPr>
         <p:spPr>
           <a:xfrm rot="16200000">
-            <a:off x="2032497" y="1305096"/>
+            <a:off x="2027018" y="1169155"/>
             <a:ext cx="182880" cy="274320"/>
           </a:xfrm>
           <a:prstGeom prst="downArrow">
@@ -5812,13 +5802,13 @@
       </p:sp>
       <p:cxnSp>
         <p:nvCxnSpPr>
-          <p:cNvPr id="127" name="Straight Connector 126"/>
+          <p:cNvPr id="142" name="Straight Connector 141"/>
           <p:cNvCxnSpPr/>
           <p:nvPr/>
         </p:nvCxnSpPr>
         <p:spPr>
           <a:xfrm>
-            <a:off x="0" y="5562600"/>
+            <a:off x="0" y="5426659"/>
             <a:ext cx="8229600" cy="0"/>
           </a:xfrm>
           <a:prstGeom prst="line">
@@ -5849,13 +5839,13 @@
       </p:cxnSp>
       <p:sp>
         <p:nvSpPr>
-          <p:cNvPr id="128" name="Rectangle 127"/>
+          <p:cNvPr id="143" name="Rectangle 142"/>
           <p:cNvSpPr/>
           <p:nvPr/>
         </p:nvSpPr>
         <p:spPr>
           <a:xfrm>
-            <a:off x="3352800" y="5654040"/>
+            <a:off x="3200400" y="5496199"/>
             <a:ext cx="1828800" cy="457200"/>
           </a:xfrm>
           <a:prstGeom prst="rect">
@@ -5915,13 +5905,13 @@
       </p:sp>
       <p:sp>
         <p:nvSpPr>
-          <p:cNvPr id="129" name="Rectangle 128"/>
+          <p:cNvPr id="144" name="Rectangle 143"/>
           <p:cNvSpPr/>
           <p:nvPr/>
         </p:nvSpPr>
         <p:spPr>
           <a:xfrm>
-            <a:off x="762000" y="5654040"/>
+            <a:off x="152400" y="5496199"/>
             <a:ext cx="1828800" cy="457200"/>
           </a:xfrm>
           <a:prstGeom prst="rect">
@@ -5979,13 +5969,13 @@
       </p:sp>
       <p:sp>
         <p:nvSpPr>
-          <p:cNvPr id="66" name="Rectangle 65"/>
+          <p:cNvPr id="145" name="Rectangle 144"/>
           <p:cNvSpPr/>
           <p:nvPr/>
         </p:nvSpPr>
         <p:spPr>
           <a:xfrm>
-            <a:off x="2240280" y="3453493"/>
+            <a:off x="2240280" y="3393752"/>
             <a:ext cx="1828800" cy="182880"/>
           </a:xfrm>
           <a:prstGeom prst="rect">
@@ -6043,13 +6033,13 @@
       </p:sp>
       <p:sp>
         <p:nvSpPr>
-          <p:cNvPr id="67" name="Flowchart: Alternate Process 66"/>
+          <p:cNvPr id="146" name="Flowchart: Alternate Process 145"/>
           <p:cNvSpPr/>
           <p:nvPr/>
         </p:nvSpPr>
         <p:spPr>
           <a:xfrm>
-            <a:off x="4861560" y="3449318"/>
+            <a:off x="4861560" y="3389577"/>
             <a:ext cx="3291840" cy="182880"/>
           </a:xfrm>
           <a:prstGeom prst="flowChartAlternateProcess">
@@ -6106,16 +6096,16 @@
       </p:sp>
       <p:cxnSp>
         <p:nvCxnSpPr>
-          <p:cNvPr id="70" name="Straight Arrow Connector 69"/>
+          <p:cNvPr id="147" name="Straight Arrow Connector 146"/>
           <p:cNvCxnSpPr>
-            <a:stCxn id="66" idx="3"/>
-            <a:endCxn id="67" idx="1"/>
+            <a:stCxn id="145" idx="3"/>
+            <a:endCxn id="146" idx="1"/>
           </p:cNvCxnSpPr>
           <p:nvPr/>
         </p:nvCxnSpPr>
         <p:spPr>
           <a:xfrm flipV="1">
-            <a:off x="4069080" y="3540758"/>
+            <a:off x="4069080" y="3481017"/>
             <a:ext cx="792480" cy="4175"/>
           </a:xfrm>
           <a:prstGeom prst="straightConnector1">
@@ -6147,17 +6137,17 @@
       </p:cxnSp>
       <p:cxnSp>
         <p:nvCxnSpPr>
-          <p:cNvPr id="71" name="Straight Arrow Connector 70"/>
+          <p:cNvPr id="148" name="Straight Arrow Connector 147"/>
           <p:cNvCxnSpPr>
-            <a:stCxn id="77" idx="2"/>
-            <a:endCxn id="66" idx="0"/>
+            <a:stCxn id="67" idx="2"/>
+            <a:endCxn id="145" idx="0"/>
           </p:cNvCxnSpPr>
           <p:nvPr/>
         </p:nvCxnSpPr>
         <p:spPr>
           <a:xfrm>
             <a:off x="3154680" y="3200400"/>
-            <a:ext cx="0" cy="253093"/>
+            <a:ext cx="0" cy="193352"/>
           </a:xfrm>
           <a:prstGeom prst="straightConnector1">
             <a:avLst/>
@@ -6186,13 +6176,13 @@
       </p:cxnSp>
       <p:sp>
         <p:nvSpPr>
-          <p:cNvPr id="77" name="Rectangle 76"/>
+          <p:cNvPr id="149" name="Rectangle 148"/>
           <p:cNvSpPr/>
           <p:nvPr/>
         </p:nvSpPr>
         <p:spPr>
           <a:xfrm>
-            <a:off x="2240280" y="3017520"/>
+            <a:off x="2240280" y="2712720"/>
             <a:ext cx="1828800" cy="182880"/>
           </a:xfrm>
           <a:prstGeom prst="rect">
@@ -6250,17 +6240,17 @@
       </p:sp>
       <p:cxnSp>
         <p:nvCxnSpPr>
-          <p:cNvPr id="79" name="Straight Arrow Connector 78"/>
+          <p:cNvPr id="150" name="Straight Arrow Connector 149"/>
           <p:cNvCxnSpPr>
-            <a:stCxn id="296" idx="2"/>
-            <a:endCxn id="77" idx="0"/>
+            <a:stCxn id="105" idx="2"/>
+            <a:endCxn id="149" idx="0"/>
           </p:cNvCxnSpPr>
           <p:nvPr/>
         </p:nvCxnSpPr>
         <p:spPr>
           <a:xfrm>
-            <a:off x="3154680" y="2727960"/>
-            <a:ext cx="0" cy="289560"/>
+            <a:off x="3154680" y="2592019"/>
+            <a:ext cx="0" cy="120701"/>
           </a:xfrm>
           <a:prstGeom prst="straightConnector1">
             <a:avLst/>
@@ -6289,13 +6279,13 @@
       </p:cxnSp>
       <p:sp>
         <p:nvSpPr>
-          <p:cNvPr id="87" name="Rectangle 86"/>
+          <p:cNvPr id="151" name="Rectangle 150"/>
           <p:cNvSpPr/>
           <p:nvPr/>
         </p:nvSpPr>
         <p:spPr>
           <a:xfrm>
-            <a:off x="24492" y="5196840"/>
+            <a:off x="25400" y="5060899"/>
             <a:ext cx="2011680" cy="182880"/>
           </a:xfrm>
           <a:prstGeom prst="rect">
@@ -6355,13 +6345,13 @@
       </p:sp>
       <p:sp>
         <p:nvSpPr>
-          <p:cNvPr id="89" name="Down Arrow 88"/>
+          <p:cNvPr id="152" name="Down Arrow 151"/>
           <p:cNvSpPr/>
           <p:nvPr/>
         </p:nvSpPr>
         <p:spPr>
           <a:xfrm rot="16200000">
-            <a:off x="2035182" y="5151120"/>
+            <a:off x="2027018" y="5015179"/>
             <a:ext cx="182880" cy="274320"/>
           </a:xfrm>
           <a:prstGeom prst="downArrow">
@@ -6403,13 +6393,13 @@
       </p:sp>
       <p:sp>
         <p:nvSpPr>
-          <p:cNvPr id="90" name="Rectangle 89"/>
+          <p:cNvPr id="153" name="Rectangle 152"/>
           <p:cNvSpPr/>
           <p:nvPr/>
         </p:nvSpPr>
         <p:spPr>
           <a:xfrm>
-            <a:off x="5943600" y="5644241"/>
+            <a:off x="6248400" y="5486400"/>
             <a:ext cx="1828800" cy="457200"/>
           </a:xfrm>
           <a:prstGeom prst="rect">
@@ -6469,14 +6459,14 @@
       </p:sp>
       <p:sp>
         <p:nvSpPr>
-          <p:cNvPr id="92" name="Rectangle 91"/>
+          <p:cNvPr id="154" name="Rectangle 153"/>
           <p:cNvSpPr/>
           <p:nvPr/>
         </p:nvSpPr>
         <p:spPr>
           <a:xfrm>
-            <a:off x="25400" y="4191000"/>
-            <a:ext cx="2011680" cy="365760"/>
+            <a:off x="25400" y="4084320"/>
+            <a:ext cx="2011680" cy="182880"/>
           </a:xfrm>
           <a:prstGeom prst="rect">
             <a:avLst/>
@@ -6533,61 +6523,13 @@
       </p:sp>
       <p:sp>
         <p:nvSpPr>
-          <p:cNvPr id="93" name="Down Arrow 92"/>
+          <p:cNvPr id="155" name="Rectangle 154"/>
           <p:cNvSpPr/>
           <p:nvPr/>
         </p:nvSpPr>
         <p:spPr>
-          <a:xfrm rot="16200000">
-            <a:off x="2043346" y="4236720"/>
-            <a:ext cx="182880" cy="274320"/>
-          </a:xfrm>
-          <a:prstGeom prst="downArrow">
-            <a:avLst/>
-          </a:prstGeom>
-          <a:solidFill>
-            <a:srgbClr val="FFFF00"/>
-          </a:solidFill>
-          <a:ln w="12700">
-            <a:solidFill>
-              <a:schemeClr val="tx1"/>
-            </a:solidFill>
-          </a:ln>
-        </p:spPr>
-        <p:style>
-          <a:lnRef idx="2">
-            <a:schemeClr val="accent1">
-              <a:shade val="50000"/>
-            </a:schemeClr>
-          </a:lnRef>
-          <a:fillRef idx="1">
-            <a:schemeClr val="accent1"/>
-          </a:fillRef>
-          <a:effectRef idx="0">
-            <a:schemeClr val="accent1"/>
-          </a:effectRef>
-          <a:fontRef idx="minor">
-            <a:schemeClr val="lt1"/>
-          </a:fontRef>
-        </p:style>
-        <p:txBody>
-          <a:bodyPr rtlCol="0" anchor="ctr"/>
-          <a:lstStyle/>
-          <a:p>
-            <a:pPr algn="ctr"/>
-            <a:endParaRPr lang="en-US"/>
-          </a:p>
-        </p:txBody>
-      </p:sp>
-      <p:sp>
-        <p:nvSpPr>
-          <p:cNvPr id="95" name="Rectangle 94"/>
-          <p:cNvSpPr/>
-          <p:nvPr/>
-        </p:nvSpPr>
-        <p:spPr>
-          <a:xfrm>
-            <a:off x="16328" y="3453493"/>
+          <a:xfrm>
+            <a:off x="25400" y="3520900"/>
             <a:ext cx="2011680" cy="182880"/>
           </a:xfrm>
           <a:prstGeom prst="rect">
@@ -6647,13 +6589,446 @@
       </p:sp>
       <p:sp>
         <p:nvSpPr>
-          <p:cNvPr id="96" name="Down Arrow 95"/>
+          <p:cNvPr id="156" name="Down Arrow 155"/>
           <p:cNvSpPr/>
           <p:nvPr/>
         </p:nvSpPr>
         <p:spPr>
           <a:xfrm rot="16200000">
-            <a:off x="2027018" y="3407773"/>
+            <a:off x="2027018" y="3475180"/>
+            <a:ext cx="182880" cy="274320"/>
+          </a:xfrm>
+          <a:prstGeom prst="downArrow">
+            <a:avLst/>
+          </a:prstGeom>
+          <a:solidFill>
+            <a:srgbClr val="FFFF00"/>
+          </a:solidFill>
+          <a:ln w="12700">
+            <a:solidFill>
+              <a:schemeClr val="tx1"/>
+            </a:solidFill>
+          </a:ln>
+        </p:spPr>
+        <p:style>
+          <a:lnRef idx="2">
+            <a:schemeClr val="accent1">
+              <a:shade val="50000"/>
+            </a:schemeClr>
+          </a:lnRef>
+          <a:fillRef idx="1">
+            <a:schemeClr val="accent1"/>
+          </a:fillRef>
+          <a:effectRef idx="0">
+            <a:schemeClr val="accent1"/>
+          </a:effectRef>
+          <a:fontRef idx="minor">
+            <a:schemeClr val="lt1"/>
+          </a:fontRef>
+        </p:style>
+        <p:txBody>
+          <a:bodyPr rtlCol="0" anchor="ctr"/>
+          <a:lstStyle/>
+          <a:p>
+            <a:pPr algn="ctr"/>
+            <a:endParaRPr lang="en-US"/>
+          </a:p>
+        </p:txBody>
+      </p:sp>
+      <p:sp>
+        <p:nvSpPr>
+          <p:cNvPr id="157" name="Rectangle 156"/>
+          <p:cNvSpPr/>
+          <p:nvPr/>
+        </p:nvSpPr>
+        <p:spPr>
+          <a:xfrm>
+            <a:off x="25400" y="4312920"/>
+            <a:ext cx="2011680" cy="182880"/>
+          </a:xfrm>
+          <a:prstGeom prst="rect">
+            <a:avLst/>
+          </a:prstGeom>
+          <a:solidFill>
+            <a:schemeClr val="accent6">
+              <a:lumMod val="50000"/>
+            </a:schemeClr>
+          </a:solidFill>
+          <a:ln w="12700">
+            <a:solidFill>
+              <a:schemeClr val="tx1"/>
+            </a:solidFill>
+          </a:ln>
+        </p:spPr>
+        <p:style>
+          <a:lnRef idx="2">
+            <a:schemeClr val="accent1">
+              <a:shade val="50000"/>
+            </a:schemeClr>
+          </a:lnRef>
+          <a:fillRef idx="1">
+            <a:schemeClr val="accent1"/>
+          </a:fillRef>
+          <a:effectRef idx="0">
+            <a:schemeClr val="accent1"/>
+          </a:effectRef>
+          <a:fontRef idx="minor">
+            <a:schemeClr val="lt1"/>
+          </a:fontRef>
+        </p:style>
+        <p:txBody>
+          <a:bodyPr lIns="91440" tIns="91440" rIns="91440" bIns="91440" rtlCol="0" anchor="ctr"/>
+          <a:lstStyle/>
+          <a:p>
+            <a:pPr algn="ctr"/>
+            <a:r>
+              <a:rPr lang="en-US" sz="1000" dirty="0" smtClean="0">
+                <a:solidFill>
+                  <a:schemeClr val="bg1"/>
+                </a:solidFill>
+                <a:latin typeface="Times New Roman" panose="02020603050405020304" pitchFamily="18" charset="0"/>
+                <a:cs typeface="Times New Roman" panose="02020603050405020304" pitchFamily="18" charset="0"/>
+              </a:rPr>
+              <a:t>Distance distribution profile;</a:t>
+            </a:r>
+            <a:endParaRPr lang="en-US" sz="1000" dirty="0">
+              <a:solidFill>
+                <a:schemeClr val="bg1"/>
+              </a:solidFill>
+              <a:latin typeface="Times New Roman" panose="02020603050405020304" pitchFamily="18" charset="0"/>
+              <a:cs typeface="Times New Roman" panose="02020603050405020304" pitchFamily="18" charset="0"/>
+            </a:endParaRPr>
+          </a:p>
+        </p:txBody>
+      </p:sp>
+      <p:sp>
+        <p:nvSpPr>
+          <p:cNvPr id="158" name="Down Arrow 157"/>
+          <p:cNvSpPr/>
+          <p:nvPr/>
+        </p:nvSpPr>
+        <p:spPr>
+          <a:xfrm rot="16200000">
+            <a:off x="2027018" y="4237940"/>
+            <a:ext cx="182880" cy="274320"/>
+          </a:xfrm>
+          <a:prstGeom prst="downArrow">
+            <a:avLst/>
+          </a:prstGeom>
+          <a:solidFill>
+            <a:srgbClr val="FFFF00"/>
+          </a:solidFill>
+          <a:ln w="12700">
+            <a:solidFill>
+              <a:schemeClr val="tx1"/>
+            </a:solidFill>
+          </a:ln>
+        </p:spPr>
+        <p:style>
+          <a:lnRef idx="2">
+            <a:schemeClr val="accent1">
+              <a:shade val="50000"/>
+            </a:schemeClr>
+          </a:lnRef>
+          <a:fillRef idx="1">
+            <a:schemeClr val="accent1"/>
+          </a:fillRef>
+          <a:effectRef idx="0">
+            <a:schemeClr val="accent1"/>
+          </a:effectRef>
+          <a:fontRef idx="minor">
+            <a:schemeClr val="lt1"/>
+          </a:fontRef>
+        </p:style>
+        <p:txBody>
+          <a:bodyPr rtlCol="0" anchor="ctr"/>
+          <a:lstStyle/>
+          <a:p>
+            <a:pPr algn="ctr"/>
+            <a:endParaRPr lang="en-US"/>
+          </a:p>
+        </p:txBody>
+      </p:sp>
+      <p:sp>
+        <p:nvSpPr>
+          <p:cNvPr id="161" name="Down Arrow 160"/>
+          <p:cNvSpPr/>
+          <p:nvPr/>
+        </p:nvSpPr>
+        <p:spPr>
+          <a:xfrm rot="16200000">
+            <a:off x="2027018" y="4009339"/>
+            <a:ext cx="182880" cy="274320"/>
+          </a:xfrm>
+          <a:prstGeom prst="downArrow">
+            <a:avLst/>
+          </a:prstGeom>
+          <a:solidFill>
+            <a:srgbClr val="FFFF00"/>
+          </a:solidFill>
+          <a:ln w="12700">
+            <a:solidFill>
+              <a:schemeClr val="tx1"/>
+            </a:solidFill>
+          </a:ln>
+        </p:spPr>
+        <p:style>
+          <a:lnRef idx="2">
+            <a:schemeClr val="accent1">
+              <a:shade val="50000"/>
+            </a:schemeClr>
+          </a:lnRef>
+          <a:fillRef idx="1">
+            <a:schemeClr val="accent1"/>
+          </a:fillRef>
+          <a:effectRef idx="0">
+            <a:schemeClr val="accent1"/>
+          </a:effectRef>
+          <a:fontRef idx="minor">
+            <a:schemeClr val="lt1"/>
+          </a:fontRef>
+        </p:style>
+        <p:txBody>
+          <a:bodyPr rtlCol="0" anchor="ctr"/>
+          <a:lstStyle/>
+          <a:p>
+            <a:pPr algn="ctr"/>
+            <a:endParaRPr lang="en-US"/>
+          </a:p>
+        </p:txBody>
+      </p:sp>
+      <p:sp>
+        <p:nvSpPr>
+          <p:cNvPr id="162" name="Flowchart: Alternate Process 161"/>
+          <p:cNvSpPr/>
+          <p:nvPr/>
+        </p:nvSpPr>
+        <p:spPr>
+          <a:xfrm>
+            <a:off x="2743200" y="6075234"/>
+            <a:ext cx="2743200" cy="323720"/>
+          </a:xfrm>
+          <a:prstGeom prst="flowChartAlternateProcess">
+            <a:avLst/>
+          </a:prstGeom>
+          <a:noFill/>
+          <a:ln w="12700">
+            <a:solidFill>
+              <a:schemeClr val="tx1"/>
+            </a:solidFill>
+            <a:prstDash val="sysDash"/>
+          </a:ln>
+        </p:spPr>
+        <p:style>
+          <a:lnRef idx="2">
+            <a:schemeClr val="accent1">
+              <a:shade val="50000"/>
+            </a:schemeClr>
+          </a:lnRef>
+          <a:fillRef idx="1">
+            <a:schemeClr val="accent1"/>
+          </a:fillRef>
+          <a:effectRef idx="0">
+            <a:schemeClr val="accent1"/>
+          </a:effectRef>
+          <a:fontRef idx="minor">
+            <a:schemeClr val="lt1"/>
+          </a:fontRef>
+        </p:style>
+        <p:txBody>
+          <a:bodyPr lIns="91440" tIns="91440" rIns="91440" bIns="91440" rtlCol="0" anchor="ctr"/>
+          <a:lstStyle/>
+          <a:p>
+            <a:pPr algn="just"/>
+            <a:r>
+              <a:rPr lang="en-US" sz="1000" dirty="0" smtClean="0">
+                <a:solidFill>
+                  <a:schemeClr val="tx1"/>
+                </a:solidFill>
+                <a:latin typeface="Times New Roman" panose="02020603050405020304" pitchFamily="18" charset="0"/>
+                <a:cs typeface="Times New Roman" panose="02020603050405020304" pitchFamily="18" charset="0"/>
+              </a:rPr>
+              <a:t>Using methods with small type-2 error to guide region growing (adding priors to exemplar);</a:t>
+            </a:r>
+          </a:p>
+        </p:txBody>
+      </p:sp>
+      <p:sp>
+        <p:nvSpPr>
+          <p:cNvPr id="67" name="Rectangle 66"/>
+          <p:cNvSpPr/>
+          <p:nvPr/>
+        </p:nvSpPr>
+        <p:spPr>
+          <a:xfrm>
+            <a:off x="2240280" y="3017520"/>
+            <a:ext cx="1828800" cy="182880"/>
+          </a:xfrm>
+          <a:prstGeom prst="rect">
+            <a:avLst/>
+          </a:prstGeom>
+          <a:solidFill>
+            <a:schemeClr val="bg1"/>
+          </a:solidFill>
+          <a:ln w="12700">
+            <a:solidFill>
+              <a:schemeClr val="tx1"/>
+            </a:solidFill>
+          </a:ln>
+        </p:spPr>
+        <p:style>
+          <a:lnRef idx="2">
+            <a:schemeClr val="accent1">
+              <a:shade val="50000"/>
+            </a:schemeClr>
+          </a:lnRef>
+          <a:fillRef idx="1">
+            <a:schemeClr val="accent1"/>
+          </a:fillRef>
+          <a:effectRef idx="0">
+            <a:schemeClr val="accent1"/>
+          </a:effectRef>
+          <a:fontRef idx="minor">
+            <a:schemeClr val="lt1"/>
+          </a:fontRef>
+        </p:style>
+        <p:txBody>
+          <a:bodyPr lIns="91440" tIns="91440" rIns="91440" bIns="91440" rtlCol="0" anchor="ctr"/>
+          <a:lstStyle/>
+          <a:p>
+            <a:pPr algn="ctr"/>
+            <a:r>
+              <a:rPr lang="en-US" sz="1000" dirty="0" smtClean="0">
+                <a:solidFill>
+                  <a:schemeClr val="tx1"/>
+                </a:solidFill>
+                <a:latin typeface="Times New Roman" panose="02020603050405020304" pitchFamily="18" charset="0"/>
+                <a:cs typeface="Times New Roman" panose="02020603050405020304" pitchFamily="18" charset="0"/>
+              </a:rPr>
+              <a:t>remove single voxel</a:t>
+            </a:r>
+            <a:endParaRPr lang="en-US" sz="1000" dirty="0">
+              <a:solidFill>
+                <a:schemeClr val="tx1"/>
+              </a:solidFill>
+              <a:latin typeface="Times New Roman" panose="02020603050405020304" pitchFamily="18" charset="0"/>
+              <a:cs typeface="Times New Roman" panose="02020603050405020304" pitchFamily="18" charset="0"/>
+            </a:endParaRPr>
+          </a:p>
+        </p:txBody>
+      </p:sp>
+      <p:cxnSp>
+        <p:nvCxnSpPr>
+          <p:cNvPr id="70" name="Straight Arrow Connector 69"/>
+          <p:cNvCxnSpPr>
+            <a:stCxn id="149" idx="2"/>
+            <a:endCxn id="67" idx="0"/>
+          </p:cNvCxnSpPr>
+          <p:nvPr/>
+        </p:nvCxnSpPr>
+        <p:spPr>
+          <a:xfrm>
+            <a:off x="3154680" y="2895600"/>
+            <a:ext cx="0" cy="121920"/>
+          </a:xfrm>
+          <a:prstGeom prst="straightConnector1">
+            <a:avLst/>
+          </a:prstGeom>
+          <a:ln w="12700">
+            <a:solidFill>
+              <a:schemeClr val="tx1"/>
+            </a:solidFill>
+            <a:tailEnd type="triangle"/>
+          </a:ln>
+        </p:spPr>
+        <p:style>
+          <a:lnRef idx="1">
+            <a:schemeClr val="accent1"/>
+          </a:lnRef>
+          <a:fillRef idx="0">
+            <a:schemeClr val="accent1"/>
+          </a:fillRef>
+          <a:effectRef idx="0">
+            <a:schemeClr val="accent1"/>
+          </a:effectRef>
+          <a:fontRef idx="minor">
+            <a:schemeClr val="tx1"/>
+          </a:fontRef>
+        </p:style>
+      </p:cxnSp>
+      <p:sp>
+        <p:nvSpPr>
+          <p:cNvPr id="75" name="Rectangle 74"/>
+          <p:cNvSpPr/>
+          <p:nvPr/>
+        </p:nvSpPr>
+        <p:spPr>
+          <a:xfrm>
+            <a:off x="25400" y="3112652"/>
+            <a:ext cx="2011680" cy="365760"/>
+          </a:xfrm>
+          <a:prstGeom prst="rect">
+            <a:avLst/>
+          </a:prstGeom>
+          <a:solidFill>
+            <a:srgbClr val="FF0000"/>
+          </a:solidFill>
+          <a:ln w="12700">
+            <a:solidFill>
+              <a:schemeClr val="tx1"/>
+            </a:solidFill>
+          </a:ln>
+        </p:spPr>
+        <p:style>
+          <a:lnRef idx="2">
+            <a:schemeClr val="accent1">
+              <a:shade val="50000"/>
+            </a:schemeClr>
+          </a:lnRef>
+          <a:fillRef idx="1">
+            <a:schemeClr val="accent1"/>
+          </a:fillRef>
+          <a:effectRef idx="0">
+            <a:schemeClr val="accent1"/>
+          </a:effectRef>
+          <a:fontRef idx="minor">
+            <a:schemeClr val="lt1"/>
+          </a:fontRef>
+        </p:style>
+        <p:txBody>
+          <a:bodyPr lIns="91440" tIns="91440" rIns="91440" bIns="91440" rtlCol="0" anchor="ctr"/>
+          <a:lstStyle/>
+          <a:p>
+            <a:pPr algn="ctr"/>
+            <a:r>
+              <a:rPr lang="en-US" sz="1000" dirty="0" smtClean="0">
+                <a:solidFill>
+                  <a:schemeClr val="bg1"/>
+                </a:solidFill>
+                <a:latin typeface="Times New Roman" panose="02020603050405020304" pitchFamily="18" charset="0"/>
+                <a:cs typeface="Times New Roman" panose="02020603050405020304" pitchFamily="18" charset="0"/>
+              </a:rPr>
+              <a:t>Virtual finger-based exemplar identification and characterization;</a:t>
+            </a:r>
+            <a:endParaRPr lang="en-US" sz="1000" dirty="0">
+              <a:solidFill>
+                <a:schemeClr val="bg1"/>
+              </a:solidFill>
+              <a:latin typeface="Times New Roman" panose="02020603050405020304" pitchFamily="18" charset="0"/>
+              <a:cs typeface="Times New Roman" panose="02020603050405020304" pitchFamily="18" charset="0"/>
+            </a:endParaRPr>
+          </a:p>
+        </p:txBody>
+      </p:sp>
+      <p:sp>
+        <p:nvSpPr>
+          <p:cNvPr id="77" name="Down Arrow 76"/>
+          <p:cNvSpPr/>
+          <p:nvPr/>
+        </p:nvSpPr>
+        <p:spPr>
+          <a:xfrm rot="16200000">
+            <a:off x="2027018" y="3249812"/>
             <a:ext cx="182880" cy="274320"/>
           </a:xfrm>
           <a:prstGeom prst="downArrow">

</xml_diff>

<commit_message>
Add comparison across different methods; Adjusted meanShift algorithm;
git-svn-id: https://svn.janelia.org/penglab/projects/vaa3d_tools@1697 f26c06c5-4756-4547-a2b9-0b39063de1b8
</commit_message>
<xml_diff>
--- a/hackathon/xiang/cellSegmentation/scheme.pptx
+++ b/hackathon/xiang/cellSegmentation/scheme.pptx
@@ -5,11 +5,12 @@
     <p:sldMasterId id="2147483648" r:id="rId1"/>
   </p:sldMasterIdLst>
   <p:notesMasterIdLst>
-    <p:notesMasterId r:id="rId4"/>
+    <p:notesMasterId r:id="rId5"/>
   </p:notesMasterIdLst>
   <p:sldIdLst>
     <p:sldId id="270" r:id="rId2"/>
     <p:sldId id="271" r:id="rId3"/>
+    <p:sldId id="272" r:id="rId4"/>
   </p:sldIdLst>
   <p:sldSz cx="8229600" cy="7315200"/>
   <p:notesSz cx="6858000" cy="9144000"/>
@@ -209,7 +210,7 @@
           <a:p>
             <a:fld id="{D70E0579-1147-4611-864D-63CAA23B7179}" type="datetimeFigureOut">
               <a:rPr lang="en-US" smtClean="0"/>
-              <a:t>10/22/2014</a:t>
+              <a:t>10/23/2014</a:t>
             </a:fld>
             <a:endParaRPr lang="en-US"/>
           </a:p>
@@ -659,7 +660,7 @@
             <a:fld id="{1D8BD707-D9CF-40AE-B4C6-C98DA3205C09}" type="datetimeFigureOut">
               <a:rPr lang="en-US" smtClean="0"/>
               <a:pPr/>
-              <a:t>10/22/2014</a:t>
+              <a:t>10/23/2014</a:t>
             </a:fld>
             <a:endParaRPr lang="en-US"/>
           </a:p>
@@ -826,7 +827,7 @@
             <a:fld id="{1D8BD707-D9CF-40AE-B4C6-C98DA3205C09}" type="datetimeFigureOut">
               <a:rPr lang="en-US" smtClean="0"/>
               <a:pPr/>
-              <a:t>10/22/2014</a:t>
+              <a:t>10/23/2014</a:t>
             </a:fld>
             <a:endParaRPr lang="en-US"/>
           </a:p>
@@ -1003,7 +1004,7 @@
             <a:fld id="{1D8BD707-D9CF-40AE-B4C6-C98DA3205C09}" type="datetimeFigureOut">
               <a:rPr lang="en-US" smtClean="0"/>
               <a:pPr/>
-              <a:t>10/22/2014</a:t>
+              <a:t>10/23/2014</a:t>
             </a:fld>
             <a:endParaRPr lang="en-US"/>
           </a:p>
@@ -1170,7 +1171,7 @@
             <a:fld id="{1D8BD707-D9CF-40AE-B4C6-C98DA3205C09}" type="datetimeFigureOut">
               <a:rPr lang="en-US" smtClean="0"/>
               <a:pPr/>
-              <a:t>10/22/2014</a:t>
+              <a:t>10/23/2014</a:t>
             </a:fld>
             <a:endParaRPr lang="en-US"/>
           </a:p>
@@ -1413,7 +1414,7 @@
             <a:fld id="{1D8BD707-D9CF-40AE-B4C6-C98DA3205C09}" type="datetimeFigureOut">
               <a:rPr lang="en-US" smtClean="0"/>
               <a:pPr/>
-              <a:t>10/22/2014</a:t>
+              <a:t>10/23/2014</a:t>
             </a:fld>
             <a:endParaRPr lang="en-US"/>
           </a:p>
@@ -1698,7 +1699,7 @@
             <a:fld id="{1D8BD707-D9CF-40AE-B4C6-C98DA3205C09}" type="datetimeFigureOut">
               <a:rPr lang="en-US" smtClean="0"/>
               <a:pPr/>
-              <a:t>10/22/2014</a:t>
+              <a:t>10/23/2014</a:t>
             </a:fld>
             <a:endParaRPr lang="en-US"/>
           </a:p>
@@ -2117,7 +2118,7 @@
             <a:fld id="{1D8BD707-D9CF-40AE-B4C6-C98DA3205C09}" type="datetimeFigureOut">
               <a:rPr lang="en-US" smtClean="0"/>
               <a:pPr/>
-              <a:t>10/22/2014</a:t>
+              <a:t>10/23/2014</a:t>
             </a:fld>
             <a:endParaRPr lang="en-US"/>
           </a:p>
@@ -2232,7 +2233,7 @@
             <a:fld id="{1D8BD707-D9CF-40AE-B4C6-C98DA3205C09}" type="datetimeFigureOut">
               <a:rPr lang="en-US" smtClean="0"/>
               <a:pPr/>
-              <a:t>10/22/2014</a:t>
+              <a:t>10/23/2014</a:t>
             </a:fld>
             <a:endParaRPr lang="en-US"/>
           </a:p>
@@ -2324,7 +2325,7 @@
             <a:fld id="{1D8BD707-D9CF-40AE-B4C6-C98DA3205C09}" type="datetimeFigureOut">
               <a:rPr lang="en-US" smtClean="0"/>
               <a:pPr/>
-              <a:t>10/22/2014</a:t>
+              <a:t>10/23/2014</a:t>
             </a:fld>
             <a:endParaRPr lang="en-US"/>
           </a:p>
@@ -2598,7 +2599,7 @@
             <a:fld id="{1D8BD707-D9CF-40AE-B4C6-C98DA3205C09}" type="datetimeFigureOut">
               <a:rPr lang="en-US" smtClean="0"/>
               <a:pPr/>
-              <a:t>10/22/2014</a:t>
+              <a:t>10/23/2014</a:t>
             </a:fld>
             <a:endParaRPr lang="en-US"/>
           </a:p>
@@ -2848,7 +2849,7 @@
             <a:fld id="{1D8BD707-D9CF-40AE-B4C6-C98DA3205C09}" type="datetimeFigureOut">
               <a:rPr lang="en-US" smtClean="0"/>
               <a:pPr/>
-              <a:t>10/22/2014</a:t>
+              <a:t>10/23/2014</a:t>
             </a:fld>
             <a:endParaRPr lang="en-US"/>
           </a:p>
@@ -3061,7 +3062,7 @@
             <a:fld id="{1D8BD707-D9CF-40AE-B4C6-C98DA3205C09}" type="datetimeFigureOut">
               <a:rPr lang="en-US" smtClean="0"/>
               <a:pPr/>
-              <a:t>10/22/2014</a:t>
+              <a:t>10/23/2014</a:t>
             </a:fld>
             <a:endParaRPr lang="en-US"/>
           </a:p>
@@ -7269,17 +7270,7 @@
                 <a:latin typeface="Times New Roman" panose="02020603050405020304" pitchFamily="18" charset="0"/>
                 <a:cs typeface="Times New Roman" panose="02020603050405020304" pitchFamily="18" charset="0"/>
               </a:rPr>
-              <a:t>Current </a:t>
-            </a:r>
-            <a:r>
-              <a:rPr lang="en-US" sz="1400" b="1" dirty="0" smtClean="0">
-                <a:solidFill>
-                  <a:schemeClr val="bg1"/>
-                </a:solidFill>
-                <a:latin typeface="Times New Roman" panose="02020603050405020304" pitchFamily="18" charset="0"/>
-                <a:cs typeface="Times New Roman" panose="02020603050405020304" pitchFamily="18" charset="0"/>
-              </a:rPr>
-              <a:t>regions (from exemplar or grown regions);</a:t>
+              <a:t>Current regions (from exemplar or grown regions);</a:t>
             </a:r>
             <a:endParaRPr lang="en-US" sz="1400" b="1" dirty="0">
               <a:solidFill>
@@ -7765,13 +7756,6 @@
               </a:rPr>
               <a:t>YES</a:t>
             </a:r>
-            <a:endParaRPr lang="en-US" sz="1000" dirty="0" smtClean="0">
-              <a:solidFill>
-                <a:schemeClr val="tx1"/>
-              </a:solidFill>
-              <a:latin typeface="Times New Roman" panose="02020603050405020304" pitchFamily="18" charset="0"/>
-              <a:cs typeface="Times New Roman" panose="02020603050405020304" pitchFamily="18" charset="0"/>
-            </a:endParaRPr>
           </a:p>
         </p:txBody>
       </p:sp>
@@ -7864,13 +7848,6 @@
               </a:rPr>
               <a:t>NO</a:t>
             </a:r>
-            <a:endParaRPr lang="en-US" sz="1000" dirty="0" smtClean="0">
-              <a:solidFill>
-                <a:schemeClr val="tx1"/>
-              </a:solidFill>
-              <a:latin typeface="Times New Roman" panose="02020603050405020304" pitchFamily="18" charset="0"/>
-              <a:cs typeface="Times New Roman" panose="02020603050405020304" pitchFamily="18" charset="0"/>
-            </a:endParaRPr>
           </a:p>
         </p:txBody>
       </p:sp>
@@ -8069,79 +8046,6 @@
               </a:rPr>
               <a:t>YES</a:t>
             </a:r>
-            <a:endParaRPr lang="en-US" sz="1000" dirty="0" smtClean="0">
-              <a:solidFill>
-                <a:schemeClr val="tx1"/>
-              </a:solidFill>
-              <a:latin typeface="Times New Roman" panose="02020603050405020304" pitchFamily="18" charset="0"/>
-              <a:cs typeface="Times New Roman" panose="02020603050405020304" pitchFamily="18" charset="0"/>
-            </a:endParaRPr>
-          </a:p>
-        </p:txBody>
-      </p:sp>
-      <p:sp>
-        <p:nvSpPr>
-          <p:cNvPr id="39" name="Rectangle 38"/>
-          <p:cNvSpPr/>
-          <p:nvPr/>
-        </p:nvSpPr>
-        <p:spPr>
-          <a:xfrm>
-            <a:off x="5608319" y="4414520"/>
-            <a:ext cx="2042159" cy="548640"/>
-          </a:xfrm>
-          <a:prstGeom prst="rect">
-            <a:avLst/>
-          </a:prstGeom>
-          <a:solidFill>
-            <a:schemeClr val="accent1">
-              <a:lumMod val="75000"/>
-            </a:schemeClr>
-          </a:solidFill>
-          <a:ln w="12700">
-            <a:solidFill>
-              <a:schemeClr val="tx1"/>
-            </a:solidFill>
-          </a:ln>
-        </p:spPr>
-        <p:style>
-          <a:lnRef idx="2">
-            <a:schemeClr val="accent1">
-              <a:shade val="50000"/>
-            </a:schemeClr>
-          </a:lnRef>
-          <a:fillRef idx="1">
-            <a:schemeClr val="accent1"/>
-          </a:fillRef>
-          <a:effectRef idx="0">
-            <a:schemeClr val="accent1"/>
-          </a:effectRef>
-          <a:fontRef idx="minor">
-            <a:schemeClr val="lt1"/>
-          </a:fontRef>
-        </p:style>
-        <p:txBody>
-          <a:bodyPr lIns="91440" tIns="91440" rIns="91440" bIns="91440" rtlCol="0" anchor="ctr"/>
-          <a:lstStyle/>
-          <a:p>
-            <a:pPr algn="ctr"/>
-            <a:r>
-              <a:rPr lang="en-US" sz="1400" b="1" dirty="0" smtClean="0">
-                <a:solidFill>
-                  <a:schemeClr val="bg1"/>
-                </a:solidFill>
-                <a:latin typeface="Times New Roman" panose="02020603050405020304" pitchFamily="18" charset="0"/>
-                <a:cs typeface="Times New Roman" panose="02020603050405020304" pitchFamily="18" charset="0"/>
-              </a:rPr>
-              <a:t>Grow sphere on cluster centers;</a:t>
-            </a:r>
-            <a:endParaRPr lang="en-US" sz="1400" b="1" dirty="0">
-              <a:solidFill>
-                <a:schemeClr val="bg1"/>
-              </a:solidFill>
-              <a:latin typeface="Times New Roman" panose="02020603050405020304" pitchFamily="18" charset="0"/>
-              <a:cs typeface="Times New Roman" panose="02020603050405020304" pitchFamily="18" charset="0"/>
-            </a:endParaRPr>
           </a:p>
         </p:txBody>
       </p:sp>
@@ -8158,45 +8062,6 @@
           <a:xfrm>
             <a:off x="5958840" y="909320"/>
             <a:ext cx="0" cy="441960"/>
-          </a:xfrm>
-          <a:prstGeom prst="straightConnector1">
-            <a:avLst/>
-          </a:prstGeom>
-          <a:ln w="28575">
-            <a:solidFill>
-              <a:schemeClr val="tx1"/>
-            </a:solidFill>
-            <a:tailEnd type="triangle"/>
-          </a:ln>
-        </p:spPr>
-        <p:style>
-          <a:lnRef idx="1">
-            <a:schemeClr val="accent1"/>
-          </a:lnRef>
-          <a:fillRef idx="0">
-            <a:schemeClr val="accent1"/>
-          </a:fillRef>
-          <a:effectRef idx="0">
-            <a:schemeClr val="accent1"/>
-          </a:effectRef>
-          <a:fontRef idx="minor">
-            <a:schemeClr val="tx1"/>
-          </a:fontRef>
-        </p:style>
-      </p:cxnSp>
-      <p:cxnSp>
-        <p:nvCxnSpPr>
-          <p:cNvPr id="44" name="Straight Arrow Connector 43"/>
-          <p:cNvCxnSpPr>
-            <a:stCxn id="35" idx="2"/>
-            <a:endCxn id="39" idx="0"/>
-          </p:cNvCxnSpPr>
-          <p:nvPr/>
-        </p:nvCxnSpPr>
-        <p:spPr>
-          <a:xfrm flipH="1">
-            <a:off x="6629399" y="4109720"/>
-            <a:ext cx="1" cy="304800"/>
           </a:xfrm>
           <a:prstGeom prst="straightConnector1">
             <a:avLst/>
@@ -8351,7 +8216,7 @@
         </p:nvSpPr>
         <p:spPr>
           <a:xfrm>
-            <a:off x="6172198" y="5308600"/>
+            <a:off x="6172198" y="4495800"/>
             <a:ext cx="914400" cy="548640"/>
           </a:xfrm>
           <a:prstGeom prst="rect">
@@ -8413,15 +8278,15 @@
         <p:nvCxnSpPr>
           <p:cNvPr id="59" name="Straight Arrow Connector 58"/>
           <p:cNvCxnSpPr>
-            <a:stCxn id="39" idx="2"/>
+            <a:stCxn id="35" idx="2"/>
             <a:endCxn id="58" idx="0"/>
           </p:cNvCxnSpPr>
           <p:nvPr/>
         </p:nvCxnSpPr>
         <p:spPr>
           <a:xfrm flipH="1">
-            <a:off x="6629398" y="4963160"/>
-            <a:ext cx="1" cy="345440"/>
+            <a:off x="6629398" y="4109720"/>
+            <a:ext cx="2" cy="386080"/>
           </a:xfrm>
           <a:prstGeom prst="straightConnector1">
             <a:avLst/>
@@ -8452,6 +8317,1101 @@
     <p:extLst>
       <p:ext uri="{BB962C8B-B14F-4D97-AF65-F5344CB8AC3E}">
         <p14:creationId xmlns:p14="http://schemas.microsoft.com/office/powerpoint/2010/main" val="2775075233"/>
+      </p:ext>
+    </p:extLst>
+  </p:cSld>
+  <p:clrMapOvr>
+    <a:masterClrMapping/>
+  </p:clrMapOvr>
+  <p:timing>
+    <p:tnLst>
+      <p:par>
+        <p:cTn id="1" dur="indefinite" restart="never" nodeType="tmRoot"/>
+      </p:par>
+    </p:tnLst>
+  </p:timing>
+</p:sld>
+</file>
+
+<file path=ppt/slides/slide3.xml><?xml version="1.0" encoding="utf-8"?>
+<p:sld xmlns:a="http://schemas.openxmlformats.org/drawingml/2006/main" xmlns:r="http://schemas.openxmlformats.org/officeDocument/2006/relationships" xmlns:p="http://schemas.openxmlformats.org/presentationml/2006/main">
+  <p:cSld>
+    <p:bg>
+      <p:bgPr>
+        <a:solidFill>
+          <a:schemeClr val="bg1"/>
+        </a:solidFill>
+        <a:effectLst/>
+      </p:bgPr>
+    </p:bg>
+    <p:spTree>
+      <p:nvGrpSpPr>
+        <p:cNvPr id="1" name=""/>
+        <p:cNvGrpSpPr/>
+        <p:nvPr/>
+      </p:nvGrpSpPr>
+      <p:grpSpPr>
+        <a:xfrm>
+          <a:off x="0" y="0"/>
+          <a:ext cx="0" cy="0"/>
+          <a:chOff x="0" y="0"/>
+          <a:chExt cx="0" cy="0"/>
+        </a:xfrm>
+      </p:grpSpPr>
+      <p:graphicFrame>
+        <p:nvGraphicFramePr>
+          <p:cNvPr id="3" name="Table 2"/>
+          <p:cNvGraphicFramePr>
+            <a:graphicFrameLocks noGrp="1"/>
+          </p:cNvGraphicFramePr>
+          <p:nvPr>
+            <p:extLst>
+              <p:ext uri="{D42A27DB-BD31-4B8C-83A1-F6EECF244321}">
+                <p14:modId xmlns:p14="http://schemas.microsoft.com/office/powerpoint/2010/main" val="778007136"/>
+              </p:ext>
+            </p:extLst>
+          </p:nvPr>
+        </p:nvGraphicFramePr>
+        <p:xfrm>
+          <a:off x="152400" y="76199"/>
+          <a:ext cx="8001000" cy="6834954"/>
+        </p:xfrm>
+        <a:graphic>
+          <a:graphicData uri="http://schemas.openxmlformats.org/drawingml/2006/table">
+            <a:tbl>
+              <a:tblPr firstRow="1" bandRow="1">
+                <a:effectLst/>
+                <a:tableStyleId>{E8034E78-7F5D-4C2E-B375-FC64B27BC917}</a:tableStyleId>
+              </a:tblPr>
+              <a:tblGrid>
+                <a:gridCol w="1600200"/>
+                <a:gridCol w="1600200"/>
+                <a:gridCol w="1600200"/>
+                <a:gridCol w="1600200"/>
+                <a:gridCol w="1600200"/>
+              </a:tblGrid>
+              <a:tr h="228601">
+                <a:tc>
+                  <a:txBody>
+                    <a:bodyPr/>
+                    <a:lstStyle/>
+                    <a:p>
+                      <a:pPr algn="ctr"/>
+                      <a:endParaRPr lang="en-US" sz="1200" b="1" dirty="0">
+                        <a:solidFill>
+                          <a:schemeClr val="tx1"/>
+                        </a:solidFill>
+                        <a:latin typeface="Times New Roman" panose="02020603050405020304" pitchFamily="18" charset="0"/>
+                        <a:cs typeface="Times New Roman" panose="02020603050405020304" pitchFamily="18" charset="0"/>
+                      </a:endParaRPr>
+                    </a:p>
+                  </a:txBody>
+                  <a:tcPr marT="91440" marB="91440" anchor="ctr">
+                    <a:lnL w="6350" cap="flat" cmpd="sng" algn="ctr">
+                      <a:solidFill>
+                        <a:schemeClr val="tx1"/>
+                      </a:solidFill>
+                      <a:prstDash val="solid"/>
+                      <a:round/>
+                      <a:headEnd type="none" w="med" len="med"/>
+                      <a:tailEnd type="none" w="med" len="med"/>
+                    </a:lnL>
+                    <a:lnR w="6350" cap="flat" cmpd="sng" algn="ctr">
+                      <a:solidFill>
+                        <a:schemeClr val="tx1"/>
+                      </a:solidFill>
+                      <a:prstDash val="solid"/>
+                      <a:round/>
+                      <a:headEnd type="none" w="med" len="med"/>
+                      <a:tailEnd type="none" w="med" len="med"/>
+                    </a:lnR>
+                    <a:lnT w="6350" cap="flat" cmpd="sng" algn="ctr">
+                      <a:solidFill>
+                        <a:schemeClr val="tx1"/>
+                      </a:solidFill>
+                      <a:prstDash val="solid"/>
+                      <a:round/>
+                      <a:headEnd type="none" w="med" len="med"/>
+                      <a:tailEnd type="none" w="med" len="med"/>
+                    </a:lnT>
+                    <a:lnB w="6350" cap="flat" cmpd="sng" algn="ctr">
+                      <a:solidFill>
+                        <a:schemeClr val="tx1"/>
+                      </a:solidFill>
+                      <a:prstDash val="solid"/>
+                      <a:round/>
+                      <a:headEnd type="none" w="med" len="med"/>
+                      <a:tailEnd type="none" w="med" len="med"/>
+                    </a:lnB>
+                    <a:solidFill>
+                      <a:schemeClr val="bg1"/>
+                    </a:solidFill>
+                  </a:tcPr>
+                </a:tc>
+                <a:tc>
+                  <a:txBody>
+                    <a:bodyPr/>
+                    <a:lstStyle/>
+                    <a:p>
+                      <a:pPr algn="ctr"/>
+                      <a:r>
+                        <a:rPr lang="en-US" sz="1200" b="1" dirty="0" smtClean="0">
+                          <a:solidFill>
+                            <a:schemeClr val="tx1"/>
+                          </a:solidFill>
+                          <a:latin typeface="Times New Roman" panose="02020603050405020304" pitchFamily="18" charset="0"/>
+                          <a:cs typeface="Times New Roman" panose="02020603050405020304" pitchFamily="18" charset="0"/>
+                        </a:rPr>
+                        <a:t>Simple Learning Cell Detection</a:t>
+                      </a:r>
+                    </a:p>
+                    <a:p>
+                      <a:pPr algn="ctr"/>
+                      <a:r>
+                        <a:rPr lang="en-US" sz="1200" b="1" dirty="0" smtClean="0">
+                          <a:solidFill>
+                            <a:schemeClr val="tx1"/>
+                          </a:solidFill>
+                          <a:latin typeface="Times New Roman" panose="02020603050405020304" pitchFamily="18" charset="0"/>
+                          <a:cs typeface="Times New Roman" panose="02020603050405020304" pitchFamily="18" charset="0"/>
+                        </a:rPr>
+                        <a:t>(</a:t>
+                      </a:r>
+                      <a:r>
+                        <a:rPr lang="en-US" sz="1200" b="1" dirty="0" err="1" smtClean="0">
+                          <a:solidFill>
+                            <a:schemeClr val="tx1"/>
+                          </a:solidFill>
+                          <a:latin typeface="Times New Roman" panose="02020603050405020304" pitchFamily="18" charset="0"/>
+                          <a:cs typeface="Times New Roman" panose="02020603050405020304" pitchFamily="18" charset="0"/>
+                        </a:rPr>
+                        <a:t>Xindi’s</a:t>
+                      </a:r>
+                      <a:r>
+                        <a:rPr lang="en-US" sz="1200" b="1" dirty="0" smtClean="0">
+                          <a:solidFill>
+                            <a:schemeClr val="tx1"/>
+                          </a:solidFill>
+                          <a:latin typeface="Times New Roman" panose="02020603050405020304" pitchFamily="18" charset="0"/>
+                          <a:cs typeface="Times New Roman" panose="02020603050405020304" pitchFamily="18" charset="0"/>
+                        </a:rPr>
+                        <a:t> method)</a:t>
+                      </a:r>
+                      <a:endParaRPr lang="en-US" sz="1200" b="1" dirty="0">
+                        <a:solidFill>
+                          <a:schemeClr val="tx1"/>
+                        </a:solidFill>
+                        <a:latin typeface="Times New Roman" panose="02020603050405020304" pitchFamily="18" charset="0"/>
+                        <a:cs typeface="Times New Roman" panose="02020603050405020304" pitchFamily="18" charset="0"/>
+                      </a:endParaRPr>
+                    </a:p>
+                  </a:txBody>
+                  <a:tcPr marT="91440" marB="91440" anchor="ctr">
+                    <a:lnL w="6350" cap="flat" cmpd="sng" algn="ctr">
+                      <a:solidFill>
+                        <a:schemeClr val="tx1"/>
+                      </a:solidFill>
+                      <a:prstDash val="solid"/>
+                      <a:round/>
+                      <a:headEnd type="none" w="med" len="med"/>
+                      <a:tailEnd type="none" w="med" len="med"/>
+                    </a:lnL>
+                    <a:lnR w="6350" cap="flat" cmpd="sng" algn="ctr">
+                      <a:solidFill>
+                        <a:schemeClr val="tx1"/>
+                      </a:solidFill>
+                      <a:prstDash val="solid"/>
+                      <a:round/>
+                      <a:headEnd type="none" w="med" len="med"/>
+                      <a:tailEnd type="none" w="med" len="med"/>
+                    </a:lnR>
+                    <a:lnT w="6350" cap="flat" cmpd="sng" algn="ctr">
+                      <a:solidFill>
+                        <a:schemeClr val="tx1"/>
+                      </a:solidFill>
+                      <a:prstDash val="solid"/>
+                      <a:round/>
+                      <a:headEnd type="none" w="med" len="med"/>
+                      <a:tailEnd type="none" w="med" len="med"/>
+                    </a:lnT>
+                    <a:lnB w="6350" cap="flat" cmpd="sng" algn="ctr">
+                      <a:solidFill>
+                        <a:schemeClr val="tx1"/>
+                      </a:solidFill>
+                      <a:prstDash val="solid"/>
+                      <a:round/>
+                      <a:headEnd type="none" w="med" len="med"/>
+                      <a:tailEnd type="none" w="med" len="med"/>
+                    </a:lnB>
+                    <a:solidFill>
+                      <a:schemeClr val="bg1"/>
+                    </a:solidFill>
+                  </a:tcPr>
+                </a:tc>
+                <a:tc>
+                  <a:txBody>
+                    <a:bodyPr/>
+                    <a:lstStyle/>
+                    <a:p>
+                      <a:pPr algn="ctr"/>
+                      <a:r>
+                        <a:rPr lang="en-US" sz="1200" b="1" dirty="0" smtClean="0">
+                          <a:solidFill>
+                            <a:schemeClr val="tx1"/>
+                          </a:solidFill>
+                          <a:latin typeface="Times New Roman" panose="02020603050405020304" pitchFamily="18" charset="0"/>
+                          <a:cs typeface="Times New Roman" panose="02020603050405020304" pitchFamily="18" charset="0"/>
+                        </a:rPr>
+                        <a:t>Region Growing</a:t>
+                      </a:r>
+                      <a:endParaRPr lang="en-US" sz="1200" b="1" dirty="0">
+                        <a:solidFill>
+                          <a:schemeClr val="tx1"/>
+                        </a:solidFill>
+                        <a:latin typeface="Times New Roman" panose="02020603050405020304" pitchFamily="18" charset="0"/>
+                        <a:cs typeface="Times New Roman" panose="02020603050405020304" pitchFamily="18" charset="0"/>
+                      </a:endParaRPr>
+                    </a:p>
+                  </a:txBody>
+                  <a:tcPr marT="91440" marB="91440" anchor="ctr">
+                    <a:lnL w="6350" cap="flat" cmpd="sng" algn="ctr">
+                      <a:solidFill>
+                        <a:schemeClr val="tx1"/>
+                      </a:solidFill>
+                      <a:prstDash val="solid"/>
+                      <a:round/>
+                      <a:headEnd type="none" w="med" len="med"/>
+                      <a:tailEnd type="none" w="med" len="med"/>
+                    </a:lnL>
+                    <a:lnR w="6350" cap="flat" cmpd="sng" algn="ctr">
+                      <a:solidFill>
+                        <a:schemeClr val="tx1"/>
+                      </a:solidFill>
+                      <a:prstDash val="solid"/>
+                      <a:round/>
+                      <a:headEnd type="none" w="med" len="med"/>
+                      <a:tailEnd type="none" w="med" len="med"/>
+                    </a:lnR>
+                    <a:lnT w="6350" cap="flat" cmpd="sng" algn="ctr">
+                      <a:solidFill>
+                        <a:schemeClr val="tx1"/>
+                      </a:solidFill>
+                      <a:prstDash val="solid"/>
+                      <a:round/>
+                      <a:headEnd type="none" w="med" len="med"/>
+                      <a:tailEnd type="none" w="med" len="med"/>
+                    </a:lnT>
+                    <a:lnB w="6350" cap="flat" cmpd="sng" algn="ctr">
+                      <a:solidFill>
+                        <a:schemeClr val="tx1"/>
+                      </a:solidFill>
+                      <a:prstDash val="solid"/>
+                      <a:round/>
+                      <a:headEnd type="none" w="med" len="med"/>
+                      <a:tailEnd type="none" w="med" len="med"/>
+                    </a:lnB>
+                    <a:solidFill>
+                      <a:schemeClr val="bg1"/>
+                    </a:solidFill>
+                  </a:tcPr>
+                </a:tc>
+                <a:tc>
+                  <a:txBody>
+                    <a:bodyPr/>
+                    <a:lstStyle/>
+                    <a:p>
+                      <a:pPr algn="ctr"/>
+                      <a:r>
+                        <a:rPr lang="en-US" sz="1200" b="1" dirty="0" smtClean="0">
+                          <a:solidFill>
+                            <a:schemeClr val="tx1"/>
+                          </a:solidFill>
+                          <a:latin typeface="Times New Roman" panose="02020603050405020304" pitchFamily="18" charset="0"/>
+                          <a:cs typeface="Times New Roman" panose="02020603050405020304" pitchFamily="18" charset="0"/>
+                        </a:rPr>
+                        <a:t>Region Growing</a:t>
+                      </a:r>
+                      <a:r>
+                        <a:rPr lang="en-US" sz="1200" b="1" baseline="0" dirty="0" smtClean="0">
+                          <a:solidFill>
+                            <a:schemeClr val="tx1"/>
+                          </a:solidFill>
+                          <a:latin typeface="Times New Roman" panose="02020603050405020304" pitchFamily="18" charset="0"/>
+                          <a:cs typeface="Times New Roman" panose="02020603050405020304" pitchFamily="18" charset="0"/>
+                        </a:rPr>
+                        <a:t> + </a:t>
+                      </a:r>
+                      <a:r>
+                        <a:rPr lang="en-US" sz="1200" b="1" baseline="0" dirty="0" err="1" smtClean="0">
+                          <a:solidFill>
+                            <a:schemeClr val="tx1"/>
+                          </a:solidFill>
+                          <a:latin typeface="Times New Roman" panose="02020603050405020304" pitchFamily="18" charset="0"/>
+                          <a:cs typeface="Times New Roman" panose="02020603050405020304" pitchFamily="18" charset="0"/>
+                        </a:rPr>
+                        <a:t>meanShift</a:t>
+                      </a:r>
+                      <a:r>
+                        <a:rPr lang="en-US" sz="1200" b="1" baseline="0" dirty="0" smtClean="0">
+                          <a:solidFill>
+                            <a:schemeClr val="tx1"/>
+                          </a:solidFill>
+                          <a:latin typeface="Times New Roman" panose="02020603050405020304" pitchFamily="18" charset="0"/>
+                          <a:cs typeface="Times New Roman" panose="02020603050405020304" pitchFamily="18" charset="0"/>
+                        </a:rPr>
+                        <a:t> Clustering</a:t>
+                      </a:r>
+                      <a:endParaRPr lang="en-US" sz="1200" b="1" dirty="0">
+                        <a:solidFill>
+                          <a:schemeClr val="tx1"/>
+                        </a:solidFill>
+                        <a:latin typeface="Times New Roman" panose="02020603050405020304" pitchFamily="18" charset="0"/>
+                        <a:cs typeface="Times New Roman" panose="02020603050405020304" pitchFamily="18" charset="0"/>
+                      </a:endParaRPr>
+                    </a:p>
+                  </a:txBody>
+                  <a:tcPr marT="91440" marB="91440" anchor="ctr">
+                    <a:lnL w="6350" cap="flat" cmpd="sng" algn="ctr">
+                      <a:solidFill>
+                        <a:schemeClr val="tx1"/>
+                      </a:solidFill>
+                      <a:prstDash val="solid"/>
+                      <a:round/>
+                      <a:headEnd type="none" w="med" len="med"/>
+                      <a:tailEnd type="none" w="med" len="med"/>
+                    </a:lnL>
+                    <a:lnR w="6350" cap="flat" cmpd="sng" algn="ctr">
+                      <a:solidFill>
+                        <a:schemeClr val="tx1"/>
+                      </a:solidFill>
+                      <a:prstDash val="solid"/>
+                      <a:round/>
+                      <a:headEnd type="none" w="med" len="med"/>
+                      <a:tailEnd type="none" w="med" len="med"/>
+                    </a:lnR>
+                    <a:lnT w="6350" cap="flat" cmpd="sng" algn="ctr">
+                      <a:solidFill>
+                        <a:schemeClr val="tx1"/>
+                      </a:solidFill>
+                      <a:prstDash val="solid"/>
+                      <a:round/>
+                      <a:headEnd type="none" w="med" len="med"/>
+                      <a:tailEnd type="none" w="med" len="med"/>
+                    </a:lnT>
+                    <a:lnB w="6350" cap="flat" cmpd="sng" algn="ctr">
+                      <a:solidFill>
+                        <a:schemeClr val="tx1"/>
+                      </a:solidFill>
+                      <a:prstDash val="solid"/>
+                      <a:round/>
+                      <a:headEnd type="none" w="med" len="med"/>
+                      <a:tailEnd type="none" w="med" len="med"/>
+                    </a:lnB>
+                    <a:solidFill>
+                      <a:schemeClr val="bg1"/>
+                    </a:solidFill>
+                  </a:tcPr>
+                </a:tc>
+                <a:tc>
+                  <a:txBody>
+                    <a:bodyPr/>
+                    <a:lstStyle/>
+                    <a:p>
+                      <a:pPr algn="ctr"/>
+                      <a:r>
+                        <a:rPr lang="en-US" sz="1200" b="1" dirty="0" smtClean="0">
+                          <a:solidFill>
+                            <a:schemeClr val="tx1"/>
+                          </a:solidFill>
+                          <a:latin typeface="Times New Roman" panose="02020603050405020304" pitchFamily="18" charset="0"/>
+                          <a:cs typeface="Times New Roman" panose="02020603050405020304" pitchFamily="18" charset="0"/>
+                        </a:rPr>
+                        <a:t>Region Growing + </a:t>
+                      </a:r>
+                      <a:r>
+                        <a:rPr lang="en-US" sz="1200" b="1" dirty="0" err="1" smtClean="0">
+                          <a:solidFill>
+                            <a:schemeClr val="tx1"/>
+                          </a:solidFill>
+                          <a:latin typeface="Times New Roman" panose="02020603050405020304" pitchFamily="18" charset="0"/>
+                          <a:cs typeface="Times New Roman" panose="02020603050405020304" pitchFamily="18" charset="0"/>
+                        </a:rPr>
+                        <a:t>meanShift</a:t>
+                      </a:r>
+                      <a:r>
+                        <a:rPr lang="en-US" sz="1200" b="1" baseline="0" dirty="0" smtClean="0">
+                          <a:solidFill>
+                            <a:schemeClr val="tx1"/>
+                          </a:solidFill>
+                          <a:latin typeface="Times New Roman" panose="02020603050405020304" pitchFamily="18" charset="0"/>
+                          <a:cs typeface="Times New Roman" panose="02020603050405020304" pitchFamily="18" charset="0"/>
+                        </a:rPr>
+                        <a:t> Clustering + Simple Spherical Test</a:t>
+                      </a:r>
+                      <a:endParaRPr lang="en-US" sz="1200" b="1" dirty="0">
+                        <a:solidFill>
+                          <a:schemeClr val="tx1"/>
+                        </a:solidFill>
+                        <a:latin typeface="Times New Roman" panose="02020603050405020304" pitchFamily="18" charset="0"/>
+                        <a:cs typeface="Times New Roman" panose="02020603050405020304" pitchFamily="18" charset="0"/>
+                      </a:endParaRPr>
+                    </a:p>
+                  </a:txBody>
+                  <a:tcPr marT="91440" marB="91440" anchor="ctr">
+                    <a:lnL w="6350" cap="flat" cmpd="sng" algn="ctr">
+                      <a:solidFill>
+                        <a:schemeClr val="tx1"/>
+                      </a:solidFill>
+                      <a:prstDash val="solid"/>
+                      <a:round/>
+                      <a:headEnd type="none" w="med" len="med"/>
+                      <a:tailEnd type="none" w="med" len="med"/>
+                    </a:lnL>
+                    <a:lnR w="6350" cap="flat" cmpd="sng" algn="ctr">
+                      <a:solidFill>
+                        <a:schemeClr val="tx1"/>
+                      </a:solidFill>
+                      <a:prstDash val="solid"/>
+                      <a:round/>
+                      <a:headEnd type="none" w="med" len="med"/>
+                      <a:tailEnd type="none" w="med" len="med"/>
+                    </a:lnR>
+                    <a:lnT w="6350" cap="flat" cmpd="sng" algn="ctr">
+                      <a:solidFill>
+                        <a:schemeClr val="tx1"/>
+                      </a:solidFill>
+                      <a:prstDash val="solid"/>
+                      <a:round/>
+                      <a:headEnd type="none" w="med" len="med"/>
+                      <a:tailEnd type="none" w="med" len="med"/>
+                    </a:lnT>
+                    <a:lnB w="6350" cap="flat" cmpd="sng" algn="ctr">
+                      <a:solidFill>
+                        <a:schemeClr val="tx1"/>
+                      </a:solidFill>
+                      <a:prstDash val="solid"/>
+                      <a:round/>
+                      <a:headEnd type="none" w="med" len="med"/>
+                      <a:tailEnd type="none" w="med" len="med"/>
+                    </a:lnB>
+                    <a:solidFill>
+                      <a:schemeClr val="bg1"/>
+                    </a:solidFill>
+                  </a:tcPr>
+                </a:tc>
+              </a:tr>
+              <a:tr h="228601">
+                <a:tc>
+                  <a:txBody>
+                    <a:bodyPr/>
+                    <a:lstStyle/>
+                    <a:p>
+                      <a:pPr algn="ctr"/>
+                      <a:r>
+                        <a:rPr lang="en-US" sz="1200" b="1" dirty="0" smtClean="0">
+                          <a:solidFill>
+                            <a:schemeClr val="tx1"/>
+                          </a:solidFill>
+                          <a:latin typeface="Times New Roman" panose="02020603050405020304" pitchFamily="18" charset="0"/>
+                          <a:cs typeface="Times New Roman" panose="02020603050405020304" pitchFamily="18" charset="0"/>
+                        </a:rPr>
+                        <a:t>Number</a:t>
+                      </a:r>
+                      <a:r>
+                        <a:rPr lang="en-US" sz="1200" b="1" baseline="0" dirty="0" smtClean="0">
+                          <a:solidFill>
+                            <a:schemeClr val="tx1"/>
+                          </a:solidFill>
+                          <a:latin typeface="Times New Roman" panose="02020603050405020304" pitchFamily="18" charset="0"/>
+                          <a:cs typeface="Times New Roman" panose="02020603050405020304" pitchFamily="18" charset="0"/>
+                        </a:rPr>
+                        <a:t> of Cells</a:t>
+                      </a:r>
+                      <a:endParaRPr lang="en-US" sz="1200" b="1" dirty="0">
+                        <a:solidFill>
+                          <a:schemeClr val="tx1"/>
+                        </a:solidFill>
+                        <a:latin typeface="Times New Roman" panose="02020603050405020304" pitchFamily="18" charset="0"/>
+                        <a:cs typeface="Times New Roman" panose="02020603050405020304" pitchFamily="18" charset="0"/>
+                      </a:endParaRPr>
+                    </a:p>
+                  </a:txBody>
+                  <a:tcPr marT="91440" marB="91440" anchor="ctr">
+                    <a:lnL w="6350" cap="flat" cmpd="sng" algn="ctr">
+                      <a:solidFill>
+                        <a:schemeClr val="tx1"/>
+                      </a:solidFill>
+                      <a:prstDash val="solid"/>
+                      <a:round/>
+                      <a:headEnd type="none" w="med" len="med"/>
+                      <a:tailEnd type="none" w="med" len="med"/>
+                    </a:lnL>
+                    <a:lnR w="6350" cap="flat" cmpd="sng" algn="ctr">
+                      <a:solidFill>
+                        <a:schemeClr val="tx1"/>
+                      </a:solidFill>
+                      <a:prstDash val="solid"/>
+                      <a:round/>
+                      <a:headEnd type="none" w="med" len="med"/>
+                      <a:tailEnd type="none" w="med" len="med"/>
+                    </a:lnR>
+                    <a:lnT w="6350" cap="flat" cmpd="sng" algn="ctr">
+                      <a:solidFill>
+                        <a:schemeClr val="tx1"/>
+                      </a:solidFill>
+                      <a:prstDash val="solid"/>
+                      <a:round/>
+                      <a:headEnd type="none" w="med" len="med"/>
+                      <a:tailEnd type="none" w="med" len="med"/>
+                    </a:lnT>
+                    <a:lnB w="6350" cap="flat" cmpd="sng" algn="ctr">
+                      <a:solidFill>
+                        <a:schemeClr val="tx1"/>
+                      </a:solidFill>
+                      <a:prstDash val="solid"/>
+                      <a:round/>
+                      <a:headEnd type="none" w="med" len="med"/>
+                      <a:tailEnd type="none" w="med" len="med"/>
+                    </a:lnB>
+                  </a:tcPr>
+                </a:tc>
+                <a:tc>
+                  <a:txBody>
+                    <a:bodyPr/>
+                    <a:lstStyle/>
+                    <a:p>
+                      <a:pPr algn="ctr"/>
+                      <a:r>
+                        <a:rPr lang="en-US" sz="1200" b="1" dirty="0" smtClean="0">
+                          <a:solidFill>
+                            <a:schemeClr val="tx1"/>
+                          </a:solidFill>
+                          <a:latin typeface="Times New Roman" panose="02020603050405020304" pitchFamily="18" charset="0"/>
+                          <a:cs typeface="Times New Roman" panose="02020603050405020304" pitchFamily="18" charset="0"/>
+                        </a:rPr>
+                        <a:t>39</a:t>
+                      </a:r>
+                      <a:endParaRPr lang="en-US" sz="1200" b="1" dirty="0">
+                        <a:solidFill>
+                          <a:schemeClr val="tx1"/>
+                        </a:solidFill>
+                        <a:latin typeface="Times New Roman" panose="02020603050405020304" pitchFamily="18" charset="0"/>
+                        <a:cs typeface="Times New Roman" panose="02020603050405020304" pitchFamily="18" charset="0"/>
+                      </a:endParaRPr>
+                    </a:p>
+                  </a:txBody>
+                  <a:tcPr marT="91440" marB="91440" anchor="ctr">
+                    <a:lnL w="6350" cap="flat" cmpd="sng" algn="ctr">
+                      <a:solidFill>
+                        <a:schemeClr val="tx1"/>
+                      </a:solidFill>
+                      <a:prstDash val="solid"/>
+                      <a:round/>
+                      <a:headEnd type="none" w="med" len="med"/>
+                      <a:tailEnd type="none" w="med" len="med"/>
+                    </a:lnL>
+                    <a:lnR w="6350" cap="flat" cmpd="sng" algn="ctr">
+                      <a:solidFill>
+                        <a:schemeClr val="tx1"/>
+                      </a:solidFill>
+                      <a:prstDash val="solid"/>
+                      <a:round/>
+                      <a:headEnd type="none" w="med" len="med"/>
+                      <a:tailEnd type="none" w="med" len="med"/>
+                    </a:lnR>
+                    <a:lnT w="6350" cap="flat" cmpd="sng" algn="ctr">
+                      <a:solidFill>
+                        <a:schemeClr val="tx1"/>
+                      </a:solidFill>
+                      <a:prstDash val="solid"/>
+                      <a:round/>
+                      <a:headEnd type="none" w="med" len="med"/>
+                      <a:tailEnd type="none" w="med" len="med"/>
+                    </a:lnT>
+                    <a:lnB w="6350" cap="flat" cmpd="sng" algn="ctr">
+                      <a:solidFill>
+                        <a:schemeClr val="tx1"/>
+                      </a:solidFill>
+                      <a:prstDash val="solid"/>
+                      <a:round/>
+                      <a:headEnd type="none" w="med" len="med"/>
+                      <a:tailEnd type="none" w="med" len="med"/>
+                    </a:lnB>
+                  </a:tcPr>
+                </a:tc>
+                <a:tc>
+                  <a:txBody>
+                    <a:bodyPr/>
+                    <a:lstStyle/>
+                    <a:p>
+                      <a:pPr algn="ctr"/>
+                      <a:r>
+                        <a:rPr lang="en-US" sz="1200" b="1" dirty="0" smtClean="0">
+                          <a:solidFill>
+                            <a:schemeClr val="tx1"/>
+                          </a:solidFill>
+                          <a:latin typeface="Times New Roman" panose="02020603050405020304" pitchFamily="18" charset="0"/>
+                          <a:cs typeface="Times New Roman" panose="02020603050405020304" pitchFamily="18" charset="0"/>
+                        </a:rPr>
+                        <a:t>107</a:t>
+                      </a:r>
+                      <a:endParaRPr lang="en-US" sz="1200" b="1" dirty="0">
+                        <a:solidFill>
+                          <a:schemeClr val="tx1"/>
+                        </a:solidFill>
+                        <a:latin typeface="Times New Roman" panose="02020603050405020304" pitchFamily="18" charset="0"/>
+                        <a:cs typeface="Times New Roman" panose="02020603050405020304" pitchFamily="18" charset="0"/>
+                      </a:endParaRPr>
+                    </a:p>
+                  </a:txBody>
+                  <a:tcPr marT="91440" marB="91440" anchor="ctr">
+                    <a:lnL w="6350" cap="flat" cmpd="sng" algn="ctr">
+                      <a:solidFill>
+                        <a:schemeClr val="tx1"/>
+                      </a:solidFill>
+                      <a:prstDash val="solid"/>
+                      <a:round/>
+                      <a:headEnd type="none" w="med" len="med"/>
+                      <a:tailEnd type="none" w="med" len="med"/>
+                    </a:lnL>
+                    <a:lnR w="6350" cap="flat" cmpd="sng" algn="ctr">
+                      <a:solidFill>
+                        <a:schemeClr val="tx1"/>
+                      </a:solidFill>
+                      <a:prstDash val="solid"/>
+                      <a:round/>
+                      <a:headEnd type="none" w="med" len="med"/>
+                      <a:tailEnd type="none" w="med" len="med"/>
+                    </a:lnR>
+                    <a:lnT w="6350" cap="flat" cmpd="sng" algn="ctr">
+                      <a:solidFill>
+                        <a:schemeClr val="tx1"/>
+                      </a:solidFill>
+                      <a:prstDash val="solid"/>
+                      <a:round/>
+                      <a:headEnd type="none" w="med" len="med"/>
+                      <a:tailEnd type="none" w="med" len="med"/>
+                    </a:lnT>
+                    <a:lnB w="6350" cap="flat" cmpd="sng" algn="ctr">
+                      <a:solidFill>
+                        <a:schemeClr val="tx1"/>
+                      </a:solidFill>
+                      <a:prstDash val="solid"/>
+                      <a:round/>
+                      <a:headEnd type="none" w="med" len="med"/>
+                      <a:tailEnd type="none" w="med" len="med"/>
+                    </a:lnB>
+                  </a:tcPr>
+                </a:tc>
+                <a:tc>
+                  <a:txBody>
+                    <a:bodyPr/>
+                    <a:lstStyle/>
+                    <a:p>
+                      <a:pPr algn="ctr"/>
+                      <a:r>
+                        <a:rPr lang="en-US" sz="1200" b="1" dirty="0" smtClean="0">
+                          <a:solidFill>
+                            <a:schemeClr val="tx1"/>
+                          </a:solidFill>
+                          <a:latin typeface="Times New Roman" panose="02020603050405020304" pitchFamily="18" charset="0"/>
+                          <a:cs typeface="Times New Roman" panose="02020603050405020304" pitchFamily="18" charset="0"/>
+                        </a:rPr>
+                        <a:t>148</a:t>
+                      </a:r>
+                      <a:endParaRPr lang="en-US" sz="1200" b="1" dirty="0">
+                        <a:solidFill>
+                          <a:schemeClr val="tx1"/>
+                        </a:solidFill>
+                        <a:latin typeface="Times New Roman" panose="02020603050405020304" pitchFamily="18" charset="0"/>
+                        <a:cs typeface="Times New Roman" panose="02020603050405020304" pitchFamily="18" charset="0"/>
+                      </a:endParaRPr>
+                    </a:p>
+                  </a:txBody>
+                  <a:tcPr marT="91440" marB="91440" anchor="ctr">
+                    <a:lnL w="6350" cap="flat" cmpd="sng" algn="ctr">
+                      <a:solidFill>
+                        <a:schemeClr val="tx1"/>
+                      </a:solidFill>
+                      <a:prstDash val="solid"/>
+                      <a:round/>
+                      <a:headEnd type="none" w="med" len="med"/>
+                      <a:tailEnd type="none" w="med" len="med"/>
+                    </a:lnL>
+                    <a:lnR w="6350" cap="flat" cmpd="sng" algn="ctr">
+                      <a:solidFill>
+                        <a:schemeClr val="tx1"/>
+                      </a:solidFill>
+                      <a:prstDash val="solid"/>
+                      <a:round/>
+                      <a:headEnd type="none" w="med" len="med"/>
+                      <a:tailEnd type="none" w="med" len="med"/>
+                    </a:lnR>
+                    <a:lnT w="6350" cap="flat" cmpd="sng" algn="ctr">
+                      <a:solidFill>
+                        <a:schemeClr val="tx1"/>
+                      </a:solidFill>
+                      <a:prstDash val="solid"/>
+                      <a:round/>
+                      <a:headEnd type="none" w="med" len="med"/>
+                      <a:tailEnd type="none" w="med" len="med"/>
+                    </a:lnT>
+                    <a:lnB w="6350" cap="flat" cmpd="sng" algn="ctr">
+                      <a:solidFill>
+                        <a:schemeClr val="tx1"/>
+                      </a:solidFill>
+                      <a:prstDash val="solid"/>
+                      <a:round/>
+                      <a:headEnd type="none" w="med" len="med"/>
+                      <a:tailEnd type="none" w="med" len="med"/>
+                    </a:lnB>
+                  </a:tcPr>
+                </a:tc>
+                <a:tc>
+                  <a:txBody>
+                    <a:bodyPr/>
+                    <a:lstStyle/>
+                    <a:p>
+                      <a:pPr algn="ctr"/>
+                      <a:r>
+                        <a:rPr lang="en-US" sz="1200" b="1" dirty="0" smtClean="0">
+                          <a:solidFill>
+                            <a:schemeClr val="tx1"/>
+                          </a:solidFill>
+                          <a:latin typeface="Times New Roman" panose="02020603050405020304" pitchFamily="18" charset="0"/>
+                          <a:cs typeface="Times New Roman" panose="02020603050405020304" pitchFamily="18" charset="0"/>
+                        </a:rPr>
+                        <a:t>137</a:t>
+                      </a:r>
+                      <a:endParaRPr lang="en-US" sz="1200" b="1" dirty="0">
+                        <a:solidFill>
+                          <a:schemeClr val="tx1"/>
+                        </a:solidFill>
+                        <a:latin typeface="Times New Roman" panose="02020603050405020304" pitchFamily="18" charset="0"/>
+                        <a:cs typeface="Times New Roman" panose="02020603050405020304" pitchFamily="18" charset="0"/>
+                      </a:endParaRPr>
+                    </a:p>
+                  </a:txBody>
+                  <a:tcPr marT="91440" marB="91440" anchor="ctr">
+                    <a:lnL w="6350" cap="flat" cmpd="sng" algn="ctr">
+                      <a:solidFill>
+                        <a:schemeClr val="tx1"/>
+                      </a:solidFill>
+                      <a:prstDash val="solid"/>
+                      <a:round/>
+                      <a:headEnd type="none" w="med" len="med"/>
+                      <a:tailEnd type="none" w="med" len="med"/>
+                    </a:lnL>
+                    <a:lnR w="6350" cap="flat" cmpd="sng" algn="ctr">
+                      <a:solidFill>
+                        <a:schemeClr val="tx1"/>
+                      </a:solidFill>
+                      <a:prstDash val="solid"/>
+                      <a:round/>
+                      <a:headEnd type="none" w="med" len="med"/>
+                      <a:tailEnd type="none" w="med" len="med"/>
+                    </a:lnR>
+                    <a:lnT w="6350" cap="flat" cmpd="sng" algn="ctr">
+                      <a:solidFill>
+                        <a:schemeClr val="tx1"/>
+                      </a:solidFill>
+                      <a:prstDash val="solid"/>
+                      <a:round/>
+                      <a:headEnd type="none" w="med" len="med"/>
+                      <a:tailEnd type="none" w="med" len="med"/>
+                    </a:lnT>
+                    <a:lnB w="6350" cap="flat" cmpd="sng" algn="ctr">
+                      <a:solidFill>
+                        <a:schemeClr val="tx1"/>
+                      </a:solidFill>
+                      <a:prstDash val="solid"/>
+                      <a:round/>
+                      <a:headEnd type="none" w="med" len="med"/>
+                      <a:tailEnd type="none" w="med" len="med"/>
+                    </a:lnB>
+                  </a:tcPr>
+                </a:tc>
+              </a:tr>
+              <a:tr h="5554794">
+                <a:tc>
+                  <a:txBody>
+                    <a:bodyPr/>
+                    <a:lstStyle/>
+                    <a:p>
+                      <a:pPr algn="ctr"/>
+                      <a:endParaRPr lang="en-US" sz="1200" b="1" dirty="0">
+                        <a:solidFill>
+                          <a:schemeClr val="tx1"/>
+                        </a:solidFill>
+                        <a:latin typeface="Times New Roman" panose="02020603050405020304" pitchFamily="18" charset="0"/>
+                        <a:cs typeface="Times New Roman" panose="02020603050405020304" pitchFamily="18" charset="0"/>
+                      </a:endParaRPr>
+                    </a:p>
+                  </a:txBody>
+                  <a:tcPr marT="91440" marB="91440" anchor="ctr">
+                    <a:lnL w="6350" cap="flat" cmpd="sng" algn="ctr">
+                      <a:solidFill>
+                        <a:schemeClr val="tx1"/>
+                      </a:solidFill>
+                      <a:prstDash val="solid"/>
+                      <a:round/>
+                      <a:headEnd type="none" w="med" len="med"/>
+                      <a:tailEnd type="none" w="med" len="med"/>
+                    </a:lnL>
+                    <a:lnR w="6350" cap="flat" cmpd="sng" algn="ctr">
+                      <a:solidFill>
+                        <a:schemeClr val="tx1"/>
+                      </a:solidFill>
+                      <a:prstDash val="solid"/>
+                      <a:round/>
+                      <a:headEnd type="none" w="med" len="med"/>
+                      <a:tailEnd type="none" w="med" len="med"/>
+                    </a:lnR>
+                    <a:lnT w="6350" cap="flat" cmpd="sng" algn="ctr">
+                      <a:solidFill>
+                        <a:schemeClr val="tx1"/>
+                      </a:solidFill>
+                      <a:prstDash val="solid"/>
+                      <a:round/>
+                      <a:headEnd type="none" w="med" len="med"/>
+                      <a:tailEnd type="none" w="med" len="med"/>
+                    </a:lnT>
+                    <a:lnB w="6350" cap="flat" cmpd="sng" algn="ctr">
+                      <a:solidFill>
+                        <a:schemeClr val="tx1"/>
+                      </a:solidFill>
+                      <a:prstDash val="solid"/>
+                      <a:round/>
+                      <a:headEnd type="none" w="med" len="med"/>
+                      <a:tailEnd type="none" w="med" len="med"/>
+                    </a:lnB>
+                  </a:tcPr>
+                </a:tc>
+                <a:tc>
+                  <a:txBody>
+                    <a:bodyPr/>
+                    <a:lstStyle/>
+                    <a:p>
+                      <a:pPr algn="ctr"/>
+                      <a:endParaRPr lang="en-US" sz="1200" b="1" dirty="0">
+                        <a:solidFill>
+                          <a:schemeClr val="tx1"/>
+                        </a:solidFill>
+                        <a:latin typeface="Times New Roman" panose="02020603050405020304" pitchFamily="18" charset="0"/>
+                        <a:cs typeface="Times New Roman" panose="02020603050405020304" pitchFamily="18" charset="0"/>
+                      </a:endParaRPr>
+                    </a:p>
+                  </a:txBody>
+                  <a:tcPr marT="91440" marB="91440" anchor="ctr">
+                    <a:lnL w="6350" cap="flat" cmpd="sng" algn="ctr">
+                      <a:solidFill>
+                        <a:schemeClr val="tx1"/>
+                      </a:solidFill>
+                      <a:prstDash val="solid"/>
+                      <a:round/>
+                      <a:headEnd type="none" w="med" len="med"/>
+                      <a:tailEnd type="none" w="med" len="med"/>
+                    </a:lnL>
+                    <a:lnR w="6350" cap="flat" cmpd="sng" algn="ctr">
+                      <a:solidFill>
+                        <a:schemeClr val="tx1"/>
+                      </a:solidFill>
+                      <a:prstDash val="solid"/>
+                      <a:round/>
+                      <a:headEnd type="none" w="med" len="med"/>
+                      <a:tailEnd type="none" w="med" len="med"/>
+                    </a:lnR>
+                    <a:lnT w="6350" cap="flat" cmpd="sng" algn="ctr">
+                      <a:solidFill>
+                        <a:schemeClr val="tx1"/>
+                      </a:solidFill>
+                      <a:prstDash val="solid"/>
+                      <a:round/>
+                      <a:headEnd type="none" w="med" len="med"/>
+                      <a:tailEnd type="none" w="med" len="med"/>
+                    </a:lnT>
+                    <a:lnB w="6350" cap="flat" cmpd="sng" algn="ctr">
+                      <a:solidFill>
+                        <a:schemeClr val="tx1"/>
+                      </a:solidFill>
+                      <a:prstDash val="solid"/>
+                      <a:round/>
+                      <a:headEnd type="none" w="med" len="med"/>
+                      <a:tailEnd type="none" w="med" len="med"/>
+                    </a:lnB>
+                  </a:tcPr>
+                </a:tc>
+                <a:tc>
+                  <a:txBody>
+                    <a:bodyPr/>
+                    <a:lstStyle/>
+                    <a:p>
+                      <a:pPr algn="ctr"/>
+                      <a:endParaRPr lang="en-US" sz="1200" b="1" dirty="0">
+                        <a:solidFill>
+                          <a:schemeClr val="tx1"/>
+                        </a:solidFill>
+                        <a:latin typeface="Times New Roman" panose="02020603050405020304" pitchFamily="18" charset="0"/>
+                        <a:cs typeface="Times New Roman" panose="02020603050405020304" pitchFamily="18" charset="0"/>
+                      </a:endParaRPr>
+                    </a:p>
+                  </a:txBody>
+                  <a:tcPr marT="91440" marB="91440" anchor="ctr">
+                    <a:lnL w="6350" cap="flat" cmpd="sng" algn="ctr">
+                      <a:solidFill>
+                        <a:schemeClr val="tx1"/>
+                      </a:solidFill>
+                      <a:prstDash val="solid"/>
+                      <a:round/>
+                      <a:headEnd type="none" w="med" len="med"/>
+                      <a:tailEnd type="none" w="med" len="med"/>
+                    </a:lnL>
+                    <a:lnR w="6350" cap="flat" cmpd="sng" algn="ctr">
+                      <a:solidFill>
+                        <a:schemeClr val="tx1"/>
+                      </a:solidFill>
+                      <a:prstDash val="solid"/>
+                      <a:round/>
+                      <a:headEnd type="none" w="med" len="med"/>
+                      <a:tailEnd type="none" w="med" len="med"/>
+                    </a:lnR>
+                    <a:lnT w="6350" cap="flat" cmpd="sng" algn="ctr">
+                      <a:solidFill>
+                        <a:schemeClr val="tx1"/>
+                      </a:solidFill>
+                      <a:prstDash val="solid"/>
+                      <a:round/>
+                      <a:headEnd type="none" w="med" len="med"/>
+                      <a:tailEnd type="none" w="med" len="med"/>
+                    </a:lnT>
+                    <a:lnB w="6350" cap="flat" cmpd="sng" algn="ctr">
+                      <a:solidFill>
+                        <a:schemeClr val="tx1"/>
+                      </a:solidFill>
+                      <a:prstDash val="solid"/>
+                      <a:round/>
+                      <a:headEnd type="none" w="med" len="med"/>
+                      <a:tailEnd type="none" w="med" len="med"/>
+                    </a:lnB>
+                  </a:tcPr>
+                </a:tc>
+                <a:tc>
+                  <a:txBody>
+                    <a:bodyPr/>
+                    <a:lstStyle/>
+                    <a:p>
+                      <a:pPr algn="ctr"/>
+                      <a:endParaRPr lang="en-US" sz="1200" b="1" dirty="0">
+                        <a:solidFill>
+                          <a:schemeClr val="tx1"/>
+                        </a:solidFill>
+                        <a:latin typeface="Times New Roman" panose="02020603050405020304" pitchFamily="18" charset="0"/>
+                        <a:cs typeface="Times New Roman" panose="02020603050405020304" pitchFamily="18" charset="0"/>
+                      </a:endParaRPr>
+                    </a:p>
+                  </a:txBody>
+                  <a:tcPr marT="91440" marB="91440" anchor="ctr">
+                    <a:lnL w="6350" cap="flat" cmpd="sng" algn="ctr">
+                      <a:solidFill>
+                        <a:schemeClr val="tx1"/>
+                      </a:solidFill>
+                      <a:prstDash val="solid"/>
+                      <a:round/>
+                      <a:headEnd type="none" w="med" len="med"/>
+                      <a:tailEnd type="none" w="med" len="med"/>
+                    </a:lnL>
+                    <a:lnR w="6350" cap="flat" cmpd="sng" algn="ctr">
+                      <a:solidFill>
+                        <a:schemeClr val="tx1"/>
+                      </a:solidFill>
+                      <a:prstDash val="solid"/>
+                      <a:round/>
+                      <a:headEnd type="none" w="med" len="med"/>
+                      <a:tailEnd type="none" w="med" len="med"/>
+                    </a:lnR>
+                    <a:lnT w="6350" cap="flat" cmpd="sng" algn="ctr">
+                      <a:solidFill>
+                        <a:schemeClr val="tx1"/>
+                      </a:solidFill>
+                      <a:prstDash val="solid"/>
+                      <a:round/>
+                      <a:headEnd type="none" w="med" len="med"/>
+                      <a:tailEnd type="none" w="med" len="med"/>
+                    </a:lnT>
+                    <a:lnB w="6350" cap="flat" cmpd="sng" algn="ctr">
+                      <a:solidFill>
+                        <a:schemeClr val="tx1"/>
+                      </a:solidFill>
+                      <a:prstDash val="solid"/>
+                      <a:round/>
+                      <a:headEnd type="none" w="med" len="med"/>
+                      <a:tailEnd type="none" w="med" len="med"/>
+                    </a:lnB>
+                  </a:tcPr>
+                </a:tc>
+                <a:tc>
+                  <a:txBody>
+                    <a:bodyPr/>
+                    <a:lstStyle/>
+                    <a:p>
+                      <a:pPr algn="ctr"/>
+                      <a:endParaRPr lang="en-US" sz="1200" b="1" dirty="0">
+                        <a:solidFill>
+                          <a:schemeClr val="tx1"/>
+                        </a:solidFill>
+                        <a:latin typeface="Times New Roman" panose="02020603050405020304" pitchFamily="18" charset="0"/>
+                        <a:cs typeface="Times New Roman" panose="02020603050405020304" pitchFamily="18" charset="0"/>
+                      </a:endParaRPr>
+                    </a:p>
+                  </a:txBody>
+                  <a:tcPr marT="91440" marB="91440" anchor="ctr">
+                    <a:lnL w="6350" cap="flat" cmpd="sng" algn="ctr">
+                      <a:solidFill>
+                        <a:schemeClr val="tx1"/>
+                      </a:solidFill>
+                      <a:prstDash val="solid"/>
+                      <a:round/>
+                      <a:headEnd type="none" w="med" len="med"/>
+                      <a:tailEnd type="none" w="med" len="med"/>
+                    </a:lnL>
+                    <a:lnR w="6350" cap="flat" cmpd="sng" algn="ctr">
+                      <a:solidFill>
+                        <a:schemeClr val="tx1"/>
+                      </a:solidFill>
+                      <a:prstDash val="solid"/>
+                      <a:round/>
+                      <a:headEnd type="none" w="med" len="med"/>
+                      <a:tailEnd type="none" w="med" len="med"/>
+                    </a:lnR>
+                    <a:lnT w="6350" cap="flat" cmpd="sng" algn="ctr">
+                      <a:solidFill>
+                        <a:schemeClr val="tx1"/>
+                      </a:solidFill>
+                      <a:prstDash val="solid"/>
+                      <a:round/>
+                      <a:headEnd type="none" w="med" len="med"/>
+                      <a:tailEnd type="none" w="med" len="med"/>
+                    </a:lnT>
+                    <a:lnB w="6350" cap="flat" cmpd="sng" algn="ctr">
+                      <a:solidFill>
+                        <a:schemeClr val="tx1"/>
+                      </a:solidFill>
+                      <a:prstDash val="solid"/>
+                      <a:round/>
+                      <a:headEnd type="none" w="med" len="med"/>
+                      <a:tailEnd type="none" w="med" len="med"/>
+                    </a:lnB>
+                  </a:tcPr>
+                </a:tc>
+              </a:tr>
+            </a:tbl>
+          </a:graphicData>
+        </a:graphic>
+      </p:graphicFrame>
+    </p:spTree>
+    <p:extLst>
+      <p:ext uri="{BB962C8B-B14F-4D97-AF65-F5344CB8AC3E}">
+        <p14:creationId xmlns:p14="http://schemas.microsoft.com/office/powerpoint/2010/main" val="918266435"/>
       </p:ext>
     </p:extLst>
   </p:cSld>

</xml_diff>

<commit_message>
Employed GVF into the sub-region segmentation route;
git-svn-id: https://svn.janelia.org/penglab/projects/vaa3d_tools@1703 f26c06c5-4756-4547-a2b9-0b39063de1b8
</commit_message>
<xml_diff>
--- a/hackathon/xiang/cellSegmentation/scheme.pptx
+++ b/hackathon/xiang/cellSegmentation/scheme.pptx
@@ -5,12 +5,13 @@
     <p:sldMasterId id="2147483648" r:id="rId1"/>
   </p:sldMasterIdLst>
   <p:notesMasterIdLst>
-    <p:notesMasterId r:id="rId5"/>
+    <p:notesMasterId r:id="rId6"/>
   </p:notesMasterIdLst>
   <p:sldIdLst>
     <p:sldId id="270" r:id="rId2"/>
     <p:sldId id="271" r:id="rId3"/>
     <p:sldId id="272" r:id="rId4"/>
+    <p:sldId id="273" r:id="rId5"/>
   </p:sldIdLst>
   <p:sldSz cx="8229600" cy="7315200"/>
   <p:notesSz cx="6858000" cy="9144000"/>
@@ -8482,7 +8483,7 @@
           <p:nvPr>
             <p:extLst>
               <p:ext uri="{D42A27DB-BD31-4B8C-83A1-F6EECF244321}">
-                <p14:modId xmlns:p14="http://schemas.microsoft.com/office/powerpoint/2010/main" val="1592907276"/>
+                <p14:modId xmlns:p14="http://schemas.microsoft.com/office/powerpoint/2010/main" val="3797126408"/>
               </p:ext>
             </p:extLst>
           </p:nvPr>
@@ -8835,6 +8836,26 @@
                     <a:lstStyle/>
                     <a:p>
                       <a:pPr algn="ctr"/>
+                      <a:r>
+                        <a:rPr lang="en-US" sz="1200" b="1" dirty="0" err="1" smtClean="0">
+                          <a:solidFill>
+                            <a:schemeClr val="tx1"/>
+                          </a:solidFill>
+                          <a:latin typeface="Times New Roman" panose="02020603050405020304" pitchFamily="18" charset="0"/>
+                          <a:cs typeface="Times New Roman" panose="02020603050405020304" pitchFamily="18" charset="0"/>
+                        </a:rPr>
+                        <a:t>regionGrow</a:t>
+                      </a:r>
+                      <a:r>
+                        <a:rPr lang="en-US" sz="1200" b="1" dirty="0" smtClean="0">
+                          <a:solidFill>
+                            <a:schemeClr val="tx1"/>
+                          </a:solidFill>
+                          <a:latin typeface="Times New Roman" panose="02020603050405020304" pitchFamily="18" charset="0"/>
+                          <a:cs typeface="Times New Roman" panose="02020603050405020304" pitchFamily="18" charset="0"/>
+                        </a:rPr>
+                        <a:t> (old)</a:t>
+                      </a:r>
                       <a:endParaRPr lang="en-US" sz="1200" b="1" dirty="0">
                         <a:solidFill>
                           <a:schemeClr val="tx1"/>
@@ -8897,9 +8918,9 @@
                           <a:latin typeface="Times New Roman" panose="02020603050405020304" pitchFamily="18" charset="0"/>
                           <a:cs typeface="Times New Roman" panose="02020603050405020304" pitchFamily="18" charset="0"/>
                         </a:rPr>
-                        <a:t>39</a:t>
+                        <a:t>131</a:t>
                       </a:r>
-                      <a:endParaRPr lang="en-US" sz="1200" b="1" dirty="0">
+                      <a:endParaRPr lang="en-US" sz="1200" b="1" dirty="0" smtClean="0">
                         <a:solidFill>
                           <a:schemeClr val="tx1"/>
                         </a:solidFill>
@@ -10929,6 +10950,1280 @@
     <p:extLst>
       <p:ext uri="{BB962C8B-B14F-4D97-AF65-F5344CB8AC3E}">
         <p14:creationId xmlns:p14="http://schemas.microsoft.com/office/powerpoint/2010/main" val="918266435"/>
+      </p:ext>
+    </p:extLst>
+  </p:cSld>
+  <p:clrMapOvr>
+    <a:masterClrMapping/>
+  </p:clrMapOvr>
+  <p:timing>
+    <p:tnLst>
+      <p:par>
+        <p:cTn id="1" dur="indefinite" restart="never" nodeType="tmRoot"/>
+      </p:par>
+    </p:tnLst>
+  </p:timing>
+</p:sld>
+</file>
+
+<file path=ppt/slides/slide4.xml><?xml version="1.0" encoding="utf-8"?>
+<p:sld xmlns:a="http://schemas.openxmlformats.org/drawingml/2006/main" xmlns:r="http://schemas.openxmlformats.org/officeDocument/2006/relationships" xmlns:p="http://schemas.openxmlformats.org/presentationml/2006/main">
+  <p:cSld>
+    <p:spTree>
+      <p:nvGrpSpPr>
+        <p:cNvPr id="1" name=""/>
+        <p:cNvGrpSpPr/>
+        <p:nvPr/>
+      </p:nvGrpSpPr>
+      <p:grpSpPr>
+        <a:xfrm>
+          <a:off x="0" y="0"/>
+          <a:ext cx="0" cy="0"/>
+          <a:chOff x="0" y="0"/>
+          <a:chExt cx="0" cy="0"/>
+        </a:xfrm>
+      </p:grpSpPr>
+      <p:sp>
+        <p:nvSpPr>
+          <p:cNvPr id="71" name="Rectangle 70"/>
+          <p:cNvSpPr/>
+          <p:nvPr/>
+        </p:nvSpPr>
+        <p:spPr>
+          <a:xfrm>
+            <a:off x="152400" y="1234440"/>
+            <a:ext cx="3657600" cy="1463040"/>
+          </a:xfrm>
+          <a:prstGeom prst="rect">
+            <a:avLst/>
+          </a:prstGeom>
+          <a:solidFill>
+            <a:schemeClr val="accent1">
+              <a:lumMod val="75000"/>
+            </a:schemeClr>
+          </a:solidFill>
+          <a:ln w="12700">
+            <a:solidFill>
+              <a:schemeClr val="tx1"/>
+            </a:solidFill>
+          </a:ln>
+        </p:spPr>
+        <p:style>
+          <a:lnRef idx="2">
+            <a:schemeClr val="accent1">
+              <a:shade val="50000"/>
+            </a:schemeClr>
+          </a:lnRef>
+          <a:fillRef idx="1">
+            <a:schemeClr val="accent1"/>
+          </a:fillRef>
+          <a:effectRef idx="0">
+            <a:schemeClr val="accent1"/>
+          </a:effectRef>
+          <a:fontRef idx="minor">
+            <a:schemeClr val="lt1"/>
+          </a:fontRef>
+        </p:style>
+        <p:txBody>
+          <a:bodyPr lIns="91440" tIns="91440" rIns="91440" bIns="91440" rtlCol="0" anchor="ctr"/>
+          <a:lstStyle/>
+          <a:p>
+            <a:pPr marL="285750" indent="-285750" algn="just">
+              <a:buFont typeface="Arial" panose="020B0604020202020204" pitchFamily="34" charset="0"/>
+              <a:buChar char="•"/>
+            </a:pPr>
+            <a:r>
+              <a:rPr lang="en-US" sz="1400" b="1" dirty="0" smtClean="0">
+                <a:solidFill>
+                  <a:schemeClr val="bg1"/>
+                </a:solidFill>
+                <a:latin typeface="Times New Roman" panose="02020603050405020304" pitchFamily="18" charset="0"/>
+                <a:cs typeface="Times New Roman" panose="02020603050405020304" pitchFamily="18" charset="0"/>
+              </a:rPr>
+              <a:t>Region growing value change threshold;</a:t>
+            </a:r>
+          </a:p>
+          <a:p>
+            <a:pPr marL="285750" indent="-285750" algn="just">
+              <a:buFont typeface="Arial" panose="020B0604020202020204" pitchFamily="34" charset="0"/>
+              <a:buChar char="•"/>
+            </a:pPr>
+            <a:r>
+              <a:rPr lang="en-US" sz="1400" b="1" dirty="0" smtClean="0">
+                <a:solidFill>
+                  <a:schemeClr val="bg1"/>
+                </a:solidFill>
+                <a:latin typeface="Times New Roman" panose="02020603050405020304" pitchFamily="18" charset="0"/>
+                <a:cs typeface="Times New Roman" panose="02020603050405020304" pitchFamily="18" charset="0"/>
+              </a:rPr>
+              <a:t>Surface curvature (max and min);</a:t>
+            </a:r>
+          </a:p>
+          <a:p>
+            <a:pPr marL="285750" indent="-285750" algn="just">
+              <a:buFont typeface="Arial" panose="020B0604020202020204" pitchFamily="34" charset="0"/>
+              <a:buChar char="•"/>
+            </a:pPr>
+            <a:r>
+              <a:rPr lang="en-US" sz="1400" b="1" dirty="0" err="1" smtClean="0">
+                <a:solidFill>
+                  <a:schemeClr val="bg1"/>
+                </a:solidFill>
+                <a:latin typeface="Times New Roman" panose="02020603050405020304" pitchFamily="18" charset="0"/>
+                <a:cs typeface="Times New Roman" panose="02020603050405020304" pitchFamily="18" charset="0"/>
+              </a:rPr>
+              <a:t>Laplacian</a:t>
+            </a:r>
+            <a:r>
+              <a:rPr lang="en-US" sz="1400" b="1" dirty="0" smtClean="0">
+                <a:solidFill>
+                  <a:schemeClr val="bg1"/>
+                </a:solidFill>
+                <a:latin typeface="Times New Roman" panose="02020603050405020304" pitchFamily="18" charset="0"/>
+                <a:cs typeface="Times New Roman" panose="02020603050405020304" pitchFamily="18" charset="0"/>
+              </a:rPr>
+              <a:t> of Gaussian;</a:t>
+            </a:r>
+          </a:p>
+          <a:p>
+            <a:pPr marL="285750" indent="-285750" algn="just">
+              <a:buFont typeface="Arial" panose="020B0604020202020204" pitchFamily="34" charset="0"/>
+              <a:buChar char="•"/>
+            </a:pPr>
+            <a:r>
+              <a:rPr lang="en-US" sz="1400" b="1" dirty="0" smtClean="0">
+                <a:solidFill>
+                  <a:schemeClr val="bg1"/>
+                </a:solidFill>
+                <a:latin typeface="Times New Roman" panose="02020603050405020304" pitchFamily="18" charset="0"/>
+                <a:cs typeface="Times New Roman" panose="02020603050405020304" pitchFamily="18" charset="0"/>
+              </a:rPr>
+              <a:t>Min volume;</a:t>
+            </a:r>
+          </a:p>
+          <a:p>
+            <a:pPr marL="285750" indent="-285750" algn="just">
+              <a:buFont typeface="Arial" panose="020B0604020202020204" pitchFamily="34" charset="0"/>
+              <a:buChar char="•"/>
+            </a:pPr>
+            <a:endParaRPr lang="en-US" sz="1400" b="1" dirty="0">
+              <a:solidFill>
+                <a:schemeClr val="bg1"/>
+              </a:solidFill>
+              <a:latin typeface="Times New Roman" panose="02020603050405020304" pitchFamily="18" charset="0"/>
+              <a:cs typeface="Times New Roman" panose="02020603050405020304" pitchFamily="18" charset="0"/>
+            </a:endParaRPr>
+          </a:p>
+        </p:txBody>
+      </p:sp>
+      <p:sp>
+        <p:nvSpPr>
+          <p:cNvPr id="79" name="Rectangle 78"/>
+          <p:cNvSpPr/>
+          <p:nvPr/>
+        </p:nvSpPr>
+        <p:spPr>
+          <a:xfrm>
+            <a:off x="152400" y="381000"/>
+            <a:ext cx="3657600" cy="548640"/>
+          </a:xfrm>
+          <a:prstGeom prst="rect">
+            <a:avLst/>
+          </a:prstGeom>
+          <a:solidFill>
+            <a:schemeClr val="accent1">
+              <a:lumMod val="75000"/>
+            </a:schemeClr>
+          </a:solidFill>
+          <a:ln w="12700">
+            <a:solidFill>
+              <a:schemeClr val="tx1"/>
+            </a:solidFill>
+          </a:ln>
+        </p:spPr>
+        <p:style>
+          <a:lnRef idx="2">
+            <a:schemeClr val="accent1">
+              <a:shade val="50000"/>
+            </a:schemeClr>
+          </a:lnRef>
+          <a:fillRef idx="1">
+            <a:schemeClr val="accent1"/>
+          </a:fillRef>
+          <a:effectRef idx="0">
+            <a:schemeClr val="accent1"/>
+          </a:effectRef>
+          <a:fontRef idx="minor">
+            <a:schemeClr val="lt1"/>
+          </a:fontRef>
+        </p:style>
+        <p:txBody>
+          <a:bodyPr lIns="91440" tIns="91440" rIns="91440" bIns="91440" rtlCol="0" anchor="ctr"/>
+          <a:lstStyle/>
+          <a:p>
+            <a:pPr algn="ctr"/>
+            <a:r>
+              <a:rPr lang="en-US" sz="1400" b="1" dirty="0" smtClean="0">
+                <a:solidFill>
+                  <a:schemeClr val="bg1"/>
+                </a:solidFill>
+                <a:latin typeface="Times New Roman" panose="02020603050405020304" pitchFamily="18" charset="0"/>
+                <a:cs typeface="Times New Roman" panose="02020603050405020304" pitchFamily="18" charset="0"/>
+              </a:rPr>
+              <a:t>Current regions (from exemplar or grown regions);</a:t>
+            </a:r>
+            <a:endParaRPr lang="en-US" sz="1400" b="1" dirty="0">
+              <a:solidFill>
+                <a:schemeClr val="bg1"/>
+              </a:solidFill>
+              <a:latin typeface="Times New Roman" panose="02020603050405020304" pitchFamily="18" charset="0"/>
+              <a:cs typeface="Times New Roman" panose="02020603050405020304" pitchFamily="18" charset="0"/>
+            </a:endParaRPr>
+          </a:p>
+        </p:txBody>
+      </p:sp>
+      <p:sp>
+        <p:nvSpPr>
+          <p:cNvPr id="82" name="Rectangle 81"/>
+          <p:cNvSpPr/>
+          <p:nvPr/>
+        </p:nvSpPr>
+        <p:spPr>
+          <a:xfrm>
+            <a:off x="4267200" y="360680"/>
+            <a:ext cx="3383280" cy="548640"/>
+          </a:xfrm>
+          <a:prstGeom prst="rect">
+            <a:avLst/>
+          </a:prstGeom>
+          <a:solidFill>
+            <a:schemeClr val="accent1">
+              <a:lumMod val="75000"/>
+            </a:schemeClr>
+          </a:solidFill>
+          <a:ln w="12700">
+            <a:solidFill>
+              <a:schemeClr val="tx1"/>
+            </a:solidFill>
+          </a:ln>
+        </p:spPr>
+        <p:style>
+          <a:lnRef idx="2">
+            <a:schemeClr val="accent1">
+              <a:shade val="50000"/>
+            </a:schemeClr>
+          </a:lnRef>
+          <a:fillRef idx="1">
+            <a:schemeClr val="accent1"/>
+          </a:fillRef>
+          <a:effectRef idx="0">
+            <a:schemeClr val="accent1"/>
+          </a:effectRef>
+          <a:fontRef idx="minor">
+            <a:schemeClr val="lt1"/>
+          </a:fontRef>
+        </p:style>
+        <p:txBody>
+          <a:bodyPr lIns="91440" tIns="91440" rIns="91440" bIns="91440" rtlCol="0" anchor="ctr"/>
+          <a:lstStyle/>
+          <a:p>
+            <a:pPr algn="ctr"/>
+            <a:r>
+              <a:rPr lang="en-US" sz="1400" b="1" dirty="0" smtClean="0">
+                <a:solidFill>
+                  <a:schemeClr val="bg1"/>
+                </a:solidFill>
+                <a:latin typeface="Times New Roman" panose="02020603050405020304" pitchFamily="18" charset="0"/>
+                <a:cs typeface="Times New Roman" panose="02020603050405020304" pitchFamily="18" charset="0"/>
+              </a:rPr>
+              <a:t>Region growing;</a:t>
+            </a:r>
+            <a:endParaRPr lang="en-US" sz="1400" b="1" dirty="0">
+              <a:solidFill>
+                <a:schemeClr val="bg1"/>
+              </a:solidFill>
+              <a:latin typeface="Times New Roman" panose="02020603050405020304" pitchFamily="18" charset="0"/>
+              <a:cs typeface="Times New Roman" panose="02020603050405020304" pitchFamily="18" charset="0"/>
+            </a:endParaRPr>
+          </a:p>
+        </p:txBody>
+      </p:sp>
+      <p:cxnSp>
+        <p:nvCxnSpPr>
+          <p:cNvPr id="91" name="Straight Arrow Connector 90"/>
+          <p:cNvCxnSpPr>
+            <a:stCxn id="79" idx="2"/>
+            <a:endCxn id="71" idx="0"/>
+          </p:cNvCxnSpPr>
+          <p:nvPr/>
+        </p:nvCxnSpPr>
+        <p:spPr>
+          <a:xfrm>
+            <a:off x="1981200" y="929640"/>
+            <a:ext cx="0" cy="304800"/>
+          </a:xfrm>
+          <a:prstGeom prst="straightConnector1">
+            <a:avLst/>
+          </a:prstGeom>
+          <a:ln w="28575">
+            <a:solidFill>
+              <a:schemeClr val="tx1"/>
+            </a:solidFill>
+            <a:tailEnd type="triangle"/>
+          </a:ln>
+        </p:spPr>
+        <p:style>
+          <a:lnRef idx="1">
+            <a:schemeClr val="accent1"/>
+          </a:lnRef>
+          <a:fillRef idx="0">
+            <a:schemeClr val="accent1"/>
+          </a:fillRef>
+          <a:effectRef idx="0">
+            <a:schemeClr val="accent1"/>
+          </a:effectRef>
+          <a:fontRef idx="minor">
+            <a:schemeClr val="tx1"/>
+          </a:fontRef>
+        </p:style>
+      </p:cxnSp>
+      <p:cxnSp>
+        <p:nvCxnSpPr>
+          <p:cNvPr id="93" name="Straight Arrow Connector 92"/>
+          <p:cNvCxnSpPr>
+            <a:stCxn id="37" idx="2"/>
+            <a:endCxn id="14" idx="0"/>
+          </p:cNvCxnSpPr>
+          <p:nvPr/>
+        </p:nvCxnSpPr>
+        <p:spPr>
+          <a:xfrm>
+            <a:off x="5958840" y="1899920"/>
+            <a:ext cx="0" cy="508000"/>
+          </a:xfrm>
+          <a:prstGeom prst="straightConnector1">
+            <a:avLst/>
+          </a:prstGeom>
+          <a:ln w="28575">
+            <a:solidFill>
+              <a:schemeClr val="tx1"/>
+            </a:solidFill>
+            <a:tailEnd type="triangle"/>
+          </a:ln>
+        </p:spPr>
+        <p:style>
+          <a:lnRef idx="1">
+            <a:schemeClr val="accent1"/>
+          </a:lnRef>
+          <a:fillRef idx="0">
+            <a:schemeClr val="accent1"/>
+          </a:fillRef>
+          <a:effectRef idx="0">
+            <a:schemeClr val="accent1"/>
+          </a:effectRef>
+          <a:fontRef idx="minor">
+            <a:schemeClr val="tx1"/>
+          </a:fontRef>
+        </p:style>
+      </p:cxnSp>
+      <p:sp>
+        <p:nvSpPr>
+          <p:cNvPr id="14" name="Rectangle 13"/>
+          <p:cNvSpPr/>
+          <p:nvPr/>
+        </p:nvSpPr>
+        <p:spPr>
+          <a:xfrm>
+            <a:off x="4267200" y="2407920"/>
+            <a:ext cx="3383280" cy="548640"/>
+          </a:xfrm>
+          <a:prstGeom prst="rect">
+            <a:avLst/>
+          </a:prstGeom>
+          <a:solidFill>
+            <a:schemeClr val="accent1">
+              <a:lumMod val="75000"/>
+            </a:schemeClr>
+          </a:solidFill>
+          <a:ln w="12700">
+            <a:solidFill>
+              <a:schemeClr val="tx1"/>
+            </a:solidFill>
+          </a:ln>
+        </p:spPr>
+        <p:style>
+          <a:lnRef idx="2">
+            <a:schemeClr val="accent1">
+              <a:shade val="50000"/>
+            </a:schemeClr>
+          </a:lnRef>
+          <a:fillRef idx="1">
+            <a:schemeClr val="accent1"/>
+          </a:fillRef>
+          <a:effectRef idx="0">
+            <a:schemeClr val="accent1"/>
+          </a:effectRef>
+          <a:fontRef idx="minor">
+            <a:schemeClr val="lt1"/>
+          </a:fontRef>
+        </p:style>
+        <p:txBody>
+          <a:bodyPr lIns="91440" tIns="91440" rIns="91440" bIns="91440" rtlCol="0" anchor="ctr"/>
+          <a:lstStyle/>
+          <a:p>
+            <a:pPr marL="285750" indent="-285750" algn="just">
+              <a:buFont typeface="Arial" panose="020B0604020202020204" pitchFamily="34" charset="0"/>
+              <a:buChar char="•"/>
+            </a:pPr>
+            <a:r>
+              <a:rPr lang="en-US" sz="1400" b="1" dirty="0" smtClean="0">
+                <a:solidFill>
+                  <a:schemeClr val="bg1"/>
+                </a:solidFill>
+                <a:latin typeface="Times New Roman" panose="02020603050405020304" pitchFamily="18" charset="0"/>
+                <a:cs typeface="Times New Roman" panose="02020603050405020304" pitchFamily="18" charset="0"/>
+              </a:rPr>
+              <a:t>Check if the blob condition is satisfied;</a:t>
+            </a:r>
+            <a:endParaRPr lang="en-US" sz="1400" b="1" dirty="0">
+              <a:solidFill>
+                <a:schemeClr val="bg1"/>
+              </a:solidFill>
+              <a:latin typeface="Times New Roman" panose="02020603050405020304" pitchFamily="18" charset="0"/>
+              <a:cs typeface="Times New Roman" panose="02020603050405020304" pitchFamily="18" charset="0"/>
+            </a:endParaRPr>
+          </a:p>
+        </p:txBody>
+      </p:sp>
+      <p:sp>
+        <p:nvSpPr>
+          <p:cNvPr id="21" name="Rectangle 20"/>
+          <p:cNvSpPr/>
+          <p:nvPr/>
+        </p:nvSpPr>
+        <p:spPr>
+          <a:xfrm>
+            <a:off x="4191000" y="3561080"/>
+            <a:ext cx="914400" cy="548640"/>
+          </a:xfrm>
+          <a:prstGeom prst="rect">
+            <a:avLst/>
+          </a:prstGeom>
+          <a:solidFill>
+            <a:schemeClr val="accent1">
+              <a:lumMod val="75000"/>
+            </a:schemeClr>
+          </a:solidFill>
+          <a:ln w="12700">
+            <a:solidFill>
+              <a:schemeClr val="tx1"/>
+            </a:solidFill>
+          </a:ln>
+        </p:spPr>
+        <p:style>
+          <a:lnRef idx="2">
+            <a:schemeClr val="accent1">
+              <a:shade val="50000"/>
+            </a:schemeClr>
+          </a:lnRef>
+          <a:fillRef idx="1">
+            <a:schemeClr val="accent1"/>
+          </a:fillRef>
+          <a:effectRef idx="0">
+            <a:schemeClr val="accent1"/>
+          </a:effectRef>
+          <a:fontRef idx="minor">
+            <a:schemeClr val="lt1"/>
+          </a:fontRef>
+        </p:style>
+        <p:txBody>
+          <a:bodyPr lIns="91440" tIns="91440" rIns="91440" bIns="91440" rtlCol="0" anchor="ctr"/>
+          <a:lstStyle/>
+          <a:p>
+            <a:pPr algn="ctr"/>
+            <a:r>
+              <a:rPr lang="en-US" sz="1400" b="1" dirty="0" smtClean="0">
+                <a:solidFill>
+                  <a:schemeClr val="bg1"/>
+                </a:solidFill>
+                <a:latin typeface="Times New Roman" panose="02020603050405020304" pitchFamily="18" charset="0"/>
+                <a:cs typeface="Times New Roman" panose="02020603050405020304" pitchFamily="18" charset="0"/>
+              </a:rPr>
+              <a:t>Add into results;</a:t>
+            </a:r>
+            <a:endParaRPr lang="en-US" sz="1400" b="1" dirty="0">
+              <a:solidFill>
+                <a:schemeClr val="bg1"/>
+              </a:solidFill>
+              <a:latin typeface="Times New Roman" panose="02020603050405020304" pitchFamily="18" charset="0"/>
+              <a:cs typeface="Times New Roman" panose="02020603050405020304" pitchFamily="18" charset="0"/>
+            </a:endParaRPr>
+          </a:p>
+        </p:txBody>
+      </p:sp>
+      <p:cxnSp>
+        <p:nvCxnSpPr>
+          <p:cNvPr id="22" name="Straight Arrow Connector 21"/>
+          <p:cNvCxnSpPr>
+            <a:endCxn id="21" idx="0"/>
+          </p:cNvCxnSpPr>
+          <p:nvPr/>
+        </p:nvCxnSpPr>
+        <p:spPr>
+          <a:xfrm>
+            <a:off x="4648200" y="2971800"/>
+            <a:ext cx="0" cy="589280"/>
+          </a:xfrm>
+          <a:prstGeom prst="straightConnector1">
+            <a:avLst/>
+          </a:prstGeom>
+          <a:ln w="28575">
+            <a:solidFill>
+              <a:schemeClr val="tx1"/>
+            </a:solidFill>
+            <a:tailEnd type="triangle"/>
+          </a:ln>
+        </p:spPr>
+        <p:style>
+          <a:lnRef idx="1">
+            <a:schemeClr val="accent1"/>
+          </a:lnRef>
+          <a:fillRef idx="0">
+            <a:schemeClr val="accent1"/>
+          </a:fillRef>
+          <a:effectRef idx="0">
+            <a:schemeClr val="accent1"/>
+          </a:effectRef>
+          <a:fontRef idx="minor">
+            <a:schemeClr val="tx1"/>
+          </a:fontRef>
+        </p:style>
+      </p:cxnSp>
+      <p:sp>
+        <p:nvSpPr>
+          <p:cNvPr id="26" name="Flowchart: Alternate Process 25"/>
+          <p:cNvSpPr/>
+          <p:nvPr/>
+        </p:nvSpPr>
+        <p:spPr>
+          <a:xfrm>
+            <a:off x="4419600" y="3103880"/>
+            <a:ext cx="518160" cy="254000"/>
+          </a:xfrm>
+          <a:prstGeom prst="flowChartAlternateProcess">
+            <a:avLst/>
+          </a:prstGeom>
+          <a:solidFill>
+            <a:schemeClr val="bg1"/>
+          </a:solidFill>
+          <a:ln w="12700">
+            <a:noFill/>
+            <a:prstDash val="sysDash"/>
+          </a:ln>
+        </p:spPr>
+        <p:style>
+          <a:lnRef idx="2">
+            <a:schemeClr val="accent1">
+              <a:shade val="50000"/>
+            </a:schemeClr>
+          </a:lnRef>
+          <a:fillRef idx="1">
+            <a:schemeClr val="accent1"/>
+          </a:fillRef>
+          <a:effectRef idx="0">
+            <a:schemeClr val="accent1"/>
+          </a:effectRef>
+          <a:fontRef idx="minor">
+            <a:schemeClr val="lt1"/>
+          </a:fontRef>
+        </p:style>
+        <p:txBody>
+          <a:bodyPr lIns="91440" tIns="91440" rIns="91440" bIns="91440" rtlCol="0" anchor="ctr"/>
+          <a:lstStyle/>
+          <a:p>
+            <a:pPr algn="just"/>
+            <a:r>
+              <a:rPr lang="en-US" sz="1000" dirty="0" smtClean="0">
+                <a:solidFill>
+                  <a:schemeClr val="tx1"/>
+                </a:solidFill>
+                <a:latin typeface="Times New Roman" panose="02020603050405020304" pitchFamily="18" charset="0"/>
+                <a:cs typeface="Times New Roman" panose="02020603050405020304" pitchFamily="18" charset="0"/>
+              </a:rPr>
+              <a:t>YES</a:t>
+            </a:r>
+          </a:p>
+        </p:txBody>
+      </p:sp>
+      <p:cxnSp>
+        <p:nvCxnSpPr>
+          <p:cNvPr id="34" name="Straight Arrow Connector 33"/>
+          <p:cNvCxnSpPr/>
+          <p:nvPr/>
+        </p:nvCxnSpPr>
+        <p:spPr>
+          <a:xfrm>
+            <a:off x="6629400" y="2971800"/>
+            <a:ext cx="0" cy="589280"/>
+          </a:xfrm>
+          <a:prstGeom prst="straightConnector1">
+            <a:avLst/>
+          </a:prstGeom>
+          <a:ln w="28575">
+            <a:solidFill>
+              <a:schemeClr val="tx1"/>
+            </a:solidFill>
+            <a:tailEnd type="triangle"/>
+          </a:ln>
+        </p:spPr>
+        <p:style>
+          <a:lnRef idx="1">
+            <a:schemeClr val="accent1"/>
+          </a:lnRef>
+          <a:fillRef idx="0">
+            <a:schemeClr val="accent1"/>
+          </a:fillRef>
+          <a:effectRef idx="0">
+            <a:schemeClr val="accent1"/>
+          </a:effectRef>
+          <a:fontRef idx="minor">
+            <a:schemeClr val="tx1"/>
+          </a:fontRef>
+        </p:style>
+      </p:cxnSp>
+      <p:sp>
+        <p:nvSpPr>
+          <p:cNvPr id="33" name="Flowchart: Alternate Process 32"/>
+          <p:cNvSpPr/>
+          <p:nvPr/>
+        </p:nvSpPr>
+        <p:spPr>
+          <a:xfrm>
+            <a:off x="6416040" y="3098800"/>
+            <a:ext cx="518160" cy="254000"/>
+          </a:xfrm>
+          <a:prstGeom prst="flowChartAlternateProcess">
+            <a:avLst/>
+          </a:prstGeom>
+          <a:solidFill>
+            <a:schemeClr val="bg1"/>
+          </a:solidFill>
+          <a:ln w="12700">
+            <a:noFill/>
+            <a:prstDash val="sysDash"/>
+          </a:ln>
+        </p:spPr>
+        <p:style>
+          <a:lnRef idx="2">
+            <a:schemeClr val="accent1">
+              <a:shade val="50000"/>
+            </a:schemeClr>
+          </a:lnRef>
+          <a:fillRef idx="1">
+            <a:schemeClr val="accent1"/>
+          </a:fillRef>
+          <a:effectRef idx="0">
+            <a:schemeClr val="accent1"/>
+          </a:effectRef>
+          <a:fontRef idx="minor">
+            <a:schemeClr val="lt1"/>
+          </a:fontRef>
+        </p:style>
+        <p:txBody>
+          <a:bodyPr lIns="91440" tIns="91440" rIns="91440" bIns="91440" rtlCol="0" anchor="ctr"/>
+          <a:lstStyle/>
+          <a:p>
+            <a:pPr algn="just"/>
+            <a:r>
+              <a:rPr lang="en-US" sz="1000" dirty="0" smtClean="0">
+                <a:solidFill>
+                  <a:schemeClr val="tx1"/>
+                </a:solidFill>
+                <a:latin typeface="Times New Roman" panose="02020603050405020304" pitchFamily="18" charset="0"/>
+                <a:cs typeface="Times New Roman" panose="02020603050405020304" pitchFamily="18" charset="0"/>
+              </a:rPr>
+              <a:t>NO</a:t>
+            </a:r>
+          </a:p>
+        </p:txBody>
+      </p:sp>
+      <p:sp>
+        <p:nvSpPr>
+          <p:cNvPr id="35" name="Rectangle 34"/>
+          <p:cNvSpPr/>
+          <p:nvPr/>
+        </p:nvSpPr>
+        <p:spPr>
+          <a:xfrm>
+            <a:off x="5608320" y="3561080"/>
+            <a:ext cx="2042159" cy="548640"/>
+          </a:xfrm>
+          <a:prstGeom prst="rect">
+            <a:avLst/>
+          </a:prstGeom>
+          <a:solidFill>
+            <a:schemeClr val="accent1">
+              <a:lumMod val="75000"/>
+            </a:schemeClr>
+          </a:solidFill>
+          <a:ln w="12700">
+            <a:solidFill>
+              <a:schemeClr val="tx1"/>
+            </a:solidFill>
+          </a:ln>
+        </p:spPr>
+        <p:style>
+          <a:lnRef idx="2">
+            <a:schemeClr val="accent1">
+              <a:shade val="50000"/>
+            </a:schemeClr>
+          </a:lnRef>
+          <a:fillRef idx="1">
+            <a:schemeClr val="accent1"/>
+          </a:fillRef>
+          <a:effectRef idx="0">
+            <a:schemeClr val="accent1"/>
+          </a:effectRef>
+          <a:fontRef idx="minor">
+            <a:schemeClr val="lt1"/>
+          </a:fontRef>
+        </p:style>
+        <p:txBody>
+          <a:bodyPr lIns="91440" tIns="91440" rIns="91440" bIns="91440" rtlCol="0" anchor="ctr"/>
+          <a:lstStyle/>
+          <a:p>
+            <a:pPr algn="ctr"/>
+            <a:r>
+              <a:rPr lang="en-US" sz="1400" b="1" dirty="0" err="1" smtClean="0">
+                <a:solidFill>
+                  <a:schemeClr val="bg1"/>
+                </a:solidFill>
+                <a:latin typeface="Times New Roman" panose="02020603050405020304" pitchFamily="18" charset="0"/>
+                <a:cs typeface="Times New Roman" panose="02020603050405020304" pitchFamily="18" charset="0"/>
+              </a:rPr>
+              <a:t>meanShift</a:t>
+            </a:r>
+            <a:r>
+              <a:rPr lang="en-US" sz="1400" b="1" dirty="0" smtClean="0">
+                <a:solidFill>
+                  <a:schemeClr val="bg1"/>
+                </a:solidFill>
+                <a:latin typeface="Times New Roman" panose="02020603050405020304" pitchFamily="18" charset="0"/>
+                <a:cs typeface="Times New Roman" panose="02020603050405020304" pitchFamily="18" charset="0"/>
+              </a:rPr>
+              <a:t> clustering;</a:t>
+            </a:r>
+            <a:endParaRPr lang="en-US" sz="1400" b="1" dirty="0">
+              <a:solidFill>
+                <a:schemeClr val="bg1"/>
+              </a:solidFill>
+              <a:latin typeface="Times New Roman" panose="02020603050405020304" pitchFamily="18" charset="0"/>
+              <a:cs typeface="Times New Roman" panose="02020603050405020304" pitchFamily="18" charset="0"/>
+            </a:endParaRPr>
+          </a:p>
+        </p:txBody>
+      </p:sp>
+      <p:sp>
+        <p:nvSpPr>
+          <p:cNvPr id="37" name="Rectangle 36"/>
+          <p:cNvSpPr/>
+          <p:nvPr/>
+        </p:nvSpPr>
+        <p:spPr>
+          <a:xfrm>
+            <a:off x="4267200" y="1351280"/>
+            <a:ext cx="3383280" cy="548640"/>
+          </a:xfrm>
+          <a:prstGeom prst="rect">
+            <a:avLst/>
+          </a:prstGeom>
+          <a:solidFill>
+            <a:schemeClr val="accent1">
+              <a:lumMod val="75000"/>
+            </a:schemeClr>
+          </a:solidFill>
+          <a:ln w="12700">
+            <a:solidFill>
+              <a:schemeClr val="tx1"/>
+            </a:solidFill>
+          </a:ln>
+        </p:spPr>
+        <p:style>
+          <a:lnRef idx="2">
+            <a:schemeClr val="accent1">
+              <a:shade val="50000"/>
+            </a:schemeClr>
+          </a:lnRef>
+          <a:fillRef idx="1">
+            <a:schemeClr val="accent1"/>
+          </a:fillRef>
+          <a:effectRef idx="0">
+            <a:schemeClr val="accent1"/>
+          </a:effectRef>
+          <a:fontRef idx="minor">
+            <a:schemeClr val="lt1"/>
+          </a:fontRef>
+        </p:style>
+        <p:txBody>
+          <a:bodyPr lIns="91440" tIns="91440" rIns="91440" bIns="91440" rtlCol="0" anchor="ctr"/>
+          <a:lstStyle/>
+          <a:p>
+            <a:pPr algn="ctr"/>
+            <a:r>
+              <a:rPr lang="en-US" sz="1400" b="1" dirty="0" smtClean="0">
+                <a:solidFill>
+                  <a:schemeClr val="bg1"/>
+                </a:solidFill>
+                <a:latin typeface="Times New Roman" panose="02020603050405020304" pitchFamily="18" charset="0"/>
+                <a:cs typeface="Times New Roman" panose="02020603050405020304" pitchFamily="18" charset="0"/>
+              </a:rPr>
+              <a:t>Check if the region volume is large enough;</a:t>
+            </a:r>
+            <a:endParaRPr lang="en-US" sz="1400" b="1" dirty="0">
+              <a:solidFill>
+                <a:schemeClr val="bg1"/>
+              </a:solidFill>
+              <a:latin typeface="Times New Roman" panose="02020603050405020304" pitchFamily="18" charset="0"/>
+              <a:cs typeface="Times New Roman" panose="02020603050405020304" pitchFamily="18" charset="0"/>
+            </a:endParaRPr>
+          </a:p>
+        </p:txBody>
+      </p:sp>
+      <p:sp>
+        <p:nvSpPr>
+          <p:cNvPr id="38" name="Flowchart: Alternate Process 37"/>
+          <p:cNvSpPr/>
+          <p:nvPr/>
+        </p:nvSpPr>
+        <p:spPr>
+          <a:xfrm>
+            <a:off x="5699760" y="1988820"/>
+            <a:ext cx="518160" cy="254000"/>
+          </a:xfrm>
+          <a:prstGeom prst="flowChartAlternateProcess">
+            <a:avLst/>
+          </a:prstGeom>
+          <a:solidFill>
+            <a:schemeClr val="bg1"/>
+          </a:solidFill>
+          <a:ln w="12700">
+            <a:noFill/>
+            <a:prstDash val="sysDash"/>
+          </a:ln>
+        </p:spPr>
+        <p:style>
+          <a:lnRef idx="2">
+            <a:schemeClr val="accent1">
+              <a:shade val="50000"/>
+            </a:schemeClr>
+          </a:lnRef>
+          <a:fillRef idx="1">
+            <a:schemeClr val="accent1"/>
+          </a:fillRef>
+          <a:effectRef idx="0">
+            <a:schemeClr val="accent1"/>
+          </a:effectRef>
+          <a:fontRef idx="minor">
+            <a:schemeClr val="lt1"/>
+          </a:fontRef>
+        </p:style>
+        <p:txBody>
+          <a:bodyPr lIns="91440" tIns="91440" rIns="91440" bIns="91440" rtlCol="0" anchor="ctr"/>
+          <a:lstStyle/>
+          <a:p>
+            <a:pPr algn="just"/>
+            <a:r>
+              <a:rPr lang="en-US" sz="1000" dirty="0" smtClean="0">
+                <a:solidFill>
+                  <a:schemeClr val="tx1"/>
+                </a:solidFill>
+                <a:latin typeface="Times New Roman" panose="02020603050405020304" pitchFamily="18" charset="0"/>
+                <a:cs typeface="Times New Roman" panose="02020603050405020304" pitchFamily="18" charset="0"/>
+              </a:rPr>
+              <a:t>YES</a:t>
+            </a:r>
+          </a:p>
+        </p:txBody>
+      </p:sp>
+      <p:cxnSp>
+        <p:nvCxnSpPr>
+          <p:cNvPr id="41" name="Straight Arrow Connector 40"/>
+          <p:cNvCxnSpPr>
+            <a:stCxn id="82" idx="2"/>
+            <a:endCxn id="37" idx="0"/>
+          </p:cNvCxnSpPr>
+          <p:nvPr/>
+        </p:nvCxnSpPr>
+        <p:spPr>
+          <a:xfrm>
+            <a:off x="5958840" y="909320"/>
+            <a:ext cx="0" cy="441960"/>
+          </a:xfrm>
+          <a:prstGeom prst="straightConnector1">
+            <a:avLst/>
+          </a:prstGeom>
+          <a:ln w="28575">
+            <a:solidFill>
+              <a:schemeClr val="tx1"/>
+            </a:solidFill>
+            <a:tailEnd type="triangle"/>
+          </a:ln>
+        </p:spPr>
+        <p:style>
+          <a:lnRef idx="1">
+            <a:schemeClr val="accent1"/>
+          </a:lnRef>
+          <a:fillRef idx="0">
+            <a:schemeClr val="accent1"/>
+          </a:fillRef>
+          <a:effectRef idx="0">
+            <a:schemeClr val="accent1"/>
+          </a:effectRef>
+          <a:fontRef idx="minor">
+            <a:schemeClr val="tx1"/>
+          </a:fontRef>
+        </p:style>
+      </p:cxnSp>
+      <p:cxnSp>
+        <p:nvCxnSpPr>
+          <p:cNvPr id="48" name="Straight Arrow Connector 47"/>
+          <p:cNvCxnSpPr>
+            <a:stCxn id="71" idx="3"/>
+            <a:endCxn id="82" idx="1"/>
+          </p:cNvCxnSpPr>
+          <p:nvPr/>
+        </p:nvCxnSpPr>
+        <p:spPr>
+          <a:xfrm flipV="1">
+            <a:off x="3810000" y="635000"/>
+            <a:ext cx="457200" cy="1330960"/>
+          </a:xfrm>
+          <a:prstGeom prst="straightConnector1">
+            <a:avLst/>
+          </a:prstGeom>
+          <a:ln w="28575">
+            <a:solidFill>
+              <a:schemeClr val="tx1"/>
+            </a:solidFill>
+            <a:prstDash val="sysDash"/>
+            <a:tailEnd type="triangle"/>
+          </a:ln>
+        </p:spPr>
+        <p:style>
+          <a:lnRef idx="1">
+            <a:schemeClr val="accent1"/>
+          </a:lnRef>
+          <a:fillRef idx="0">
+            <a:schemeClr val="accent1"/>
+          </a:fillRef>
+          <a:effectRef idx="0">
+            <a:schemeClr val="accent1"/>
+          </a:effectRef>
+          <a:fontRef idx="minor">
+            <a:schemeClr val="tx1"/>
+          </a:fontRef>
+        </p:style>
+      </p:cxnSp>
+      <p:cxnSp>
+        <p:nvCxnSpPr>
+          <p:cNvPr id="51" name="Straight Arrow Connector 50"/>
+          <p:cNvCxnSpPr>
+            <a:stCxn id="71" idx="3"/>
+            <a:endCxn id="37" idx="1"/>
+          </p:cNvCxnSpPr>
+          <p:nvPr/>
+        </p:nvCxnSpPr>
+        <p:spPr>
+          <a:xfrm flipV="1">
+            <a:off x="3810000" y="1625600"/>
+            <a:ext cx="457200" cy="340360"/>
+          </a:xfrm>
+          <a:prstGeom prst="straightConnector1">
+            <a:avLst/>
+          </a:prstGeom>
+          <a:ln w="28575">
+            <a:solidFill>
+              <a:schemeClr val="tx1"/>
+            </a:solidFill>
+            <a:prstDash val="sysDash"/>
+            <a:tailEnd type="triangle"/>
+          </a:ln>
+        </p:spPr>
+        <p:style>
+          <a:lnRef idx="1">
+            <a:schemeClr val="accent1"/>
+          </a:lnRef>
+          <a:fillRef idx="0">
+            <a:schemeClr val="accent1"/>
+          </a:fillRef>
+          <a:effectRef idx="0">
+            <a:schemeClr val="accent1"/>
+          </a:effectRef>
+          <a:fontRef idx="minor">
+            <a:schemeClr val="tx1"/>
+          </a:fontRef>
+        </p:style>
+      </p:cxnSp>
+      <p:cxnSp>
+        <p:nvCxnSpPr>
+          <p:cNvPr id="55" name="Straight Arrow Connector 54"/>
+          <p:cNvCxnSpPr>
+            <a:stCxn id="71" idx="3"/>
+            <a:endCxn id="14" idx="1"/>
+          </p:cNvCxnSpPr>
+          <p:nvPr/>
+        </p:nvCxnSpPr>
+        <p:spPr>
+          <a:xfrm>
+            <a:off x="3810000" y="1965960"/>
+            <a:ext cx="457200" cy="716280"/>
+          </a:xfrm>
+          <a:prstGeom prst="straightConnector1">
+            <a:avLst/>
+          </a:prstGeom>
+          <a:ln w="28575">
+            <a:solidFill>
+              <a:schemeClr val="tx1"/>
+            </a:solidFill>
+            <a:prstDash val="sysDash"/>
+            <a:tailEnd type="triangle"/>
+          </a:ln>
+        </p:spPr>
+        <p:style>
+          <a:lnRef idx="1">
+            <a:schemeClr val="accent1"/>
+          </a:lnRef>
+          <a:fillRef idx="0">
+            <a:schemeClr val="accent1"/>
+          </a:fillRef>
+          <a:effectRef idx="0">
+            <a:schemeClr val="accent1"/>
+          </a:effectRef>
+          <a:fontRef idx="minor">
+            <a:schemeClr val="tx1"/>
+          </a:fontRef>
+        </p:style>
+      </p:cxnSp>
+      <p:sp>
+        <p:nvSpPr>
+          <p:cNvPr id="58" name="Rectangle 57"/>
+          <p:cNvSpPr/>
+          <p:nvPr/>
+        </p:nvSpPr>
+        <p:spPr>
+          <a:xfrm>
+            <a:off x="6172198" y="5318760"/>
+            <a:ext cx="914400" cy="548640"/>
+          </a:xfrm>
+          <a:prstGeom prst="rect">
+            <a:avLst/>
+          </a:prstGeom>
+          <a:solidFill>
+            <a:schemeClr val="accent1">
+              <a:lumMod val="75000"/>
+            </a:schemeClr>
+          </a:solidFill>
+          <a:ln w="12700">
+            <a:solidFill>
+              <a:schemeClr val="tx1"/>
+            </a:solidFill>
+          </a:ln>
+        </p:spPr>
+        <p:style>
+          <a:lnRef idx="2">
+            <a:schemeClr val="accent1">
+              <a:shade val="50000"/>
+            </a:schemeClr>
+          </a:lnRef>
+          <a:fillRef idx="1">
+            <a:schemeClr val="accent1"/>
+          </a:fillRef>
+          <a:effectRef idx="0">
+            <a:schemeClr val="accent1"/>
+          </a:effectRef>
+          <a:fontRef idx="minor">
+            <a:schemeClr val="lt1"/>
+          </a:fontRef>
+        </p:style>
+        <p:txBody>
+          <a:bodyPr lIns="91440" tIns="91440" rIns="91440" bIns="91440" rtlCol="0" anchor="ctr"/>
+          <a:lstStyle/>
+          <a:p>
+            <a:pPr algn="ctr"/>
+            <a:r>
+              <a:rPr lang="en-US" sz="1400" b="1" dirty="0" smtClean="0">
+                <a:solidFill>
+                  <a:schemeClr val="bg1"/>
+                </a:solidFill>
+                <a:latin typeface="Times New Roman" panose="02020603050405020304" pitchFamily="18" charset="0"/>
+                <a:cs typeface="Times New Roman" panose="02020603050405020304" pitchFamily="18" charset="0"/>
+              </a:rPr>
+              <a:t>Add into results;</a:t>
+            </a:r>
+            <a:endParaRPr lang="en-US" sz="1400" b="1" dirty="0">
+              <a:solidFill>
+                <a:schemeClr val="bg1"/>
+              </a:solidFill>
+              <a:latin typeface="Times New Roman" panose="02020603050405020304" pitchFamily="18" charset="0"/>
+              <a:cs typeface="Times New Roman" panose="02020603050405020304" pitchFamily="18" charset="0"/>
+            </a:endParaRPr>
+          </a:p>
+        </p:txBody>
+      </p:sp>
+      <p:cxnSp>
+        <p:nvCxnSpPr>
+          <p:cNvPr id="59" name="Straight Arrow Connector 58"/>
+          <p:cNvCxnSpPr>
+            <a:stCxn id="35" idx="2"/>
+            <a:endCxn id="58" idx="0"/>
+          </p:cNvCxnSpPr>
+          <p:nvPr/>
+        </p:nvCxnSpPr>
+        <p:spPr>
+          <a:xfrm flipH="1">
+            <a:off x="6629398" y="4109720"/>
+            <a:ext cx="2" cy="1209040"/>
+          </a:xfrm>
+          <a:prstGeom prst="straightConnector1">
+            <a:avLst/>
+          </a:prstGeom>
+          <a:ln w="28575">
+            <a:solidFill>
+              <a:schemeClr val="tx1"/>
+            </a:solidFill>
+            <a:tailEnd type="triangle"/>
+          </a:ln>
+        </p:spPr>
+        <p:style>
+          <a:lnRef idx="1">
+            <a:schemeClr val="accent1"/>
+          </a:lnRef>
+          <a:fillRef idx="0">
+            <a:schemeClr val="accent1"/>
+          </a:fillRef>
+          <a:effectRef idx="0">
+            <a:schemeClr val="accent1"/>
+          </a:effectRef>
+          <a:fontRef idx="minor">
+            <a:schemeClr val="tx1"/>
+          </a:fontRef>
+        </p:style>
+      </p:cxnSp>
+      <p:cxnSp>
+        <p:nvCxnSpPr>
+          <p:cNvPr id="15" name="Elbow Connector 14"/>
+          <p:cNvCxnSpPr>
+            <a:stCxn id="35" idx="2"/>
+            <a:endCxn id="14" idx="3"/>
+          </p:cNvCxnSpPr>
+          <p:nvPr/>
+        </p:nvCxnSpPr>
+        <p:spPr>
+          <a:xfrm rot="5400000" flipH="1" flipV="1">
+            <a:off x="6426200" y="2885440"/>
+            <a:ext cx="1427480" cy="1021080"/>
+          </a:xfrm>
+          <a:prstGeom prst="bentConnector4">
+            <a:avLst>
+              <a:gd name="adj1" fmla="val -16014"/>
+              <a:gd name="adj2" fmla="val 122388"/>
+            </a:avLst>
+          </a:prstGeom>
+          <a:ln w="28575">
+            <a:solidFill>
+              <a:schemeClr val="tx1"/>
+            </a:solidFill>
+            <a:tailEnd type="triangle"/>
+          </a:ln>
+        </p:spPr>
+        <p:style>
+          <a:lnRef idx="1">
+            <a:schemeClr val="accent1"/>
+          </a:lnRef>
+          <a:fillRef idx="0">
+            <a:schemeClr val="accent1"/>
+          </a:fillRef>
+          <a:effectRef idx="0">
+            <a:schemeClr val="accent1"/>
+          </a:effectRef>
+          <a:fontRef idx="minor">
+            <a:schemeClr val="tx1"/>
+          </a:fontRef>
+        </p:style>
+      </p:cxnSp>
+      <p:sp>
+        <p:nvSpPr>
+          <p:cNvPr id="39" name="Flowchart: Alternate Process 38"/>
+          <p:cNvSpPr/>
+          <p:nvPr/>
+        </p:nvSpPr>
+        <p:spPr>
+          <a:xfrm>
+            <a:off x="5855854" y="4572000"/>
+            <a:ext cx="1584960" cy="444500"/>
+          </a:xfrm>
+          <a:prstGeom prst="flowChartAlternateProcess">
+            <a:avLst/>
+          </a:prstGeom>
+          <a:solidFill>
+            <a:schemeClr val="bg1"/>
+          </a:solidFill>
+          <a:ln w="12700">
+            <a:noFill/>
+            <a:prstDash val="sysDash"/>
+          </a:ln>
+        </p:spPr>
+        <p:style>
+          <a:lnRef idx="2">
+            <a:schemeClr val="accent1">
+              <a:shade val="50000"/>
+            </a:schemeClr>
+          </a:lnRef>
+          <a:fillRef idx="1">
+            <a:schemeClr val="accent1"/>
+          </a:fillRef>
+          <a:effectRef idx="0">
+            <a:schemeClr val="accent1"/>
+          </a:effectRef>
+          <a:fontRef idx="minor">
+            <a:schemeClr val="lt1"/>
+          </a:fontRef>
+        </p:style>
+        <p:txBody>
+          <a:bodyPr lIns="91440" tIns="91440" rIns="91440" bIns="91440" rtlCol="0" anchor="ctr"/>
+          <a:lstStyle/>
+          <a:p>
+            <a:pPr algn="ctr"/>
+            <a:r>
+              <a:rPr lang="en-US" sz="1000" dirty="0" smtClean="0">
+                <a:solidFill>
+                  <a:schemeClr val="tx1"/>
+                </a:solidFill>
+                <a:latin typeface="Times New Roman" panose="02020603050405020304" pitchFamily="18" charset="0"/>
+                <a:cs typeface="Times New Roman" panose="02020603050405020304" pitchFamily="18" charset="0"/>
+              </a:rPr>
+              <a:t>Adjust parameter</a:t>
+            </a:r>
+          </a:p>
+          <a:p>
+            <a:pPr algn="ctr"/>
+            <a:r>
+              <a:rPr lang="en-US" sz="1000" dirty="0" smtClean="0">
+                <a:solidFill>
+                  <a:schemeClr val="tx1"/>
+                </a:solidFill>
+                <a:latin typeface="Times New Roman" panose="02020603050405020304" pitchFamily="18" charset="0"/>
+                <a:cs typeface="Times New Roman" panose="02020603050405020304" pitchFamily="18" charset="0"/>
+              </a:rPr>
+              <a:t>until all regions are YES</a:t>
+            </a:r>
+          </a:p>
+        </p:txBody>
+      </p:sp>
+    </p:spTree>
+    <p:extLst>
+      <p:ext uri="{BB962C8B-B14F-4D97-AF65-F5344CB8AC3E}">
+        <p14:creationId xmlns:p14="http://schemas.microsoft.com/office/powerpoint/2010/main" val="3028896097"/>
       </p:ext>
     </p:extLst>
   </p:cSld>

</xml_diff>